<commit_message>
deleted unused evals from cmbeval branch, readme updates with flow fig
</commit_message>
<xml_diff>
--- a/other/flow_chrts.pptx
+++ b/other/flow_chrts.pptx
@@ -104,7 +104,16 @@
       </a:defRPr>
     </a:lvl9pPr>
   </p:defaultTextStyle>
+  <p:extLst>
+    <p:ext uri="{EFAFB233-063F-42B5-8137-9DF3F51BA10A}">
+      <p15:sldGuideLst xmlns:p15="http://schemas.microsoft.com/office/powerpoint/2012/main"/>
+    </p:ext>
+  </p:extLst>
 </p:presentation>
+</file>
+
+<file path=ppt/revisionInfo.xml><?xml version="1.0" encoding="utf-8"?>
+<p1510:revInfo xmlns:a="http://schemas.openxmlformats.org/drawingml/2006/main" xmlns:r="http://schemas.openxmlformats.org/officeDocument/2006/relationships" xmlns:p1510="http://schemas.microsoft.com/office/powerpoint/2015/10/main"/>
 </file>
 
 <file path=ppt/slideLayouts/slideLayout1.xml><?xml version="1.0" encoding="utf-8"?>
@@ -238,7 +247,7 @@
           <a:p>
             <a:fld id="{FA4378EA-FC18-4E0D-B9BB-49AEA5759A36}" type="datetimeFigureOut">
               <a:rPr lang="en-US" smtClean="0"/>
-              <a:t>1/5/2018</a:t>
+              <a:t>1/7/2018</a:t>
             </a:fld>
             <a:endParaRPr lang="en-US"/>
           </a:p>
@@ -408,7 +417,7 @@
           <a:p>
             <a:fld id="{FA4378EA-FC18-4E0D-B9BB-49AEA5759A36}" type="datetimeFigureOut">
               <a:rPr lang="en-US" smtClean="0"/>
-              <a:t>1/5/2018</a:t>
+              <a:t>1/7/2018</a:t>
             </a:fld>
             <a:endParaRPr lang="en-US"/>
           </a:p>
@@ -588,7 +597,7 @@
           <a:p>
             <a:fld id="{FA4378EA-FC18-4E0D-B9BB-49AEA5759A36}" type="datetimeFigureOut">
               <a:rPr lang="en-US" smtClean="0"/>
-              <a:t>1/5/2018</a:t>
+              <a:t>1/7/2018</a:t>
             </a:fld>
             <a:endParaRPr lang="en-US"/>
           </a:p>
@@ -758,7 +767,7 @@
           <a:p>
             <a:fld id="{FA4378EA-FC18-4E0D-B9BB-49AEA5759A36}" type="datetimeFigureOut">
               <a:rPr lang="en-US" smtClean="0"/>
-              <a:t>1/5/2018</a:t>
+              <a:t>1/7/2018</a:t>
             </a:fld>
             <a:endParaRPr lang="en-US"/>
           </a:p>
@@ -1002,7 +1011,7 @@
           <a:p>
             <a:fld id="{FA4378EA-FC18-4E0D-B9BB-49AEA5759A36}" type="datetimeFigureOut">
               <a:rPr lang="en-US" smtClean="0"/>
-              <a:t>1/5/2018</a:t>
+              <a:t>1/7/2018</a:t>
             </a:fld>
             <a:endParaRPr lang="en-US"/>
           </a:p>
@@ -1234,7 +1243,7 @@
           <a:p>
             <a:fld id="{FA4378EA-FC18-4E0D-B9BB-49AEA5759A36}" type="datetimeFigureOut">
               <a:rPr lang="en-US" smtClean="0"/>
-              <a:t>1/5/2018</a:t>
+              <a:t>1/7/2018</a:t>
             </a:fld>
             <a:endParaRPr lang="en-US"/>
           </a:p>
@@ -1601,7 +1610,7 @@
           <a:p>
             <a:fld id="{FA4378EA-FC18-4E0D-B9BB-49AEA5759A36}" type="datetimeFigureOut">
               <a:rPr lang="en-US" smtClean="0"/>
-              <a:t>1/5/2018</a:t>
+              <a:t>1/7/2018</a:t>
             </a:fld>
             <a:endParaRPr lang="en-US"/>
           </a:p>
@@ -1719,7 +1728,7 @@
           <a:p>
             <a:fld id="{FA4378EA-FC18-4E0D-B9BB-49AEA5759A36}" type="datetimeFigureOut">
               <a:rPr lang="en-US" smtClean="0"/>
-              <a:t>1/5/2018</a:t>
+              <a:t>1/7/2018</a:t>
             </a:fld>
             <a:endParaRPr lang="en-US"/>
           </a:p>
@@ -1814,7 +1823,7 @@
           <a:p>
             <a:fld id="{FA4378EA-FC18-4E0D-B9BB-49AEA5759A36}" type="datetimeFigureOut">
               <a:rPr lang="en-US" smtClean="0"/>
-              <a:t>1/5/2018</a:t>
+              <a:t>1/7/2018</a:t>
             </a:fld>
             <a:endParaRPr lang="en-US"/>
           </a:p>
@@ -2091,7 +2100,7 @@
           <a:p>
             <a:fld id="{FA4378EA-FC18-4E0D-B9BB-49AEA5759A36}" type="datetimeFigureOut">
               <a:rPr lang="en-US" smtClean="0"/>
-              <a:t>1/5/2018</a:t>
+              <a:t>1/7/2018</a:t>
             </a:fld>
             <a:endParaRPr lang="en-US"/>
           </a:p>
@@ -2348,7 +2357,7 @@
           <a:p>
             <a:fld id="{FA4378EA-FC18-4E0D-B9BB-49AEA5759A36}" type="datetimeFigureOut">
               <a:rPr lang="en-US" smtClean="0"/>
-              <a:t>1/5/2018</a:t>
+              <a:t>1/7/2018</a:t>
             </a:fld>
             <a:endParaRPr lang="en-US"/>
           </a:p>
@@ -2561,7 +2570,7 @@
           <a:p>
             <a:fld id="{FA4378EA-FC18-4E0D-B9BB-49AEA5759A36}" type="datetimeFigureOut">
               <a:rPr lang="en-US" smtClean="0"/>
-              <a:t>1/5/2018</a:t>
+              <a:t>1/7/2018</a:t>
             </a:fld>
             <a:endParaRPr lang="en-US"/>
           </a:p>

</xml_diff>

<commit_message>
added bayesian model fig
</commit_message>
<xml_diff>
--- a/other/flow_chrts.pptx
+++ b/other/flow_chrts.pptx
@@ -112,10 +112,6 @@
 </p:presentation>
 </file>
 
-<file path=ppt/revisionInfo.xml><?xml version="1.0" encoding="utf-8"?>
-<p1510:revInfo xmlns:a="http://schemas.openxmlformats.org/drawingml/2006/main" xmlns:r="http://schemas.openxmlformats.org/officeDocument/2006/relationships" xmlns:p1510="http://schemas.microsoft.com/office/powerpoint/2015/10/main"/>
-</file>
-
 <file path=ppt/slideLayouts/slideLayout1.xml><?xml version="1.0" encoding="utf-8"?>
 <p:sldLayout xmlns:a="http://schemas.openxmlformats.org/drawingml/2006/main" xmlns:r="http://schemas.openxmlformats.org/officeDocument/2006/relationships" xmlns:p="http://schemas.openxmlformats.org/presentationml/2006/main" type="title" preserve="1">
   <p:cSld name="Title Slide">
@@ -247,7 +243,7 @@
           <a:p>
             <a:fld id="{FA4378EA-FC18-4E0D-B9BB-49AEA5759A36}" type="datetimeFigureOut">
               <a:rPr lang="en-US" smtClean="0"/>
-              <a:t>1/7/2018</a:t>
+              <a:t>2/18/2018</a:t>
             </a:fld>
             <a:endParaRPr lang="en-US"/>
           </a:p>
@@ -417,7 +413,7 @@
           <a:p>
             <a:fld id="{FA4378EA-FC18-4E0D-B9BB-49AEA5759A36}" type="datetimeFigureOut">
               <a:rPr lang="en-US" smtClean="0"/>
-              <a:t>1/7/2018</a:t>
+              <a:t>2/18/2018</a:t>
             </a:fld>
             <a:endParaRPr lang="en-US"/>
           </a:p>
@@ -597,7 +593,7 @@
           <a:p>
             <a:fld id="{FA4378EA-FC18-4E0D-B9BB-49AEA5759A36}" type="datetimeFigureOut">
               <a:rPr lang="en-US" smtClean="0"/>
-              <a:t>1/7/2018</a:t>
+              <a:t>2/18/2018</a:t>
             </a:fld>
             <a:endParaRPr lang="en-US"/>
           </a:p>
@@ -767,7 +763,7 @@
           <a:p>
             <a:fld id="{FA4378EA-FC18-4E0D-B9BB-49AEA5759A36}" type="datetimeFigureOut">
               <a:rPr lang="en-US" smtClean="0"/>
-              <a:t>1/7/2018</a:t>
+              <a:t>2/18/2018</a:t>
             </a:fld>
             <a:endParaRPr lang="en-US"/>
           </a:p>
@@ -1011,7 +1007,7 @@
           <a:p>
             <a:fld id="{FA4378EA-FC18-4E0D-B9BB-49AEA5759A36}" type="datetimeFigureOut">
               <a:rPr lang="en-US" smtClean="0"/>
-              <a:t>1/7/2018</a:t>
+              <a:t>2/18/2018</a:t>
             </a:fld>
             <a:endParaRPr lang="en-US"/>
           </a:p>
@@ -1243,7 +1239,7 @@
           <a:p>
             <a:fld id="{FA4378EA-FC18-4E0D-B9BB-49AEA5759A36}" type="datetimeFigureOut">
               <a:rPr lang="en-US" smtClean="0"/>
-              <a:t>1/7/2018</a:t>
+              <a:t>2/18/2018</a:t>
             </a:fld>
             <a:endParaRPr lang="en-US"/>
           </a:p>
@@ -1610,7 +1606,7 @@
           <a:p>
             <a:fld id="{FA4378EA-FC18-4E0D-B9BB-49AEA5759A36}" type="datetimeFigureOut">
               <a:rPr lang="en-US" smtClean="0"/>
-              <a:t>1/7/2018</a:t>
+              <a:t>2/18/2018</a:t>
             </a:fld>
             <a:endParaRPr lang="en-US"/>
           </a:p>
@@ -1728,7 +1724,7 @@
           <a:p>
             <a:fld id="{FA4378EA-FC18-4E0D-B9BB-49AEA5759A36}" type="datetimeFigureOut">
               <a:rPr lang="en-US" smtClean="0"/>
-              <a:t>1/7/2018</a:t>
+              <a:t>2/18/2018</a:t>
             </a:fld>
             <a:endParaRPr lang="en-US"/>
           </a:p>
@@ -1823,7 +1819,7 @@
           <a:p>
             <a:fld id="{FA4378EA-FC18-4E0D-B9BB-49AEA5759A36}" type="datetimeFigureOut">
               <a:rPr lang="en-US" smtClean="0"/>
-              <a:t>1/7/2018</a:t>
+              <a:t>2/18/2018</a:t>
             </a:fld>
             <a:endParaRPr lang="en-US"/>
           </a:p>
@@ -2100,7 +2096,7 @@
           <a:p>
             <a:fld id="{FA4378EA-FC18-4E0D-B9BB-49AEA5759A36}" type="datetimeFigureOut">
               <a:rPr lang="en-US" smtClean="0"/>
-              <a:t>1/7/2018</a:t>
+              <a:t>2/18/2018</a:t>
             </a:fld>
             <a:endParaRPr lang="en-US"/>
           </a:p>
@@ -2357,7 +2353,7 @@
           <a:p>
             <a:fld id="{FA4378EA-FC18-4E0D-B9BB-49AEA5759A36}" type="datetimeFigureOut">
               <a:rPr lang="en-US" smtClean="0"/>
-              <a:t>1/7/2018</a:t>
+              <a:t>2/18/2018</a:t>
             </a:fld>
             <a:endParaRPr lang="en-US"/>
           </a:p>
@@ -2570,7 +2566,7 @@
           <a:p>
             <a:fld id="{FA4378EA-FC18-4E0D-B9BB-49AEA5759A36}" type="datetimeFigureOut">
               <a:rPr lang="en-US" smtClean="0"/>
-              <a:t>1/7/2018</a:t>
+              <a:t>2/18/2018</a:t>
             </a:fld>
             <a:endParaRPr lang="en-US"/>
           </a:p>
@@ -2977,10 +2973,10 @@
       </p:grpSpPr>
       <p:grpSp>
         <p:nvGrpSpPr>
-          <p:cNvPr id="188" name="Group 187">
+          <p:cNvPr id="51" name="Group 50">
             <a:extLst>
               <a:ext uri="{FF2B5EF4-FFF2-40B4-BE49-F238E27FC236}">
-                <a16:creationId xmlns:a16="http://schemas.microsoft.com/office/drawing/2014/main" id="{3788A117-BA73-4C92-9C15-9843D2DB4500}"/>
+                <a16:creationId xmlns:a16="http://schemas.microsoft.com/office/drawing/2014/main" id="{71823C3B-D35A-462E-BC84-379B72B26670}"/>
               </a:ext>
             </a:extLst>
           </p:cNvPr>
@@ -2991,7 +2987,7 @@
           <a:xfrm>
             <a:off x="364793" y="24992"/>
             <a:ext cx="8437666" cy="9814823"/>
-            <a:chOff x="50890" y="-479973"/>
+            <a:chOff x="364793" y="24992"/>
             <a:chExt cx="8437666" cy="9814823"/>
           </a:xfrm>
         </p:grpSpPr>
@@ -3009,7 +3005,7 @@
           </p:nvGrpSpPr>
           <p:grpSpPr>
             <a:xfrm>
-              <a:off x="194952" y="4285629"/>
+              <a:off x="508855" y="4790594"/>
               <a:ext cx="2238265" cy="1297452"/>
               <a:chOff x="744542" y="6524187"/>
               <a:chExt cx="2582613" cy="1497060"/>
@@ -3524,2437 +3520,2333 @@
             </p:sp>
           </p:grpSp>
         </p:grpSp>
-        <p:grpSp>
-          <p:nvGrpSpPr>
-            <p:cNvPr id="174" name="Group 173">
+        <p:sp>
+          <p:nvSpPr>
+            <p:cNvPr id="115" name="TextBox 114">
               <a:extLst>
                 <a:ext uri="{FF2B5EF4-FFF2-40B4-BE49-F238E27FC236}">
-                  <a16:creationId xmlns:a16="http://schemas.microsoft.com/office/drawing/2014/main" id="{7CAA7B0C-8BE5-4D1F-8FCF-9072E3300665}"/>
+                  <a16:creationId xmlns:a16="http://schemas.microsoft.com/office/drawing/2014/main" id="{562FBB1D-A19E-4065-885F-9DD9C540590D}"/>
                 </a:ext>
               </a:extLst>
             </p:cNvPr>
-            <p:cNvGrpSpPr/>
+            <p:cNvSpPr txBox="1"/>
             <p:nvPr/>
-          </p:nvGrpSpPr>
-          <p:grpSpPr>
+          </p:nvSpPr>
+          <p:spPr>
             <a:xfrm>
-              <a:off x="77007" y="-479973"/>
-              <a:ext cx="8411549" cy="5990357"/>
-              <a:chOff x="909467" y="501261"/>
-              <a:chExt cx="9705633" cy="6911950"/>
+              <a:off x="3269108" y="24992"/>
+              <a:ext cx="3119765" cy="412421"/>
             </a:xfrm>
-          </p:grpSpPr>
-          <p:sp>
-            <p:nvSpPr>
-              <p:cNvPr id="115" name="TextBox 114">
-                <a:extLst>
-                  <a:ext uri="{FF2B5EF4-FFF2-40B4-BE49-F238E27FC236}">
-                    <a16:creationId xmlns:a16="http://schemas.microsoft.com/office/drawing/2014/main" id="{562FBB1D-A19E-4065-885F-9DD9C540590D}"/>
-                  </a:ext>
-                </a:extLst>
-              </p:cNvPr>
-              <p:cNvSpPr txBox="1"/>
-              <p:nvPr/>
-            </p:nvSpPr>
-            <p:spPr>
-              <a:xfrm>
-                <a:off x="4230465" y="501261"/>
-                <a:ext cx="3599729" cy="475870"/>
-              </a:xfrm>
-              <a:prstGeom prst="rect">
+            <a:prstGeom prst="rect">
+              <a:avLst/>
+            </a:prstGeom>
+            <a:noFill/>
+          </p:spPr>
+          <p:txBody>
+            <a:bodyPr wrap="none" rtlCol="0">
+              <a:spAutoFit/>
+            </a:bodyPr>
+            <a:lstStyle/>
+            <a:p>
+              <a:r>
+                <a:rPr lang="en-US" sz="2080" b="1" dirty="0">
+                  <a:latin typeface="Times New Roman" panose="02020603050405020304" pitchFamily="18" charset="0"/>
+                  <a:cs typeface="Times New Roman" panose="02020603050405020304" pitchFamily="18" charset="0"/>
+                </a:rPr>
+                <a:t>Large model, 1974 - 2016 </a:t>
+              </a:r>
+            </a:p>
+          </p:txBody>
+        </p:sp>
+        <p:sp>
+          <p:nvSpPr>
+            <p:cNvPr id="119" name="Oval 118">
+              <a:extLst>
+                <a:ext uri="{FF2B5EF4-FFF2-40B4-BE49-F238E27FC236}">
+                  <a16:creationId xmlns:a16="http://schemas.microsoft.com/office/drawing/2014/main" id="{340B539F-EB82-4723-A029-6079FE8B0763}"/>
+                </a:ext>
+              </a:extLst>
+            </p:cNvPr>
+            <p:cNvSpPr/>
+            <p:nvPr/>
+          </p:nvSpPr>
+          <p:spPr>
+            <a:xfrm>
+              <a:off x="2687180" y="640614"/>
+              <a:ext cx="1594866" cy="792480"/>
+            </a:xfrm>
+            <a:prstGeom prst="ellipse">
+              <a:avLst/>
+            </a:prstGeom>
+            <a:solidFill>
+              <a:schemeClr val="accent2">
+                <a:lumMod val="60000"/>
+                <a:lumOff val="40000"/>
+              </a:schemeClr>
+            </a:solidFill>
+            <a:ln>
+              <a:solidFill>
+                <a:schemeClr val="tx1"/>
+              </a:solidFill>
+            </a:ln>
+          </p:spPr>
+          <p:style>
+            <a:lnRef idx="2">
+              <a:schemeClr val="accent1">
+                <a:shade val="50000"/>
+              </a:schemeClr>
+            </a:lnRef>
+            <a:fillRef idx="1">
+              <a:schemeClr val="accent1"/>
+            </a:fillRef>
+            <a:effectRef idx="0">
+              <a:schemeClr val="accent1"/>
+            </a:effectRef>
+            <a:fontRef idx="minor">
+              <a:schemeClr val="lt1"/>
+            </a:fontRef>
+          </p:style>
+          <p:txBody>
+            <a:bodyPr rot="0" spcFirstLastPara="0" vertOverflow="overflow" horzOverflow="overflow" vert="horz" wrap="none" lIns="79248" tIns="39624" rIns="79248" bIns="39624" numCol="1" spcCol="0" rtlCol="0" fromWordArt="0" anchor="ctr" anchorCtr="0" forceAA="0" compatLnSpc="1">
+              <a:prstTxWarp prst="textNoShape">
                 <a:avLst/>
-              </a:prstGeom>
-              <a:noFill/>
-            </p:spPr>
-            <p:txBody>
-              <a:bodyPr wrap="none" rtlCol="0">
-                <a:spAutoFit/>
-              </a:bodyPr>
-              <a:lstStyle/>
-              <a:p>
-                <a:r>
-                  <a:rPr lang="en-US" sz="2080" b="1" dirty="0">
-                    <a:latin typeface="Times New Roman" panose="02020603050405020304" pitchFamily="18" charset="0"/>
-                    <a:cs typeface="Times New Roman" panose="02020603050405020304" pitchFamily="18" charset="0"/>
-                  </a:rPr>
-                  <a:t>Large model, 1974 - 2016 </a:t>
-                </a:r>
-              </a:p>
-            </p:txBody>
-          </p:sp>
-          <p:grpSp>
-            <p:nvGrpSpPr>
-              <p:cNvPr id="118" name="Group 117">
-                <a:extLst>
-                  <a:ext uri="{FF2B5EF4-FFF2-40B4-BE49-F238E27FC236}">
-                    <a16:creationId xmlns:a16="http://schemas.microsoft.com/office/drawing/2014/main" id="{26FE7D2B-7ED8-4FD3-9E75-E3AEAD4EBAD2}"/>
-                  </a:ext>
-                </a:extLst>
-              </p:cNvPr>
-              <p:cNvGrpSpPr/>
-              <p:nvPr/>
-            </p:nvGrpSpPr>
-            <p:grpSpPr>
-              <a:xfrm>
-                <a:off x="909467" y="1210575"/>
-                <a:ext cx="9705633" cy="6202636"/>
-                <a:chOff x="717483" y="1645256"/>
-                <a:chExt cx="9705633" cy="6202636"/>
-              </a:xfrm>
-            </p:grpSpPr>
-            <p:sp>
-              <p:nvSpPr>
-                <p:cNvPr id="119" name="Oval 118">
-                  <a:extLst>
-                    <a:ext uri="{FF2B5EF4-FFF2-40B4-BE49-F238E27FC236}">
-                      <a16:creationId xmlns:a16="http://schemas.microsoft.com/office/drawing/2014/main" id="{340B539F-EB82-4723-A029-6079FE8B0763}"/>
-                    </a:ext>
-                  </a:extLst>
-                </p:cNvPr>
-                <p:cNvSpPr/>
-                <p:nvPr/>
-              </p:nvSpPr>
-              <p:spPr>
-                <a:xfrm>
-                  <a:off x="3367025" y="1646275"/>
-                  <a:ext cx="1840230" cy="914400"/>
-                </a:xfrm>
-                <a:prstGeom prst="ellipse">
-                  <a:avLst/>
-                </a:prstGeom>
-                <a:solidFill>
-                  <a:schemeClr val="accent2">
-                    <a:lumMod val="60000"/>
-                    <a:lumOff val="40000"/>
-                  </a:schemeClr>
-                </a:solidFill>
-                <a:ln>
+              </a:prstTxWarp>
+              <a:noAutofit/>
+            </a:bodyPr>
+            <a:lstStyle/>
+            <a:p>
+              <a:pPr algn="ctr"/>
+              <a:r>
+                <a:rPr lang="en-US" sz="1600" dirty="0">
                   <a:solidFill>
                     <a:schemeClr val="tx1"/>
                   </a:solidFill>
-                </a:ln>
-              </p:spPr>
-              <p:style>
-                <a:lnRef idx="2">
-                  <a:schemeClr val="accent1">
-                    <a:shade val="50000"/>
-                  </a:schemeClr>
-                </a:lnRef>
-                <a:fillRef idx="1">
-                  <a:schemeClr val="accent1"/>
-                </a:fillRef>
-                <a:effectRef idx="0">
-                  <a:schemeClr val="accent1"/>
-                </a:effectRef>
-                <a:fontRef idx="minor">
-                  <a:schemeClr val="lt1"/>
-                </a:fontRef>
-              </p:style>
-              <p:txBody>
-                <a:bodyPr rot="0" spcFirstLastPara="0" vertOverflow="overflow" horzOverflow="overflow" vert="horz" wrap="none" lIns="79248" tIns="39624" rIns="79248" bIns="39624" numCol="1" spcCol="0" rtlCol="0" fromWordArt="0" anchor="ctr" anchorCtr="0" forceAA="0" compatLnSpc="1">
-                  <a:prstTxWarp prst="textNoShape">
-                    <a:avLst/>
-                  </a:prstTxWarp>
-                  <a:noAutofit/>
-                </a:bodyPr>
-                <a:lstStyle/>
-                <a:p>
-                  <a:pPr algn="ctr"/>
-                  <a:r>
-                    <a:rPr lang="en-US" sz="1600" dirty="0">
-                      <a:solidFill>
-                        <a:schemeClr val="tx1"/>
-                      </a:solidFill>
-                      <a:latin typeface="Times New Roman" panose="02020603050405020304" pitchFamily="18" charset="0"/>
-                      <a:cs typeface="Times New Roman" panose="02020603050405020304" pitchFamily="18" charset="0"/>
-                    </a:rPr>
-                    <a:t>Habitat</a:t>
-                  </a:r>
-                </a:p>
-                <a:p>
-                  <a:pPr algn="ctr"/>
-                  <a:r>
-                    <a:rPr lang="en-US" sz="1600" dirty="0">
-                      <a:solidFill>
-                        <a:schemeClr val="tx1"/>
-                      </a:solidFill>
-                      <a:latin typeface="Times New Roman" panose="02020603050405020304" pitchFamily="18" charset="0"/>
-                      <a:cs typeface="Times New Roman" panose="02020603050405020304" pitchFamily="18" charset="0"/>
-                    </a:rPr>
-                    <a:t>Enhancement</a:t>
-                  </a:r>
-                </a:p>
-              </p:txBody>
-            </p:sp>
-            <p:sp>
-              <p:nvSpPr>
-                <p:cNvPr id="120" name="Oval 119">
-                  <a:extLst>
-                    <a:ext uri="{FF2B5EF4-FFF2-40B4-BE49-F238E27FC236}">
-                      <a16:creationId xmlns:a16="http://schemas.microsoft.com/office/drawing/2014/main" id="{00546278-1051-4250-BED4-80084362F780}"/>
-                    </a:ext>
-                  </a:extLst>
-                </p:cNvPr>
-                <p:cNvSpPr/>
-                <p:nvPr/>
-              </p:nvSpPr>
-              <p:spPr>
-                <a:xfrm>
-                  <a:off x="5934011" y="1646275"/>
-                  <a:ext cx="1840230" cy="914400"/>
-                </a:xfrm>
-                <a:prstGeom prst="ellipse">
-                  <a:avLst/>
-                </a:prstGeom>
-                <a:solidFill>
-                  <a:schemeClr val="accent2">
-                    <a:lumMod val="60000"/>
-                    <a:lumOff val="40000"/>
-                  </a:schemeClr>
-                </a:solidFill>
-                <a:ln>
+                  <a:latin typeface="Times New Roman" panose="02020603050405020304" pitchFamily="18" charset="0"/>
+                  <a:cs typeface="Times New Roman" panose="02020603050405020304" pitchFamily="18" charset="0"/>
+                </a:rPr>
+                <a:t>Habitat</a:t>
+              </a:r>
+            </a:p>
+            <a:p>
+              <a:pPr algn="ctr"/>
+              <a:r>
+                <a:rPr lang="en-US" sz="1600" dirty="0">
                   <a:solidFill>
                     <a:schemeClr val="tx1"/>
                   </a:solidFill>
-                </a:ln>
-              </p:spPr>
-              <p:style>
-                <a:lnRef idx="2">
-                  <a:schemeClr val="accent1">
-                    <a:shade val="50000"/>
-                  </a:schemeClr>
-                </a:lnRef>
-                <a:fillRef idx="1">
-                  <a:schemeClr val="accent1"/>
-                </a:fillRef>
-                <a:effectRef idx="0">
-                  <a:schemeClr val="accent1"/>
-                </a:effectRef>
-                <a:fontRef idx="minor">
-                  <a:schemeClr val="lt1"/>
-                </a:fontRef>
-              </p:style>
-              <p:txBody>
-                <a:bodyPr rot="0" spcFirstLastPara="0" vertOverflow="overflow" horzOverflow="overflow" vert="horz" wrap="none" lIns="79248" tIns="39624" rIns="79248" bIns="39624" numCol="1" spcCol="0" rtlCol="0" fromWordArt="0" anchor="ctr" anchorCtr="0" forceAA="0" compatLnSpc="1">
-                  <a:prstTxWarp prst="textNoShape">
-                    <a:avLst/>
-                  </a:prstTxWarp>
-                  <a:noAutofit/>
-                </a:bodyPr>
-                <a:lstStyle/>
-                <a:p>
-                  <a:pPr algn="ctr"/>
-                  <a:r>
-                    <a:rPr lang="en-US" sz="1600" dirty="0">
-                      <a:solidFill>
-                        <a:schemeClr val="tx1"/>
-                      </a:solidFill>
-                      <a:latin typeface="Times New Roman" panose="02020603050405020304" pitchFamily="18" charset="0"/>
-                      <a:cs typeface="Times New Roman" panose="02020603050405020304" pitchFamily="18" charset="0"/>
-                    </a:rPr>
-                    <a:t>Habitat</a:t>
-                  </a:r>
-                </a:p>
-                <a:p>
-                  <a:pPr algn="ctr"/>
-                  <a:r>
-                    <a:rPr lang="en-US" sz="1600" dirty="0">
-                      <a:solidFill>
-                        <a:schemeClr val="tx1"/>
-                      </a:solidFill>
-                      <a:latin typeface="Times New Roman" panose="02020603050405020304" pitchFamily="18" charset="0"/>
-                      <a:cs typeface="Times New Roman" panose="02020603050405020304" pitchFamily="18" charset="0"/>
-                    </a:rPr>
-                    <a:t>Establishment</a:t>
-                  </a:r>
-                </a:p>
-              </p:txBody>
-            </p:sp>
-            <p:sp>
-              <p:nvSpPr>
-                <p:cNvPr id="121" name="Oval 120">
-                  <a:extLst>
-                    <a:ext uri="{FF2B5EF4-FFF2-40B4-BE49-F238E27FC236}">
-                      <a16:creationId xmlns:a16="http://schemas.microsoft.com/office/drawing/2014/main" id="{9D8BFEBB-E711-4324-9EB0-D667501B8F6B}"/>
-                    </a:ext>
-                  </a:extLst>
-                </p:cNvPr>
-                <p:cNvSpPr/>
-                <p:nvPr/>
-              </p:nvSpPr>
-              <p:spPr>
-                <a:xfrm>
-                  <a:off x="717483" y="2559656"/>
-                  <a:ext cx="1840230" cy="914400"/>
-                </a:xfrm>
-                <a:prstGeom prst="ellipse">
-                  <a:avLst/>
-                </a:prstGeom>
-                <a:solidFill>
-                  <a:schemeClr val="accent4">
-                    <a:lumMod val="60000"/>
-                    <a:lumOff val="40000"/>
-                  </a:schemeClr>
-                </a:solidFill>
-                <a:ln>
+                  <a:latin typeface="Times New Roman" panose="02020603050405020304" pitchFamily="18" charset="0"/>
+                  <a:cs typeface="Times New Roman" panose="02020603050405020304" pitchFamily="18" charset="0"/>
+                </a:rPr>
+                <a:t>Enhancement</a:t>
+              </a:r>
+            </a:p>
+          </p:txBody>
+        </p:sp>
+        <p:sp>
+          <p:nvSpPr>
+            <p:cNvPr id="120" name="Oval 119">
+              <a:extLst>
+                <a:ext uri="{FF2B5EF4-FFF2-40B4-BE49-F238E27FC236}">
+                  <a16:creationId xmlns:a16="http://schemas.microsoft.com/office/drawing/2014/main" id="{00546278-1051-4250-BED4-80084362F780}"/>
+                </a:ext>
+              </a:extLst>
+            </p:cNvPr>
+            <p:cNvSpPr/>
+            <p:nvPr/>
+          </p:nvSpPr>
+          <p:spPr>
+            <a:xfrm>
+              <a:off x="4911901" y="640614"/>
+              <a:ext cx="1594866" cy="792480"/>
+            </a:xfrm>
+            <a:prstGeom prst="ellipse">
+              <a:avLst/>
+            </a:prstGeom>
+            <a:solidFill>
+              <a:schemeClr val="accent2">
+                <a:lumMod val="60000"/>
+                <a:lumOff val="40000"/>
+              </a:schemeClr>
+            </a:solidFill>
+            <a:ln>
+              <a:solidFill>
+                <a:schemeClr val="tx1"/>
+              </a:solidFill>
+            </a:ln>
+          </p:spPr>
+          <p:style>
+            <a:lnRef idx="2">
+              <a:schemeClr val="accent1">
+                <a:shade val="50000"/>
+              </a:schemeClr>
+            </a:lnRef>
+            <a:fillRef idx="1">
+              <a:schemeClr val="accent1"/>
+            </a:fillRef>
+            <a:effectRef idx="0">
+              <a:schemeClr val="accent1"/>
+            </a:effectRef>
+            <a:fontRef idx="minor">
+              <a:schemeClr val="lt1"/>
+            </a:fontRef>
+          </p:style>
+          <p:txBody>
+            <a:bodyPr rot="0" spcFirstLastPara="0" vertOverflow="overflow" horzOverflow="overflow" vert="horz" wrap="none" lIns="79248" tIns="39624" rIns="79248" bIns="39624" numCol="1" spcCol="0" rtlCol="0" fromWordArt="0" anchor="ctr" anchorCtr="0" forceAA="0" compatLnSpc="1">
+              <a:prstTxWarp prst="textNoShape">
+                <a:avLst/>
+              </a:prstTxWarp>
+              <a:noAutofit/>
+            </a:bodyPr>
+            <a:lstStyle/>
+            <a:p>
+              <a:pPr algn="ctr"/>
+              <a:r>
+                <a:rPr lang="en-US" sz="1600" dirty="0">
                   <a:solidFill>
                     <a:schemeClr val="tx1"/>
                   </a:solidFill>
-                </a:ln>
-              </p:spPr>
-              <p:style>
-                <a:lnRef idx="2">
-                  <a:schemeClr val="accent1">
-                    <a:shade val="50000"/>
-                  </a:schemeClr>
-                </a:lnRef>
-                <a:fillRef idx="1">
-                  <a:schemeClr val="accent1"/>
-                </a:fillRef>
-                <a:effectRef idx="0">
-                  <a:schemeClr val="accent1"/>
-                </a:effectRef>
-                <a:fontRef idx="minor">
-                  <a:schemeClr val="lt1"/>
-                </a:fontRef>
-              </p:style>
-              <p:txBody>
-                <a:bodyPr rot="0" spcFirstLastPara="0" vertOverflow="overflow" horzOverflow="overflow" vert="horz" wrap="none" lIns="79248" tIns="39624" rIns="79248" bIns="39624" numCol="1" spcCol="0" rtlCol="0" fromWordArt="0" anchor="ctr" anchorCtr="0" forceAA="0" compatLnSpc="1">
-                  <a:prstTxWarp prst="textNoShape">
-                    <a:avLst/>
-                  </a:prstTxWarp>
-                  <a:noAutofit/>
-                </a:bodyPr>
-                <a:lstStyle/>
-                <a:p>
-                  <a:pPr algn="ctr"/>
-                  <a:r>
-                    <a:rPr lang="en-US" sz="1600" dirty="0">
-                      <a:solidFill>
-                        <a:schemeClr val="tx1"/>
-                      </a:solidFill>
-                      <a:latin typeface="Times New Roman" panose="02020603050405020304" pitchFamily="18" charset="0"/>
-                      <a:cs typeface="Times New Roman" panose="02020603050405020304" pitchFamily="18" charset="0"/>
-                    </a:rPr>
-                    <a:t>Non-point </a:t>
-                  </a:r>
-                </a:p>
-                <a:p>
-                  <a:pPr algn="ctr"/>
-                  <a:r>
-                    <a:rPr lang="en-US" sz="1600" dirty="0">
-                      <a:solidFill>
-                        <a:schemeClr val="tx1"/>
-                      </a:solidFill>
-                      <a:latin typeface="Times New Roman" panose="02020603050405020304" pitchFamily="18" charset="0"/>
-                      <a:cs typeface="Times New Roman" panose="02020603050405020304" pitchFamily="18" charset="0"/>
-                    </a:rPr>
-                    <a:t>Source Control</a:t>
-                  </a:r>
-                </a:p>
-              </p:txBody>
-            </p:sp>
-            <p:sp>
-              <p:nvSpPr>
-                <p:cNvPr id="122" name="Oval 121">
-                  <a:extLst>
-                    <a:ext uri="{FF2B5EF4-FFF2-40B4-BE49-F238E27FC236}">
-                      <a16:creationId xmlns:a16="http://schemas.microsoft.com/office/drawing/2014/main" id="{8727A2BA-0CDE-4251-B49F-56503BD65A33}"/>
-                    </a:ext>
-                  </a:extLst>
-                </p:cNvPr>
-                <p:cNvSpPr/>
-                <p:nvPr/>
-              </p:nvSpPr>
-              <p:spPr>
-                <a:xfrm>
-                  <a:off x="717483" y="4114800"/>
-                  <a:ext cx="1840230" cy="914400"/>
-                </a:xfrm>
-                <a:prstGeom prst="ellipse">
-                  <a:avLst/>
-                </a:prstGeom>
-                <a:solidFill>
-                  <a:schemeClr val="accent4">
-                    <a:lumMod val="60000"/>
-                    <a:lumOff val="40000"/>
-                  </a:schemeClr>
-                </a:solidFill>
-                <a:ln>
+                  <a:latin typeface="Times New Roman" panose="02020603050405020304" pitchFamily="18" charset="0"/>
+                  <a:cs typeface="Times New Roman" panose="02020603050405020304" pitchFamily="18" charset="0"/>
+                </a:rPr>
+                <a:t>Habitat</a:t>
+              </a:r>
+            </a:p>
+            <a:p>
+              <a:pPr algn="ctr"/>
+              <a:r>
+                <a:rPr lang="en-US" sz="1600" dirty="0">
                   <a:solidFill>
                     <a:schemeClr val="tx1"/>
                   </a:solidFill>
-                </a:ln>
-              </p:spPr>
-              <p:style>
-                <a:lnRef idx="2">
-                  <a:schemeClr val="accent1">
-                    <a:shade val="50000"/>
-                  </a:schemeClr>
-                </a:lnRef>
-                <a:fillRef idx="1">
-                  <a:schemeClr val="accent1"/>
-                </a:fillRef>
-                <a:effectRef idx="0">
-                  <a:schemeClr val="accent1"/>
-                </a:effectRef>
-                <a:fontRef idx="minor">
-                  <a:schemeClr val="lt1"/>
-                </a:fontRef>
-              </p:style>
-              <p:txBody>
-                <a:bodyPr rot="0" spcFirstLastPara="0" vertOverflow="overflow" horzOverflow="overflow" vert="horz" wrap="none" lIns="79248" tIns="39624" rIns="79248" bIns="39624" numCol="1" spcCol="0" rtlCol="0" fromWordArt="0" anchor="ctr" anchorCtr="0" forceAA="0" compatLnSpc="1">
-                  <a:prstTxWarp prst="textNoShape">
-                    <a:avLst/>
-                  </a:prstTxWarp>
-                  <a:noAutofit/>
-                </a:bodyPr>
-                <a:lstStyle/>
-                <a:p>
-                  <a:pPr algn="ctr"/>
-                  <a:r>
-                    <a:rPr lang="en-US" sz="1600" dirty="0">
-                      <a:solidFill>
-                        <a:schemeClr val="tx1"/>
-                      </a:solidFill>
-                      <a:latin typeface="Times New Roman" panose="02020603050405020304" pitchFamily="18" charset="0"/>
-                      <a:cs typeface="Times New Roman" panose="02020603050405020304" pitchFamily="18" charset="0"/>
-                    </a:rPr>
-                    <a:t>Point </a:t>
-                  </a:r>
-                </a:p>
-                <a:p>
-                  <a:pPr algn="ctr"/>
-                  <a:r>
-                    <a:rPr lang="en-US" sz="1600" dirty="0">
-                      <a:solidFill>
-                        <a:schemeClr val="tx1"/>
-                      </a:solidFill>
-                      <a:latin typeface="Times New Roman" panose="02020603050405020304" pitchFamily="18" charset="0"/>
-                      <a:cs typeface="Times New Roman" panose="02020603050405020304" pitchFamily="18" charset="0"/>
-                    </a:rPr>
-                    <a:t>Source Control</a:t>
-                  </a:r>
-                </a:p>
-              </p:txBody>
-            </p:sp>
-            <p:sp>
-              <p:nvSpPr>
-                <p:cNvPr id="123" name="Oval 122">
-                  <a:extLst>
-                    <a:ext uri="{FF2B5EF4-FFF2-40B4-BE49-F238E27FC236}">
-                      <a16:creationId xmlns:a16="http://schemas.microsoft.com/office/drawing/2014/main" id="{F9385417-28E1-472F-A97E-B6106853B5E8}"/>
-                    </a:ext>
-                  </a:extLst>
-                </p:cNvPr>
-                <p:cNvSpPr/>
-                <p:nvPr/>
-              </p:nvSpPr>
-              <p:spPr>
-                <a:xfrm>
-                  <a:off x="8582886" y="1645256"/>
-                  <a:ext cx="1840230" cy="914400"/>
-                </a:xfrm>
-                <a:prstGeom prst="ellipse">
-                  <a:avLst/>
-                </a:prstGeom>
-                <a:solidFill>
-                  <a:schemeClr val="accent2">
-                    <a:lumMod val="60000"/>
-                    <a:lumOff val="40000"/>
-                  </a:schemeClr>
-                </a:solidFill>
-                <a:ln>
+                  <a:latin typeface="Times New Roman" panose="02020603050405020304" pitchFamily="18" charset="0"/>
+                  <a:cs typeface="Times New Roman" panose="02020603050405020304" pitchFamily="18" charset="0"/>
+                </a:rPr>
+                <a:t>Establishment</a:t>
+              </a:r>
+            </a:p>
+          </p:txBody>
+        </p:sp>
+        <p:sp>
+          <p:nvSpPr>
+            <p:cNvPr id="121" name="Oval 120">
+              <a:extLst>
+                <a:ext uri="{FF2B5EF4-FFF2-40B4-BE49-F238E27FC236}">
+                  <a16:creationId xmlns:a16="http://schemas.microsoft.com/office/drawing/2014/main" id="{9D8BFEBB-E711-4324-9EB0-D667501B8F6B}"/>
+                </a:ext>
+              </a:extLst>
+            </p:cNvPr>
+            <p:cNvSpPr/>
+            <p:nvPr/>
+          </p:nvSpPr>
+          <p:spPr>
+            <a:xfrm>
+              <a:off x="390910" y="1432211"/>
+              <a:ext cx="1594866" cy="792480"/>
+            </a:xfrm>
+            <a:prstGeom prst="ellipse">
+              <a:avLst/>
+            </a:prstGeom>
+            <a:solidFill>
+              <a:schemeClr val="accent4">
+                <a:lumMod val="60000"/>
+                <a:lumOff val="40000"/>
+              </a:schemeClr>
+            </a:solidFill>
+            <a:ln>
+              <a:solidFill>
+                <a:schemeClr val="tx1"/>
+              </a:solidFill>
+            </a:ln>
+          </p:spPr>
+          <p:style>
+            <a:lnRef idx="2">
+              <a:schemeClr val="accent1">
+                <a:shade val="50000"/>
+              </a:schemeClr>
+            </a:lnRef>
+            <a:fillRef idx="1">
+              <a:schemeClr val="accent1"/>
+            </a:fillRef>
+            <a:effectRef idx="0">
+              <a:schemeClr val="accent1"/>
+            </a:effectRef>
+            <a:fontRef idx="minor">
+              <a:schemeClr val="lt1"/>
+            </a:fontRef>
+          </p:style>
+          <p:txBody>
+            <a:bodyPr rot="0" spcFirstLastPara="0" vertOverflow="overflow" horzOverflow="overflow" vert="horz" wrap="none" lIns="79248" tIns="39624" rIns="79248" bIns="39624" numCol="1" spcCol="0" rtlCol="0" fromWordArt="0" anchor="ctr" anchorCtr="0" forceAA="0" compatLnSpc="1">
+              <a:prstTxWarp prst="textNoShape">
+                <a:avLst/>
+              </a:prstTxWarp>
+              <a:noAutofit/>
+            </a:bodyPr>
+            <a:lstStyle/>
+            <a:p>
+              <a:pPr algn="ctr"/>
+              <a:r>
+                <a:rPr lang="en-US" sz="1600" dirty="0">
                   <a:solidFill>
                     <a:schemeClr val="tx1"/>
                   </a:solidFill>
-                </a:ln>
-              </p:spPr>
-              <p:style>
-                <a:lnRef idx="2">
-                  <a:schemeClr val="accent1">
-                    <a:shade val="50000"/>
-                  </a:schemeClr>
-                </a:lnRef>
-                <a:fillRef idx="1">
-                  <a:schemeClr val="accent1"/>
-                </a:fillRef>
-                <a:effectRef idx="0">
-                  <a:schemeClr val="accent1"/>
-                </a:effectRef>
-                <a:fontRef idx="minor">
-                  <a:schemeClr val="lt1"/>
-                </a:fontRef>
-              </p:style>
-              <p:txBody>
-                <a:bodyPr rot="0" spcFirstLastPara="0" vertOverflow="overflow" horzOverflow="overflow" vert="horz" wrap="none" lIns="79248" tIns="39624" rIns="79248" bIns="39624" numCol="1" spcCol="0" rtlCol="0" fromWordArt="0" anchor="ctr" anchorCtr="0" forceAA="0" compatLnSpc="1">
-                  <a:prstTxWarp prst="textNoShape">
-                    <a:avLst/>
-                  </a:prstTxWarp>
-                  <a:noAutofit/>
-                </a:bodyPr>
-                <a:lstStyle/>
-                <a:p>
-                  <a:pPr algn="ctr"/>
-                  <a:r>
-                    <a:rPr lang="en-US" sz="1600" dirty="0">
-                      <a:solidFill>
-                        <a:schemeClr val="tx1"/>
-                      </a:solidFill>
-                      <a:latin typeface="Times New Roman" panose="02020603050405020304" pitchFamily="18" charset="0"/>
-                      <a:cs typeface="Times New Roman" panose="02020603050405020304" pitchFamily="18" charset="0"/>
-                    </a:rPr>
-                    <a:t>Habitat</a:t>
-                  </a:r>
-                </a:p>
-                <a:p>
-                  <a:pPr algn="ctr"/>
-                  <a:r>
-                    <a:rPr lang="en-US" sz="1600" dirty="0">
-                      <a:solidFill>
-                        <a:schemeClr val="tx1"/>
-                      </a:solidFill>
-                      <a:latin typeface="Times New Roman" panose="02020603050405020304" pitchFamily="18" charset="0"/>
-                      <a:cs typeface="Times New Roman" panose="02020603050405020304" pitchFamily="18" charset="0"/>
-                    </a:rPr>
-                    <a:t>Protection</a:t>
-                  </a:r>
-                </a:p>
-              </p:txBody>
-            </p:sp>
-            <p:sp>
-              <p:nvSpPr>
-                <p:cNvPr id="124" name="Oval 123">
-                  <a:extLst>
-                    <a:ext uri="{FF2B5EF4-FFF2-40B4-BE49-F238E27FC236}">
-                      <a16:creationId xmlns:a16="http://schemas.microsoft.com/office/drawing/2014/main" id="{CE90010E-3898-4827-8E77-FF588403C58D}"/>
-                    </a:ext>
-                  </a:extLst>
-                </p:cNvPr>
-                <p:cNvSpPr/>
-                <p:nvPr/>
-              </p:nvSpPr>
-              <p:spPr>
-                <a:xfrm>
-                  <a:off x="3367025" y="5535753"/>
-                  <a:ext cx="1840230" cy="914400"/>
-                </a:xfrm>
-                <a:prstGeom prst="ellipse">
-                  <a:avLst/>
-                </a:prstGeom>
-                <a:solidFill>
-                  <a:schemeClr val="accent6">
-                    <a:lumMod val="60000"/>
-                    <a:lumOff val="40000"/>
-                  </a:schemeClr>
-                </a:solidFill>
-                <a:ln>
+                  <a:latin typeface="Times New Roman" panose="02020603050405020304" pitchFamily="18" charset="0"/>
+                  <a:cs typeface="Times New Roman" panose="02020603050405020304" pitchFamily="18" charset="0"/>
+                </a:rPr>
+                <a:t>Non-point </a:t>
+              </a:r>
+            </a:p>
+            <a:p>
+              <a:pPr algn="ctr"/>
+              <a:r>
+                <a:rPr lang="en-US" sz="1600" dirty="0">
                   <a:solidFill>
                     <a:schemeClr val="tx1"/>
                   </a:solidFill>
-                </a:ln>
-              </p:spPr>
-              <p:style>
-                <a:lnRef idx="2">
-                  <a:schemeClr val="accent1">
-                    <a:shade val="50000"/>
-                  </a:schemeClr>
-                </a:lnRef>
-                <a:fillRef idx="1">
-                  <a:schemeClr val="accent1"/>
-                </a:fillRef>
-                <a:effectRef idx="0">
-                  <a:schemeClr val="accent1"/>
-                </a:effectRef>
-                <a:fontRef idx="minor">
-                  <a:schemeClr val="lt1"/>
-                </a:fontRef>
-              </p:style>
-              <p:txBody>
-                <a:bodyPr rot="0" spcFirstLastPara="0" vertOverflow="overflow" horzOverflow="overflow" vert="horz" wrap="none" lIns="79248" tIns="39624" rIns="79248" bIns="39624" numCol="1" spcCol="0" rtlCol="0" fromWordArt="0" anchor="ctr" anchorCtr="0" forceAA="0" compatLnSpc="1">
-                  <a:prstTxWarp prst="textNoShape">
-                    <a:avLst/>
-                  </a:prstTxWarp>
-                  <a:noAutofit/>
-                </a:bodyPr>
-                <a:lstStyle/>
-                <a:p>
-                  <a:pPr algn="ctr"/>
-                  <a:r>
-                    <a:rPr lang="en-US" sz="1600" dirty="0">
-                      <a:solidFill>
-                        <a:schemeClr val="tx1"/>
-                      </a:solidFill>
-                      <a:latin typeface="Times New Roman" panose="02020603050405020304" pitchFamily="18" charset="0"/>
-                      <a:cs typeface="Times New Roman" panose="02020603050405020304" pitchFamily="18" charset="0"/>
-                    </a:rPr>
-                    <a:t>Salinity</a:t>
-                  </a:r>
-                </a:p>
-              </p:txBody>
-            </p:sp>
-            <p:sp>
-              <p:nvSpPr>
-                <p:cNvPr id="125" name="Oval 124">
-                  <a:extLst>
-                    <a:ext uri="{FF2B5EF4-FFF2-40B4-BE49-F238E27FC236}">
-                      <a16:creationId xmlns:a16="http://schemas.microsoft.com/office/drawing/2014/main" id="{D4761E88-9FD1-4EB8-ADAE-BDA842156369}"/>
-                    </a:ext>
-                  </a:extLst>
-                </p:cNvPr>
-                <p:cNvSpPr/>
-                <p:nvPr/>
-              </p:nvSpPr>
-              <p:spPr>
-                <a:xfrm>
-                  <a:off x="8582886" y="5512716"/>
-                  <a:ext cx="1840230" cy="914400"/>
-                </a:xfrm>
-                <a:prstGeom prst="ellipse">
-                  <a:avLst/>
-                </a:prstGeom>
-                <a:solidFill>
-                  <a:schemeClr val="accent6">
-                    <a:lumMod val="60000"/>
-                    <a:lumOff val="40000"/>
-                  </a:schemeClr>
-                </a:solidFill>
-                <a:ln>
+                  <a:latin typeface="Times New Roman" panose="02020603050405020304" pitchFamily="18" charset="0"/>
+                  <a:cs typeface="Times New Roman" panose="02020603050405020304" pitchFamily="18" charset="0"/>
+                </a:rPr>
+                <a:t>Source Control</a:t>
+              </a:r>
+            </a:p>
+          </p:txBody>
+        </p:sp>
+        <p:sp>
+          <p:nvSpPr>
+            <p:cNvPr id="122" name="Oval 121">
+              <a:extLst>
+                <a:ext uri="{FF2B5EF4-FFF2-40B4-BE49-F238E27FC236}">
+                  <a16:creationId xmlns:a16="http://schemas.microsoft.com/office/drawing/2014/main" id="{8727A2BA-0CDE-4251-B49F-56503BD65A33}"/>
+                </a:ext>
+              </a:extLst>
+            </p:cNvPr>
+            <p:cNvSpPr/>
+            <p:nvPr/>
+          </p:nvSpPr>
+          <p:spPr>
+            <a:xfrm>
+              <a:off x="390910" y="2780003"/>
+              <a:ext cx="1594866" cy="792480"/>
+            </a:xfrm>
+            <a:prstGeom prst="ellipse">
+              <a:avLst/>
+            </a:prstGeom>
+            <a:solidFill>
+              <a:schemeClr val="accent4">
+                <a:lumMod val="60000"/>
+                <a:lumOff val="40000"/>
+              </a:schemeClr>
+            </a:solidFill>
+            <a:ln>
+              <a:solidFill>
+                <a:schemeClr val="tx1"/>
+              </a:solidFill>
+            </a:ln>
+          </p:spPr>
+          <p:style>
+            <a:lnRef idx="2">
+              <a:schemeClr val="accent1">
+                <a:shade val="50000"/>
+              </a:schemeClr>
+            </a:lnRef>
+            <a:fillRef idx="1">
+              <a:schemeClr val="accent1"/>
+            </a:fillRef>
+            <a:effectRef idx="0">
+              <a:schemeClr val="accent1"/>
+            </a:effectRef>
+            <a:fontRef idx="minor">
+              <a:schemeClr val="lt1"/>
+            </a:fontRef>
+          </p:style>
+          <p:txBody>
+            <a:bodyPr rot="0" spcFirstLastPara="0" vertOverflow="overflow" horzOverflow="overflow" vert="horz" wrap="none" lIns="79248" tIns="39624" rIns="79248" bIns="39624" numCol="1" spcCol="0" rtlCol="0" fromWordArt="0" anchor="ctr" anchorCtr="0" forceAA="0" compatLnSpc="1">
+              <a:prstTxWarp prst="textNoShape">
+                <a:avLst/>
+              </a:prstTxWarp>
+              <a:noAutofit/>
+            </a:bodyPr>
+            <a:lstStyle/>
+            <a:p>
+              <a:pPr algn="ctr"/>
+              <a:r>
+                <a:rPr lang="en-US" sz="1600" dirty="0">
                   <a:solidFill>
                     <a:schemeClr val="tx1"/>
                   </a:solidFill>
-                </a:ln>
-              </p:spPr>
-              <p:style>
-                <a:lnRef idx="2">
-                  <a:schemeClr val="accent1">
-                    <a:shade val="50000"/>
-                  </a:schemeClr>
-                </a:lnRef>
-                <a:fillRef idx="1">
-                  <a:schemeClr val="accent1"/>
-                </a:fillRef>
-                <a:effectRef idx="0">
-                  <a:schemeClr val="accent1"/>
-                </a:effectRef>
-                <a:fontRef idx="minor">
-                  <a:schemeClr val="lt1"/>
-                </a:fontRef>
-              </p:style>
-              <p:txBody>
-                <a:bodyPr rot="0" spcFirstLastPara="0" vertOverflow="overflow" horzOverflow="overflow" vert="horz" wrap="none" lIns="79248" tIns="39624" rIns="79248" bIns="39624" numCol="1" spcCol="0" rtlCol="0" fromWordArt="0" anchor="ctr" anchorCtr="0" forceAA="0" compatLnSpc="1">
-                  <a:prstTxWarp prst="textNoShape">
-                    <a:avLst/>
-                  </a:prstTxWarp>
-                  <a:noAutofit/>
-                </a:bodyPr>
-                <a:lstStyle/>
-                <a:p>
-                  <a:pPr algn="ctr"/>
-                  <a:r>
-                    <a:rPr lang="en-US" sz="1600" dirty="0">
-                      <a:solidFill>
-                        <a:schemeClr val="tx1"/>
-                      </a:solidFill>
-                      <a:latin typeface="Times New Roman" panose="02020603050405020304" pitchFamily="18" charset="0"/>
-                      <a:cs typeface="Times New Roman" panose="02020603050405020304" pitchFamily="18" charset="0"/>
-                    </a:rPr>
-                    <a:t>Nitrogen</a:t>
-                  </a:r>
-                </a:p>
-              </p:txBody>
-            </p:sp>
-            <p:sp>
-              <p:nvSpPr>
-                <p:cNvPr id="126" name="Oval 125">
-                  <a:extLst>
-                    <a:ext uri="{FF2B5EF4-FFF2-40B4-BE49-F238E27FC236}">
-                      <a16:creationId xmlns:a16="http://schemas.microsoft.com/office/drawing/2014/main" id="{5C39879A-023F-4303-95ED-2AFE6C8A2E1A}"/>
-                    </a:ext>
-                  </a:extLst>
-                </p:cNvPr>
-                <p:cNvSpPr/>
-                <p:nvPr/>
-              </p:nvSpPr>
-              <p:spPr>
-                <a:xfrm>
-                  <a:off x="8582886" y="6933492"/>
-                  <a:ext cx="1840230" cy="914400"/>
-                </a:xfrm>
-                <a:prstGeom prst="ellipse">
-                  <a:avLst/>
-                </a:prstGeom>
-                <a:solidFill>
-                  <a:schemeClr val="accent1">
-                    <a:lumMod val="60000"/>
-                    <a:lumOff val="40000"/>
-                  </a:schemeClr>
-                </a:solidFill>
-                <a:ln>
+                  <a:latin typeface="Times New Roman" panose="02020603050405020304" pitchFamily="18" charset="0"/>
+                  <a:cs typeface="Times New Roman" panose="02020603050405020304" pitchFamily="18" charset="0"/>
+                </a:rPr>
+                <a:t>Point </a:t>
+              </a:r>
+            </a:p>
+            <a:p>
+              <a:pPr algn="ctr"/>
+              <a:r>
+                <a:rPr lang="en-US" sz="1600" dirty="0">
                   <a:solidFill>
                     <a:schemeClr val="tx1"/>
                   </a:solidFill>
-                </a:ln>
-              </p:spPr>
-              <p:style>
-                <a:lnRef idx="2">
-                  <a:schemeClr val="accent1">
-                    <a:shade val="50000"/>
-                  </a:schemeClr>
-                </a:lnRef>
-                <a:fillRef idx="1">
-                  <a:schemeClr val="accent1"/>
-                </a:fillRef>
-                <a:effectRef idx="0">
-                  <a:schemeClr val="accent1"/>
-                </a:effectRef>
-                <a:fontRef idx="minor">
-                  <a:schemeClr val="lt1"/>
-                </a:fontRef>
-              </p:style>
-              <p:txBody>
-                <a:bodyPr rot="0" spcFirstLastPara="0" vertOverflow="overflow" horzOverflow="overflow" vert="horz" wrap="none" lIns="79248" tIns="39624" rIns="79248" bIns="39624" numCol="1" spcCol="0" rtlCol="0" fromWordArt="0" anchor="ctr" anchorCtr="0" forceAA="0" compatLnSpc="1">
-                  <a:prstTxWarp prst="textNoShape">
-                    <a:avLst/>
-                  </a:prstTxWarp>
-                  <a:noAutofit/>
-                </a:bodyPr>
-                <a:lstStyle/>
-                <a:p>
-                  <a:pPr algn="ctr"/>
-                  <a:r>
-                    <a:rPr lang="en-US" sz="1600" dirty="0">
-                      <a:solidFill>
-                        <a:schemeClr val="tx1"/>
-                      </a:solidFill>
-                      <a:latin typeface="Times New Roman" panose="02020603050405020304" pitchFamily="18" charset="0"/>
-                      <a:cs typeface="Times New Roman" panose="02020603050405020304" pitchFamily="18" charset="0"/>
-                    </a:rPr>
-                    <a:t>Chlorophyll</a:t>
-                  </a:r>
-                </a:p>
-              </p:txBody>
-            </p:sp>
-            <p:cxnSp>
-              <p:nvCxnSpPr>
-                <p:cNvPr id="127" name="Straight Connector 126">
-                  <a:extLst>
-                    <a:ext uri="{FF2B5EF4-FFF2-40B4-BE49-F238E27FC236}">
-                      <a16:creationId xmlns:a16="http://schemas.microsoft.com/office/drawing/2014/main" id="{92247DAB-5AE8-4E7D-877A-821A09935F2A}"/>
-                    </a:ext>
-                  </a:extLst>
-                </p:cNvPr>
-                <p:cNvCxnSpPr>
-                  <a:cxnSpLocks/>
-                  <a:stCxn id="119" idx="4"/>
-                  <a:endCxn id="124" idx="0"/>
-                </p:cNvCxnSpPr>
-                <p:nvPr/>
-              </p:nvCxnSpPr>
-              <p:spPr>
-                <a:xfrm>
-                  <a:off x="4287140" y="2560675"/>
-                  <a:ext cx="0" cy="2975078"/>
-                </a:xfrm>
-                <a:prstGeom prst="line">
-                  <a:avLst/>
-                </a:prstGeom>
-                <a:ln>
+                  <a:latin typeface="Times New Roman" panose="02020603050405020304" pitchFamily="18" charset="0"/>
+                  <a:cs typeface="Times New Roman" panose="02020603050405020304" pitchFamily="18" charset="0"/>
+                </a:rPr>
+                <a:t>Source Control</a:t>
+              </a:r>
+            </a:p>
+          </p:txBody>
+        </p:sp>
+        <p:sp>
+          <p:nvSpPr>
+            <p:cNvPr id="123" name="Oval 122">
+              <a:extLst>
+                <a:ext uri="{FF2B5EF4-FFF2-40B4-BE49-F238E27FC236}">
+                  <a16:creationId xmlns:a16="http://schemas.microsoft.com/office/drawing/2014/main" id="{F9385417-28E1-472F-A97E-B6106853B5E8}"/>
+                </a:ext>
+              </a:extLst>
+            </p:cNvPr>
+            <p:cNvSpPr/>
+            <p:nvPr/>
+          </p:nvSpPr>
+          <p:spPr>
+            <a:xfrm>
+              <a:off x="7207593" y="639731"/>
+              <a:ext cx="1594866" cy="792480"/>
+            </a:xfrm>
+            <a:prstGeom prst="ellipse">
+              <a:avLst/>
+            </a:prstGeom>
+            <a:solidFill>
+              <a:schemeClr val="accent2">
+                <a:lumMod val="60000"/>
+                <a:lumOff val="40000"/>
+              </a:schemeClr>
+            </a:solidFill>
+            <a:ln>
+              <a:solidFill>
+                <a:schemeClr val="tx1"/>
+              </a:solidFill>
+            </a:ln>
+          </p:spPr>
+          <p:style>
+            <a:lnRef idx="2">
+              <a:schemeClr val="accent1">
+                <a:shade val="50000"/>
+              </a:schemeClr>
+            </a:lnRef>
+            <a:fillRef idx="1">
+              <a:schemeClr val="accent1"/>
+            </a:fillRef>
+            <a:effectRef idx="0">
+              <a:schemeClr val="accent1"/>
+            </a:effectRef>
+            <a:fontRef idx="minor">
+              <a:schemeClr val="lt1"/>
+            </a:fontRef>
+          </p:style>
+          <p:txBody>
+            <a:bodyPr rot="0" spcFirstLastPara="0" vertOverflow="overflow" horzOverflow="overflow" vert="horz" wrap="none" lIns="79248" tIns="39624" rIns="79248" bIns="39624" numCol="1" spcCol="0" rtlCol="0" fromWordArt="0" anchor="ctr" anchorCtr="0" forceAA="0" compatLnSpc="1">
+              <a:prstTxWarp prst="textNoShape">
+                <a:avLst/>
+              </a:prstTxWarp>
+              <a:noAutofit/>
+            </a:bodyPr>
+            <a:lstStyle/>
+            <a:p>
+              <a:pPr algn="ctr"/>
+              <a:r>
+                <a:rPr lang="en-US" sz="1600" dirty="0">
                   <a:solidFill>
                     <a:schemeClr val="tx1"/>
                   </a:solidFill>
-                </a:ln>
-              </p:spPr>
-              <p:style>
-                <a:lnRef idx="1">
-                  <a:schemeClr val="accent1"/>
-                </a:lnRef>
-                <a:fillRef idx="0">
-                  <a:schemeClr val="accent1"/>
-                </a:fillRef>
-                <a:effectRef idx="0">
-                  <a:schemeClr val="accent1"/>
-                </a:effectRef>
-                <a:fontRef idx="minor">
-                  <a:schemeClr val="tx1"/>
-                </a:fontRef>
-              </p:style>
-            </p:cxnSp>
-            <p:cxnSp>
-              <p:nvCxnSpPr>
-                <p:cNvPr id="128" name="Straight Connector 127">
-                  <a:extLst>
-                    <a:ext uri="{FF2B5EF4-FFF2-40B4-BE49-F238E27FC236}">
-                      <a16:creationId xmlns:a16="http://schemas.microsoft.com/office/drawing/2014/main" id="{6D52B0BE-6522-487C-BAEF-449F0D3D31D4}"/>
-                    </a:ext>
-                  </a:extLst>
-                </p:cNvPr>
-                <p:cNvCxnSpPr>
-                  <a:cxnSpLocks/>
-                  <a:stCxn id="121" idx="6"/>
-                  <a:endCxn id="124" idx="0"/>
-                </p:cNvCxnSpPr>
-                <p:nvPr/>
-              </p:nvCxnSpPr>
-              <p:spPr>
-                <a:xfrm>
-                  <a:off x="2557713" y="3016856"/>
-                  <a:ext cx="1729427" cy="2518897"/>
-                </a:xfrm>
-                <a:prstGeom prst="line">
-                  <a:avLst/>
-                </a:prstGeom>
-                <a:ln>
+                  <a:latin typeface="Times New Roman" panose="02020603050405020304" pitchFamily="18" charset="0"/>
+                  <a:cs typeface="Times New Roman" panose="02020603050405020304" pitchFamily="18" charset="0"/>
+                </a:rPr>
+                <a:t>Habitat</a:t>
+              </a:r>
+            </a:p>
+            <a:p>
+              <a:pPr algn="ctr"/>
+              <a:r>
+                <a:rPr lang="en-US" sz="1600" dirty="0">
                   <a:solidFill>
                     <a:schemeClr val="tx1"/>
                   </a:solidFill>
-                </a:ln>
-              </p:spPr>
-              <p:style>
-                <a:lnRef idx="1">
-                  <a:schemeClr val="accent1"/>
-                </a:lnRef>
-                <a:fillRef idx="0">
-                  <a:schemeClr val="accent1"/>
-                </a:fillRef>
-                <a:effectRef idx="0">
-                  <a:schemeClr val="accent1"/>
-                </a:effectRef>
-                <a:fontRef idx="minor">
-                  <a:schemeClr val="tx1"/>
-                </a:fontRef>
-              </p:style>
-            </p:cxnSp>
-            <p:cxnSp>
-              <p:nvCxnSpPr>
-                <p:cNvPr id="129" name="Straight Connector 128">
-                  <a:extLst>
-                    <a:ext uri="{FF2B5EF4-FFF2-40B4-BE49-F238E27FC236}">
-                      <a16:creationId xmlns:a16="http://schemas.microsoft.com/office/drawing/2014/main" id="{0946165E-4FD0-4ABE-9F31-E13AF2601C78}"/>
-                    </a:ext>
-                  </a:extLst>
-                </p:cNvPr>
-                <p:cNvCxnSpPr>
-                  <a:cxnSpLocks/>
-                  <a:stCxn id="122" idx="6"/>
-                  <a:endCxn id="124" idx="0"/>
-                </p:cNvCxnSpPr>
-                <p:nvPr/>
-              </p:nvCxnSpPr>
-              <p:spPr>
-                <a:xfrm>
-                  <a:off x="2557713" y="4572000"/>
-                  <a:ext cx="1729427" cy="963753"/>
-                </a:xfrm>
-                <a:prstGeom prst="line">
-                  <a:avLst/>
-                </a:prstGeom>
-                <a:ln>
+                  <a:latin typeface="Times New Roman" panose="02020603050405020304" pitchFamily="18" charset="0"/>
+                  <a:cs typeface="Times New Roman" panose="02020603050405020304" pitchFamily="18" charset="0"/>
+                </a:rPr>
+                <a:t>Protection</a:t>
+              </a:r>
+            </a:p>
+          </p:txBody>
+        </p:sp>
+        <p:sp>
+          <p:nvSpPr>
+            <p:cNvPr id="124" name="Oval 123">
+              <a:extLst>
+                <a:ext uri="{FF2B5EF4-FFF2-40B4-BE49-F238E27FC236}">
+                  <a16:creationId xmlns:a16="http://schemas.microsoft.com/office/drawing/2014/main" id="{CE90010E-3898-4827-8E77-FF588403C58D}"/>
+                </a:ext>
+              </a:extLst>
+            </p:cNvPr>
+            <p:cNvSpPr/>
+            <p:nvPr/>
+          </p:nvSpPr>
+          <p:spPr>
+            <a:xfrm>
+              <a:off x="2687180" y="4011495"/>
+              <a:ext cx="1594866" cy="792480"/>
+            </a:xfrm>
+            <a:prstGeom prst="ellipse">
+              <a:avLst/>
+            </a:prstGeom>
+            <a:solidFill>
+              <a:schemeClr val="accent6">
+                <a:lumMod val="60000"/>
+                <a:lumOff val="40000"/>
+              </a:schemeClr>
+            </a:solidFill>
+            <a:ln>
+              <a:solidFill>
+                <a:schemeClr val="tx1"/>
+              </a:solidFill>
+            </a:ln>
+          </p:spPr>
+          <p:style>
+            <a:lnRef idx="2">
+              <a:schemeClr val="accent1">
+                <a:shade val="50000"/>
+              </a:schemeClr>
+            </a:lnRef>
+            <a:fillRef idx="1">
+              <a:schemeClr val="accent1"/>
+            </a:fillRef>
+            <a:effectRef idx="0">
+              <a:schemeClr val="accent1"/>
+            </a:effectRef>
+            <a:fontRef idx="minor">
+              <a:schemeClr val="lt1"/>
+            </a:fontRef>
+          </p:style>
+          <p:txBody>
+            <a:bodyPr rot="0" spcFirstLastPara="0" vertOverflow="overflow" horzOverflow="overflow" vert="horz" wrap="none" lIns="79248" tIns="39624" rIns="79248" bIns="39624" numCol="1" spcCol="0" rtlCol="0" fromWordArt="0" anchor="ctr" anchorCtr="0" forceAA="0" compatLnSpc="1">
+              <a:prstTxWarp prst="textNoShape">
+                <a:avLst/>
+              </a:prstTxWarp>
+              <a:noAutofit/>
+            </a:bodyPr>
+            <a:lstStyle/>
+            <a:p>
+              <a:pPr algn="ctr"/>
+              <a:r>
+                <a:rPr lang="en-US" sz="1600" dirty="0">
                   <a:solidFill>
                     <a:schemeClr val="tx1"/>
                   </a:solidFill>
-                </a:ln>
-              </p:spPr>
-              <p:style>
-                <a:lnRef idx="1">
-                  <a:schemeClr val="accent1"/>
-                </a:lnRef>
-                <a:fillRef idx="0">
-                  <a:schemeClr val="accent1"/>
-                </a:fillRef>
-                <a:effectRef idx="0">
-                  <a:schemeClr val="accent1"/>
-                </a:effectRef>
-                <a:fontRef idx="minor">
-                  <a:schemeClr val="tx1"/>
-                </a:fontRef>
-              </p:style>
-            </p:cxnSp>
-            <p:cxnSp>
-              <p:nvCxnSpPr>
-                <p:cNvPr id="130" name="Straight Connector 129">
-                  <a:extLst>
-                    <a:ext uri="{FF2B5EF4-FFF2-40B4-BE49-F238E27FC236}">
-                      <a16:creationId xmlns:a16="http://schemas.microsoft.com/office/drawing/2014/main" id="{F59A18B8-7CCC-4781-95C8-36CEE54C9535}"/>
-                    </a:ext>
-                  </a:extLst>
-                </p:cNvPr>
-                <p:cNvCxnSpPr>
-                  <a:cxnSpLocks/>
-                  <a:stCxn id="120" idx="4"/>
-                  <a:endCxn id="124" idx="0"/>
-                </p:cNvCxnSpPr>
-                <p:nvPr/>
-              </p:nvCxnSpPr>
-              <p:spPr>
-                <a:xfrm flipH="1">
-                  <a:off x="4287140" y="2560675"/>
-                  <a:ext cx="2566986" cy="2975078"/>
-                </a:xfrm>
-                <a:prstGeom prst="line">
-                  <a:avLst/>
-                </a:prstGeom>
-                <a:ln>
+                  <a:latin typeface="Times New Roman" panose="02020603050405020304" pitchFamily="18" charset="0"/>
+                  <a:cs typeface="Times New Roman" panose="02020603050405020304" pitchFamily="18" charset="0"/>
+                </a:rPr>
+                <a:t>Salinity</a:t>
+              </a:r>
+            </a:p>
+          </p:txBody>
+        </p:sp>
+        <p:sp>
+          <p:nvSpPr>
+            <p:cNvPr id="125" name="Oval 124">
+              <a:extLst>
+                <a:ext uri="{FF2B5EF4-FFF2-40B4-BE49-F238E27FC236}">
+                  <a16:creationId xmlns:a16="http://schemas.microsoft.com/office/drawing/2014/main" id="{D4761E88-9FD1-4EB8-ADAE-BDA842156369}"/>
+                </a:ext>
+              </a:extLst>
+            </p:cNvPr>
+            <p:cNvSpPr/>
+            <p:nvPr/>
+          </p:nvSpPr>
+          <p:spPr>
+            <a:xfrm>
+              <a:off x="7207593" y="3991530"/>
+              <a:ext cx="1594866" cy="792480"/>
+            </a:xfrm>
+            <a:prstGeom prst="ellipse">
+              <a:avLst/>
+            </a:prstGeom>
+            <a:solidFill>
+              <a:schemeClr val="accent6">
+                <a:lumMod val="60000"/>
+                <a:lumOff val="40000"/>
+              </a:schemeClr>
+            </a:solidFill>
+            <a:ln>
+              <a:solidFill>
+                <a:schemeClr val="tx1"/>
+              </a:solidFill>
+            </a:ln>
+          </p:spPr>
+          <p:style>
+            <a:lnRef idx="2">
+              <a:schemeClr val="accent1">
+                <a:shade val="50000"/>
+              </a:schemeClr>
+            </a:lnRef>
+            <a:fillRef idx="1">
+              <a:schemeClr val="accent1"/>
+            </a:fillRef>
+            <a:effectRef idx="0">
+              <a:schemeClr val="accent1"/>
+            </a:effectRef>
+            <a:fontRef idx="minor">
+              <a:schemeClr val="lt1"/>
+            </a:fontRef>
+          </p:style>
+          <p:txBody>
+            <a:bodyPr rot="0" spcFirstLastPara="0" vertOverflow="overflow" horzOverflow="overflow" vert="horz" wrap="none" lIns="79248" tIns="39624" rIns="79248" bIns="39624" numCol="1" spcCol="0" rtlCol="0" fromWordArt="0" anchor="ctr" anchorCtr="0" forceAA="0" compatLnSpc="1">
+              <a:prstTxWarp prst="textNoShape">
+                <a:avLst/>
+              </a:prstTxWarp>
+              <a:noAutofit/>
+            </a:bodyPr>
+            <a:lstStyle/>
+            <a:p>
+              <a:pPr algn="ctr"/>
+              <a:r>
+                <a:rPr lang="en-US" sz="1600" dirty="0">
                   <a:solidFill>
                     <a:schemeClr val="tx1"/>
                   </a:solidFill>
-                </a:ln>
-              </p:spPr>
-              <p:style>
-                <a:lnRef idx="1">
-                  <a:schemeClr val="accent1"/>
-                </a:lnRef>
-                <a:fillRef idx="0">
-                  <a:schemeClr val="accent1"/>
-                </a:fillRef>
-                <a:effectRef idx="0">
-                  <a:schemeClr val="accent1"/>
-                </a:effectRef>
-                <a:fontRef idx="minor">
-                  <a:schemeClr val="tx1"/>
-                </a:fontRef>
-              </p:style>
-            </p:cxnSp>
-            <p:cxnSp>
-              <p:nvCxnSpPr>
-                <p:cNvPr id="131" name="Straight Connector 130">
-                  <a:extLst>
-                    <a:ext uri="{FF2B5EF4-FFF2-40B4-BE49-F238E27FC236}">
-                      <a16:creationId xmlns:a16="http://schemas.microsoft.com/office/drawing/2014/main" id="{2872652D-EF56-44E7-9D43-0621AA1FB3D2}"/>
-                    </a:ext>
-                  </a:extLst>
-                </p:cNvPr>
-                <p:cNvCxnSpPr>
-                  <a:cxnSpLocks/>
-                  <a:stCxn id="123" idx="4"/>
-                  <a:endCxn id="125" idx="0"/>
-                </p:cNvCxnSpPr>
-                <p:nvPr/>
-              </p:nvCxnSpPr>
-              <p:spPr>
-                <a:xfrm>
-                  <a:off x="9503001" y="2559656"/>
-                  <a:ext cx="0" cy="2953060"/>
-                </a:xfrm>
-                <a:prstGeom prst="line">
-                  <a:avLst/>
-                </a:prstGeom>
-                <a:ln>
+                  <a:latin typeface="Times New Roman" panose="02020603050405020304" pitchFamily="18" charset="0"/>
+                  <a:cs typeface="Times New Roman" panose="02020603050405020304" pitchFamily="18" charset="0"/>
+                </a:rPr>
+                <a:t>Nitrogen</a:t>
+              </a:r>
+            </a:p>
+          </p:txBody>
+        </p:sp>
+        <p:sp>
+          <p:nvSpPr>
+            <p:cNvPr id="126" name="Oval 125">
+              <a:extLst>
+                <a:ext uri="{FF2B5EF4-FFF2-40B4-BE49-F238E27FC236}">
+                  <a16:creationId xmlns:a16="http://schemas.microsoft.com/office/drawing/2014/main" id="{5C39879A-023F-4303-95ED-2AFE6C8A2E1A}"/>
+                </a:ext>
+              </a:extLst>
+            </p:cNvPr>
+            <p:cNvSpPr/>
+            <p:nvPr/>
+          </p:nvSpPr>
+          <p:spPr>
+            <a:xfrm>
+              <a:off x="7207593" y="5222869"/>
+              <a:ext cx="1594866" cy="792480"/>
+            </a:xfrm>
+            <a:prstGeom prst="ellipse">
+              <a:avLst/>
+            </a:prstGeom>
+            <a:solidFill>
+              <a:schemeClr val="accent1">
+                <a:lumMod val="60000"/>
+                <a:lumOff val="40000"/>
+              </a:schemeClr>
+            </a:solidFill>
+            <a:ln>
+              <a:solidFill>
+                <a:schemeClr val="tx1"/>
+              </a:solidFill>
+            </a:ln>
+          </p:spPr>
+          <p:style>
+            <a:lnRef idx="2">
+              <a:schemeClr val="accent1">
+                <a:shade val="50000"/>
+              </a:schemeClr>
+            </a:lnRef>
+            <a:fillRef idx="1">
+              <a:schemeClr val="accent1"/>
+            </a:fillRef>
+            <a:effectRef idx="0">
+              <a:schemeClr val="accent1"/>
+            </a:effectRef>
+            <a:fontRef idx="minor">
+              <a:schemeClr val="lt1"/>
+            </a:fontRef>
+          </p:style>
+          <p:txBody>
+            <a:bodyPr rot="0" spcFirstLastPara="0" vertOverflow="overflow" horzOverflow="overflow" vert="horz" wrap="none" lIns="79248" tIns="39624" rIns="79248" bIns="39624" numCol="1" spcCol="0" rtlCol="0" fromWordArt="0" anchor="ctr" anchorCtr="0" forceAA="0" compatLnSpc="1">
+              <a:prstTxWarp prst="textNoShape">
+                <a:avLst/>
+              </a:prstTxWarp>
+              <a:noAutofit/>
+            </a:bodyPr>
+            <a:lstStyle/>
+            <a:p>
+              <a:pPr algn="ctr"/>
+              <a:r>
+                <a:rPr lang="en-US" sz="1600" dirty="0">
                   <a:solidFill>
                     <a:schemeClr val="tx1"/>
                   </a:solidFill>
-                </a:ln>
-              </p:spPr>
-              <p:style>
-                <a:lnRef idx="1">
-                  <a:schemeClr val="accent1"/>
-                </a:lnRef>
-                <a:fillRef idx="0">
-                  <a:schemeClr val="accent1"/>
-                </a:fillRef>
-                <a:effectRef idx="0">
-                  <a:schemeClr val="accent1"/>
-                </a:effectRef>
-                <a:fontRef idx="minor">
-                  <a:schemeClr val="tx1"/>
-                </a:fontRef>
-              </p:style>
-            </p:cxnSp>
-            <p:cxnSp>
-              <p:nvCxnSpPr>
-                <p:cNvPr id="132" name="Straight Connector 131">
-                  <a:extLst>
-                    <a:ext uri="{FF2B5EF4-FFF2-40B4-BE49-F238E27FC236}">
-                      <a16:creationId xmlns:a16="http://schemas.microsoft.com/office/drawing/2014/main" id="{9EBA8DB4-20C8-49E3-8934-07DB54E03648}"/>
-                    </a:ext>
-                  </a:extLst>
-                </p:cNvPr>
-                <p:cNvCxnSpPr>
-                  <a:cxnSpLocks/>
-                  <a:stCxn id="123" idx="4"/>
-                  <a:endCxn id="124" idx="0"/>
-                </p:cNvCxnSpPr>
-                <p:nvPr/>
-              </p:nvCxnSpPr>
-              <p:spPr>
-                <a:xfrm flipH="1">
-                  <a:off x="4287140" y="2559656"/>
-                  <a:ext cx="5215861" cy="2976097"/>
-                </a:xfrm>
-                <a:prstGeom prst="line">
-                  <a:avLst/>
-                </a:prstGeom>
-                <a:ln>
+                  <a:latin typeface="Times New Roman" panose="02020603050405020304" pitchFamily="18" charset="0"/>
+                  <a:cs typeface="Times New Roman" panose="02020603050405020304" pitchFamily="18" charset="0"/>
+                </a:rPr>
+                <a:t>Chlorophyll</a:t>
+              </a:r>
+            </a:p>
+          </p:txBody>
+        </p:sp>
+        <p:cxnSp>
+          <p:nvCxnSpPr>
+            <p:cNvPr id="127" name="Straight Connector 126">
+              <a:extLst>
+                <a:ext uri="{FF2B5EF4-FFF2-40B4-BE49-F238E27FC236}">
+                  <a16:creationId xmlns:a16="http://schemas.microsoft.com/office/drawing/2014/main" id="{92247DAB-5AE8-4E7D-877A-821A09935F2A}"/>
+                </a:ext>
+              </a:extLst>
+            </p:cNvPr>
+            <p:cNvCxnSpPr>
+              <a:cxnSpLocks/>
+              <a:stCxn id="119" idx="4"/>
+              <a:endCxn id="124" idx="0"/>
+            </p:cNvCxnSpPr>
+            <p:nvPr/>
+          </p:nvCxnSpPr>
+          <p:spPr>
+            <a:xfrm>
+              <a:off x="3484613" y="1433094"/>
+              <a:ext cx="0" cy="2578401"/>
+            </a:xfrm>
+            <a:prstGeom prst="line">
+              <a:avLst/>
+            </a:prstGeom>
+            <a:ln>
+              <a:solidFill>
+                <a:schemeClr val="tx1"/>
+              </a:solidFill>
+              <a:headEnd type="none"/>
+              <a:tailEnd type="arrow" w="lg" len="lg"/>
+            </a:ln>
+          </p:spPr>
+          <p:style>
+            <a:lnRef idx="1">
+              <a:schemeClr val="accent1"/>
+            </a:lnRef>
+            <a:fillRef idx="0">
+              <a:schemeClr val="accent1"/>
+            </a:fillRef>
+            <a:effectRef idx="0">
+              <a:schemeClr val="accent1"/>
+            </a:effectRef>
+            <a:fontRef idx="minor">
+              <a:schemeClr val="tx1"/>
+            </a:fontRef>
+          </p:style>
+        </p:cxnSp>
+        <p:cxnSp>
+          <p:nvCxnSpPr>
+            <p:cNvPr id="128" name="Straight Connector 127">
+              <a:extLst>
+                <a:ext uri="{FF2B5EF4-FFF2-40B4-BE49-F238E27FC236}">
+                  <a16:creationId xmlns:a16="http://schemas.microsoft.com/office/drawing/2014/main" id="{6D52B0BE-6522-487C-BAEF-449F0D3D31D4}"/>
+                </a:ext>
+              </a:extLst>
+            </p:cNvPr>
+            <p:cNvCxnSpPr>
+              <a:cxnSpLocks/>
+              <a:stCxn id="121" idx="6"/>
+            </p:cNvCxnSpPr>
+            <p:nvPr/>
+          </p:nvCxnSpPr>
+          <p:spPr>
+            <a:xfrm>
+              <a:off x="1985776" y="1828451"/>
+              <a:ext cx="1283332" cy="2182640"/>
+            </a:xfrm>
+            <a:prstGeom prst="line">
+              <a:avLst/>
+            </a:prstGeom>
+            <a:ln>
+              <a:solidFill>
+                <a:schemeClr val="tx1"/>
+              </a:solidFill>
+              <a:headEnd type="none"/>
+              <a:tailEnd type="arrow" w="lg" len="lg"/>
+            </a:ln>
+          </p:spPr>
+          <p:style>
+            <a:lnRef idx="1">
+              <a:schemeClr val="accent1"/>
+            </a:lnRef>
+            <a:fillRef idx="0">
+              <a:schemeClr val="accent1"/>
+            </a:fillRef>
+            <a:effectRef idx="0">
+              <a:schemeClr val="accent1"/>
+            </a:effectRef>
+            <a:fontRef idx="minor">
+              <a:schemeClr val="tx1"/>
+            </a:fontRef>
+          </p:style>
+        </p:cxnSp>
+        <p:cxnSp>
+          <p:nvCxnSpPr>
+            <p:cNvPr id="129" name="Straight Connector 128">
+              <a:extLst>
+                <a:ext uri="{FF2B5EF4-FFF2-40B4-BE49-F238E27FC236}">
+                  <a16:creationId xmlns:a16="http://schemas.microsoft.com/office/drawing/2014/main" id="{0946165E-4FD0-4ABE-9F31-E13AF2601C78}"/>
+                </a:ext>
+              </a:extLst>
+            </p:cNvPr>
+            <p:cNvCxnSpPr>
+              <a:cxnSpLocks/>
+              <a:stCxn id="122" idx="6"/>
+            </p:cNvCxnSpPr>
+            <p:nvPr/>
+          </p:nvCxnSpPr>
+          <p:spPr>
+            <a:xfrm>
+              <a:off x="1985776" y="3176243"/>
+              <a:ext cx="1071861" cy="892989"/>
+            </a:xfrm>
+            <a:prstGeom prst="line">
+              <a:avLst/>
+            </a:prstGeom>
+            <a:ln>
+              <a:solidFill>
+                <a:schemeClr val="tx1"/>
+              </a:solidFill>
+              <a:headEnd type="none"/>
+              <a:tailEnd type="arrow" w="lg" len="lg"/>
+            </a:ln>
+          </p:spPr>
+          <p:style>
+            <a:lnRef idx="1">
+              <a:schemeClr val="accent1"/>
+            </a:lnRef>
+            <a:fillRef idx="0">
+              <a:schemeClr val="accent1"/>
+            </a:fillRef>
+            <a:effectRef idx="0">
+              <a:schemeClr val="accent1"/>
+            </a:effectRef>
+            <a:fontRef idx="minor">
+              <a:schemeClr val="tx1"/>
+            </a:fontRef>
+          </p:style>
+        </p:cxnSp>
+        <p:cxnSp>
+          <p:nvCxnSpPr>
+            <p:cNvPr id="130" name="Straight Connector 129">
+              <a:extLst>
+                <a:ext uri="{FF2B5EF4-FFF2-40B4-BE49-F238E27FC236}">
+                  <a16:creationId xmlns:a16="http://schemas.microsoft.com/office/drawing/2014/main" id="{F59A18B8-7CCC-4781-95C8-36CEE54C9535}"/>
+                </a:ext>
+              </a:extLst>
+            </p:cNvPr>
+            <p:cNvCxnSpPr>
+              <a:cxnSpLocks/>
+              <a:stCxn id="120" idx="4"/>
+            </p:cNvCxnSpPr>
+            <p:nvPr/>
+          </p:nvCxnSpPr>
+          <p:spPr>
+            <a:xfrm flipH="1">
+              <a:off x="3671210" y="1433094"/>
+              <a:ext cx="2038124" cy="2588993"/>
+            </a:xfrm>
+            <a:prstGeom prst="line">
+              <a:avLst/>
+            </a:prstGeom>
+            <a:ln>
+              <a:solidFill>
+                <a:schemeClr val="tx1"/>
+              </a:solidFill>
+              <a:headEnd type="none"/>
+              <a:tailEnd type="arrow" w="lg" len="lg"/>
+            </a:ln>
+          </p:spPr>
+          <p:style>
+            <a:lnRef idx="1">
+              <a:schemeClr val="accent1"/>
+            </a:lnRef>
+            <a:fillRef idx="0">
+              <a:schemeClr val="accent1"/>
+            </a:fillRef>
+            <a:effectRef idx="0">
+              <a:schemeClr val="accent1"/>
+            </a:effectRef>
+            <a:fontRef idx="minor">
+              <a:schemeClr val="tx1"/>
+            </a:fontRef>
+          </p:style>
+        </p:cxnSp>
+        <p:cxnSp>
+          <p:nvCxnSpPr>
+            <p:cNvPr id="131" name="Straight Connector 130">
+              <a:extLst>
+                <a:ext uri="{FF2B5EF4-FFF2-40B4-BE49-F238E27FC236}">
+                  <a16:creationId xmlns:a16="http://schemas.microsoft.com/office/drawing/2014/main" id="{2872652D-EF56-44E7-9D43-0621AA1FB3D2}"/>
+                </a:ext>
+              </a:extLst>
+            </p:cNvPr>
+            <p:cNvCxnSpPr>
+              <a:cxnSpLocks/>
+              <a:stCxn id="123" idx="4"/>
+              <a:endCxn id="125" idx="0"/>
+            </p:cNvCxnSpPr>
+            <p:nvPr/>
+          </p:nvCxnSpPr>
+          <p:spPr>
+            <a:xfrm>
+              <a:off x="8005026" y="1432211"/>
+              <a:ext cx="0" cy="2559319"/>
+            </a:xfrm>
+            <a:prstGeom prst="line">
+              <a:avLst/>
+            </a:prstGeom>
+            <a:ln>
+              <a:solidFill>
+                <a:schemeClr val="tx1"/>
+              </a:solidFill>
+              <a:headEnd type="none"/>
+              <a:tailEnd type="arrow" w="lg" len="lg"/>
+            </a:ln>
+          </p:spPr>
+          <p:style>
+            <a:lnRef idx="1">
+              <a:schemeClr val="accent1"/>
+            </a:lnRef>
+            <a:fillRef idx="0">
+              <a:schemeClr val="accent1"/>
+            </a:fillRef>
+            <a:effectRef idx="0">
+              <a:schemeClr val="accent1"/>
+            </a:effectRef>
+            <a:fontRef idx="minor">
+              <a:schemeClr val="tx1"/>
+            </a:fontRef>
+          </p:style>
+        </p:cxnSp>
+        <p:cxnSp>
+          <p:nvCxnSpPr>
+            <p:cNvPr id="132" name="Straight Connector 131">
+              <a:extLst>
+                <a:ext uri="{FF2B5EF4-FFF2-40B4-BE49-F238E27FC236}">
+                  <a16:creationId xmlns:a16="http://schemas.microsoft.com/office/drawing/2014/main" id="{9EBA8DB4-20C8-49E3-8934-07DB54E03648}"/>
+                </a:ext>
+              </a:extLst>
+            </p:cNvPr>
+            <p:cNvCxnSpPr>
+              <a:cxnSpLocks/>
+            </p:cNvCxnSpPr>
+            <p:nvPr/>
+          </p:nvCxnSpPr>
+          <p:spPr>
+            <a:xfrm flipH="1">
+              <a:off x="3871321" y="1452093"/>
+              <a:ext cx="4117454" cy="2594922"/>
+            </a:xfrm>
+            <a:prstGeom prst="line">
+              <a:avLst/>
+            </a:prstGeom>
+            <a:ln>
+              <a:solidFill>
+                <a:schemeClr val="tx1"/>
+              </a:solidFill>
+              <a:headEnd type="none"/>
+              <a:tailEnd type="arrow" w="lg" len="lg"/>
+            </a:ln>
+          </p:spPr>
+          <p:style>
+            <a:lnRef idx="1">
+              <a:schemeClr val="accent1"/>
+            </a:lnRef>
+            <a:fillRef idx="0">
+              <a:schemeClr val="accent1"/>
+            </a:fillRef>
+            <a:effectRef idx="0">
+              <a:schemeClr val="accent1"/>
+            </a:effectRef>
+            <a:fontRef idx="minor">
+              <a:schemeClr val="tx1"/>
+            </a:fontRef>
+          </p:style>
+        </p:cxnSp>
+        <p:cxnSp>
+          <p:nvCxnSpPr>
+            <p:cNvPr id="133" name="Straight Connector 132">
+              <a:extLst>
+                <a:ext uri="{FF2B5EF4-FFF2-40B4-BE49-F238E27FC236}">
+                  <a16:creationId xmlns:a16="http://schemas.microsoft.com/office/drawing/2014/main" id="{A0F7B806-31EA-4E1D-A557-B773C9F62356}"/>
+                </a:ext>
+              </a:extLst>
+            </p:cNvPr>
+            <p:cNvCxnSpPr>
+              <a:cxnSpLocks/>
+              <a:stCxn id="120" idx="4"/>
+            </p:cNvCxnSpPr>
+            <p:nvPr/>
+          </p:nvCxnSpPr>
+          <p:spPr>
+            <a:xfrm>
+              <a:off x="5709334" y="1433094"/>
+              <a:ext cx="2086148" cy="2566254"/>
+            </a:xfrm>
+            <a:prstGeom prst="line">
+              <a:avLst/>
+            </a:prstGeom>
+            <a:ln>
+              <a:solidFill>
+                <a:schemeClr val="tx1"/>
+              </a:solidFill>
+              <a:headEnd type="none"/>
+              <a:tailEnd type="arrow" w="lg" len="lg"/>
+            </a:ln>
+          </p:spPr>
+          <p:style>
+            <a:lnRef idx="1">
+              <a:schemeClr val="accent1"/>
+            </a:lnRef>
+            <a:fillRef idx="0">
+              <a:schemeClr val="accent1"/>
+            </a:fillRef>
+            <a:effectRef idx="0">
+              <a:schemeClr val="accent1"/>
+            </a:effectRef>
+            <a:fontRef idx="minor">
+              <a:schemeClr val="tx1"/>
+            </a:fontRef>
+          </p:style>
+        </p:cxnSp>
+        <p:cxnSp>
+          <p:nvCxnSpPr>
+            <p:cNvPr id="134" name="Straight Connector 133">
+              <a:extLst>
+                <a:ext uri="{FF2B5EF4-FFF2-40B4-BE49-F238E27FC236}">
+                  <a16:creationId xmlns:a16="http://schemas.microsoft.com/office/drawing/2014/main" id="{6BA8D248-5B63-4DC9-ADA2-D40B5BDEE959}"/>
+                </a:ext>
+              </a:extLst>
+            </p:cNvPr>
+            <p:cNvCxnSpPr>
+              <a:cxnSpLocks/>
+              <a:stCxn id="119" idx="4"/>
+            </p:cNvCxnSpPr>
+            <p:nvPr/>
+          </p:nvCxnSpPr>
+          <p:spPr>
+            <a:xfrm>
+              <a:off x="3484613" y="1433094"/>
+              <a:ext cx="4133706" cy="2606102"/>
+            </a:xfrm>
+            <a:prstGeom prst="line">
+              <a:avLst/>
+            </a:prstGeom>
+            <a:ln>
+              <a:solidFill>
+                <a:schemeClr val="tx1"/>
+              </a:solidFill>
+              <a:headEnd type="none"/>
+              <a:tailEnd type="arrow" w="lg" len="lg"/>
+            </a:ln>
+          </p:spPr>
+          <p:style>
+            <a:lnRef idx="1">
+              <a:schemeClr val="accent1"/>
+            </a:lnRef>
+            <a:fillRef idx="0">
+              <a:schemeClr val="accent1"/>
+            </a:fillRef>
+            <a:effectRef idx="0">
+              <a:schemeClr val="accent1"/>
+            </a:effectRef>
+            <a:fontRef idx="minor">
+              <a:schemeClr val="tx1"/>
+            </a:fontRef>
+          </p:style>
+        </p:cxnSp>
+        <p:cxnSp>
+          <p:nvCxnSpPr>
+            <p:cNvPr id="135" name="Straight Connector 134">
+              <a:extLst>
+                <a:ext uri="{FF2B5EF4-FFF2-40B4-BE49-F238E27FC236}">
+                  <a16:creationId xmlns:a16="http://schemas.microsoft.com/office/drawing/2014/main" id="{2691E3C1-E1AE-48E0-A276-BF6969EDAB84}"/>
+                </a:ext>
+              </a:extLst>
+            </p:cNvPr>
+            <p:cNvCxnSpPr>
+              <a:cxnSpLocks/>
+              <a:stCxn id="121" idx="6"/>
+              <a:endCxn id="125" idx="1"/>
+            </p:cNvCxnSpPr>
+            <p:nvPr/>
+          </p:nvCxnSpPr>
+          <p:spPr>
+            <a:xfrm>
+              <a:off x="1985776" y="1828451"/>
+              <a:ext cx="5455380" cy="2279135"/>
+            </a:xfrm>
+            <a:prstGeom prst="line">
+              <a:avLst/>
+            </a:prstGeom>
+            <a:ln>
+              <a:solidFill>
+                <a:schemeClr val="tx1"/>
+              </a:solidFill>
+              <a:headEnd type="none"/>
+              <a:tailEnd type="arrow" w="lg" len="lg"/>
+            </a:ln>
+          </p:spPr>
+          <p:style>
+            <a:lnRef idx="1">
+              <a:schemeClr val="accent1"/>
+            </a:lnRef>
+            <a:fillRef idx="0">
+              <a:schemeClr val="accent1"/>
+            </a:fillRef>
+            <a:effectRef idx="0">
+              <a:schemeClr val="accent1"/>
+            </a:effectRef>
+            <a:fontRef idx="minor">
+              <a:schemeClr val="tx1"/>
+            </a:fontRef>
+          </p:style>
+        </p:cxnSp>
+        <p:cxnSp>
+          <p:nvCxnSpPr>
+            <p:cNvPr id="136" name="Straight Connector 135">
+              <a:extLst>
+                <a:ext uri="{FF2B5EF4-FFF2-40B4-BE49-F238E27FC236}">
+                  <a16:creationId xmlns:a16="http://schemas.microsoft.com/office/drawing/2014/main" id="{3A0DA281-47F9-468E-86AE-6549E523FB5B}"/>
+                </a:ext>
+              </a:extLst>
+            </p:cNvPr>
+            <p:cNvCxnSpPr>
+              <a:cxnSpLocks/>
+              <a:stCxn id="122" idx="6"/>
+            </p:cNvCxnSpPr>
+            <p:nvPr/>
+          </p:nvCxnSpPr>
+          <p:spPr>
+            <a:xfrm>
+              <a:off x="1985776" y="3176243"/>
+              <a:ext cx="5295765" cy="1028987"/>
+            </a:xfrm>
+            <a:prstGeom prst="line">
+              <a:avLst/>
+            </a:prstGeom>
+            <a:ln>
+              <a:solidFill>
+                <a:schemeClr val="tx1"/>
+              </a:solidFill>
+              <a:headEnd type="none"/>
+              <a:tailEnd type="arrow" w="lg" len="lg"/>
+            </a:ln>
+          </p:spPr>
+          <p:style>
+            <a:lnRef idx="1">
+              <a:schemeClr val="accent1"/>
+            </a:lnRef>
+            <a:fillRef idx="0">
+              <a:schemeClr val="accent1"/>
+            </a:fillRef>
+            <a:effectRef idx="0">
+              <a:schemeClr val="accent1"/>
+            </a:effectRef>
+            <a:fontRef idx="minor">
+              <a:schemeClr val="tx1"/>
+            </a:fontRef>
+          </p:style>
+        </p:cxnSp>
+        <p:cxnSp>
+          <p:nvCxnSpPr>
+            <p:cNvPr id="137" name="Straight Connector 136">
+              <a:extLst>
+                <a:ext uri="{FF2B5EF4-FFF2-40B4-BE49-F238E27FC236}">
+                  <a16:creationId xmlns:a16="http://schemas.microsoft.com/office/drawing/2014/main" id="{ADA6FEEB-279D-4853-B725-6FDE31D0F748}"/>
+                </a:ext>
+              </a:extLst>
+            </p:cNvPr>
+            <p:cNvCxnSpPr>
+              <a:cxnSpLocks/>
+              <a:stCxn id="124" idx="6"/>
+              <a:endCxn id="125" idx="2"/>
+            </p:cNvCxnSpPr>
+            <p:nvPr/>
+          </p:nvCxnSpPr>
+          <p:spPr>
+            <a:xfrm flipV="1">
+              <a:off x="4282046" y="4387770"/>
+              <a:ext cx="2925547" cy="19965"/>
+            </a:xfrm>
+            <a:prstGeom prst="line">
+              <a:avLst/>
+            </a:prstGeom>
+            <a:ln>
+              <a:solidFill>
+                <a:schemeClr val="tx1"/>
+              </a:solidFill>
+              <a:headEnd type="none"/>
+              <a:tailEnd type="arrow" w="lg" len="lg"/>
+            </a:ln>
+          </p:spPr>
+          <p:style>
+            <a:lnRef idx="1">
+              <a:schemeClr val="accent1"/>
+            </a:lnRef>
+            <a:fillRef idx="0">
+              <a:schemeClr val="accent1"/>
+            </a:fillRef>
+            <a:effectRef idx="0">
+              <a:schemeClr val="accent1"/>
+            </a:effectRef>
+            <a:fontRef idx="minor">
+              <a:schemeClr val="tx1"/>
+            </a:fontRef>
+          </p:style>
+        </p:cxnSp>
+        <p:cxnSp>
+          <p:nvCxnSpPr>
+            <p:cNvPr id="138" name="Straight Connector 137">
+              <a:extLst>
+                <a:ext uri="{FF2B5EF4-FFF2-40B4-BE49-F238E27FC236}">
+                  <a16:creationId xmlns:a16="http://schemas.microsoft.com/office/drawing/2014/main" id="{CAC38517-3E1F-4606-A8E3-9F29A6AC7895}"/>
+                </a:ext>
+              </a:extLst>
+            </p:cNvPr>
+            <p:cNvCxnSpPr>
+              <a:cxnSpLocks/>
+              <a:stCxn id="126" idx="0"/>
+              <a:endCxn id="125" idx="4"/>
+            </p:cNvCxnSpPr>
+            <p:nvPr/>
+          </p:nvCxnSpPr>
+          <p:spPr>
+            <a:xfrm flipV="1">
+              <a:off x="8005026" y="4784010"/>
+              <a:ext cx="0" cy="438859"/>
+            </a:xfrm>
+            <a:prstGeom prst="line">
+              <a:avLst/>
+            </a:prstGeom>
+            <a:ln>
+              <a:solidFill>
+                <a:schemeClr val="tx1"/>
+              </a:solidFill>
+              <a:headEnd type="arrow" w="lg" len="lg"/>
+              <a:tailEnd type="none"/>
+            </a:ln>
+          </p:spPr>
+          <p:style>
+            <a:lnRef idx="1">
+              <a:schemeClr val="accent1"/>
+            </a:lnRef>
+            <a:fillRef idx="0">
+              <a:schemeClr val="accent1"/>
+            </a:fillRef>
+            <a:effectRef idx="0">
+              <a:schemeClr val="accent1"/>
+            </a:effectRef>
+            <a:fontRef idx="minor">
+              <a:schemeClr val="tx1"/>
+            </a:fontRef>
+          </p:style>
+        </p:cxnSp>
+        <p:sp>
+          <p:nvSpPr>
+            <p:cNvPr id="9" name="Oval 8">
+              <a:extLst>
+                <a:ext uri="{FF2B5EF4-FFF2-40B4-BE49-F238E27FC236}">
+                  <a16:creationId xmlns:a16="http://schemas.microsoft.com/office/drawing/2014/main" id="{5D37C73D-71CE-4B67-9B93-A9FB976C4359}"/>
+                </a:ext>
+              </a:extLst>
+            </p:cNvPr>
+            <p:cNvSpPr/>
+            <p:nvPr/>
+          </p:nvSpPr>
+          <p:spPr>
+            <a:xfrm>
+              <a:off x="2672189" y="6912984"/>
+              <a:ext cx="1594866" cy="792480"/>
+            </a:xfrm>
+            <a:prstGeom prst="ellipse">
+              <a:avLst/>
+            </a:prstGeom>
+            <a:solidFill>
+              <a:schemeClr val="accent2">
+                <a:lumMod val="60000"/>
+                <a:lumOff val="40000"/>
+              </a:schemeClr>
+            </a:solidFill>
+            <a:ln>
+              <a:solidFill>
+                <a:schemeClr val="tx1"/>
+              </a:solidFill>
+            </a:ln>
+          </p:spPr>
+          <p:style>
+            <a:lnRef idx="2">
+              <a:schemeClr val="accent1">
+                <a:shade val="50000"/>
+              </a:schemeClr>
+            </a:lnRef>
+            <a:fillRef idx="1">
+              <a:schemeClr val="accent1"/>
+            </a:fillRef>
+            <a:effectRef idx="0">
+              <a:schemeClr val="accent1"/>
+            </a:effectRef>
+            <a:fontRef idx="minor">
+              <a:schemeClr val="lt1"/>
+            </a:fontRef>
+          </p:style>
+          <p:txBody>
+            <a:bodyPr rot="0" spcFirstLastPara="0" vertOverflow="overflow" horzOverflow="overflow" vert="horz" wrap="none" lIns="79248" tIns="39624" rIns="79248" bIns="39624" numCol="1" spcCol="0" rtlCol="0" fromWordArt="0" anchor="ctr" anchorCtr="0" forceAA="0" compatLnSpc="1">
+              <a:prstTxWarp prst="textNoShape">
+                <a:avLst/>
+              </a:prstTxWarp>
+              <a:noAutofit/>
+            </a:bodyPr>
+            <a:lstStyle/>
+            <a:p>
+              <a:pPr algn="ctr"/>
+              <a:r>
+                <a:rPr lang="en-US" sz="1600" dirty="0">
                   <a:solidFill>
                     <a:schemeClr val="tx1"/>
                   </a:solidFill>
-                </a:ln>
-              </p:spPr>
-              <p:style>
-                <a:lnRef idx="1">
-                  <a:schemeClr val="accent1"/>
-                </a:lnRef>
-                <a:fillRef idx="0">
-                  <a:schemeClr val="accent1"/>
-                </a:fillRef>
-                <a:effectRef idx="0">
-                  <a:schemeClr val="accent1"/>
-                </a:effectRef>
-                <a:fontRef idx="minor">
-                  <a:schemeClr val="tx1"/>
-                </a:fontRef>
-              </p:style>
-            </p:cxnSp>
-            <p:cxnSp>
-              <p:nvCxnSpPr>
-                <p:cNvPr id="133" name="Straight Connector 132">
-                  <a:extLst>
-                    <a:ext uri="{FF2B5EF4-FFF2-40B4-BE49-F238E27FC236}">
-                      <a16:creationId xmlns:a16="http://schemas.microsoft.com/office/drawing/2014/main" id="{A0F7B806-31EA-4E1D-A557-B773C9F62356}"/>
-                    </a:ext>
-                  </a:extLst>
-                </p:cNvPr>
-                <p:cNvCxnSpPr>
-                  <a:cxnSpLocks/>
-                  <a:stCxn id="120" idx="4"/>
-                  <a:endCxn id="125" idx="0"/>
-                </p:cNvCxnSpPr>
-                <p:nvPr/>
-              </p:nvCxnSpPr>
-              <p:spPr>
-                <a:xfrm>
-                  <a:off x="6854126" y="2560675"/>
-                  <a:ext cx="2648875" cy="2952041"/>
-                </a:xfrm>
-                <a:prstGeom prst="line">
-                  <a:avLst/>
-                </a:prstGeom>
-                <a:ln>
+                  <a:latin typeface="Times New Roman" panose="02020603050405020304" pitchFamily="18" charset="0"/>
+                  <a:cs typeface="Times New Roman" panose="02020603050405020304" pitchFamily="18" charset="0"/>
+                </a:rPr>
+                <a:t>Habitat</a:t>
+              </a:r>
+            </a:p>
+          </p:txBody>
+        </p:sp>
+        <p:sp>
+          <p:nvSpPr>
+            <p:cNvPr id="15" name="Oval 14">
+              <a:extLst>
+                <a:ext uri="{FF2B5EF4-FFF2-40B4-BE49-F238E27FC236}">
+                  <a16:creationId xmlns:a16="http://schemas.microsoft.com/office/drawing/2014/main" id="{66CB8F8F-AFE8-49AC-B42F-8398B8067BC7}"/>
+                </a:ext>
+              </a:extLst>
+            </p:cNvPr>
+            <p:cNvSpPr/>
+            <p:nvPr/>
+          </p:nvSpPr>
+          <p:spPr>
+            <a:xfrm>
+              <a:off x="364793" y="6910783"/>
+              <a:ext cx="1594866" cy="792480"/>
+            </a:xfrm>
+            <a:prstGeom prst="ellipse">
+              <a:avLst/>
+            </a:prstGeom>
+            <a:solidFill>
+              <a:schemeClr val="accent4">
+                <a:lumMod val="60000"/>
+                <a:lumOff val="40000"/>
+              </a:schemeClr>
+            </a:solidFill>
+            <a:ln>
+              <a:solidFill>
+                <a:schemeClr val="tx1"/>
+              </a:solidFill>
+            </a:ln>
+          </p:spPr>
+          <p:style>
+            <a:lnRef idx="2">
+              <a:schemeClr val="accent1">
+                <a:shade val="50000"/>
+              </a:schemeClr>
+            </a:lnRef>
+            <a:fillRef idx="1">
+              <a:schemeClr val="accent1"/>
+            </a:fillRef>
+            <a:effectRef idx="0">
+              <a:schemeClr val="accent1"/>
+            </a:effectRef>
+            <a:fontRef idx="minor">
+              <a:schemeClr val="lt1"/>
+            </a:fontRef>
+          </p:style>
+          <p:txBody>
+            <a:bodyPr rot="0" spcFirstLastPara="0" vertOverflow="overflow" horzOverflow="overflow" vert="horz" wrap="none" lIns="79248" tIns="39624" rIns="79248" bIns="39624" numCol="1" spcCol="0" rtlCol="0" fromWordArt="0" anchor="ctr" anchorCtr="0" forceAA="0" compatLnSpc="1">
+              <a:prstTxWarp prst="textNoShape">
+                <a:avLst/>
+              </a:prstTxWarp>
+              <a:noAutofit/>
+            </a:bodyPr>
+            <a:lstStyle/>
+            <a:p>
+              <a:pPr algn="ctr"/>
+              <a:r>
+                <a:rPr lang="en-US" sz="1600" dirty="0">
                   <a:solidFill>
                     <a:schemeClr val="tx1"/>
                   </a:solidFill>
-                </a:ln>
-              </p:spPr>
-              <p:style>
-                <a:lnRef idx="1">
-                  <a:schemeClr val="accent1"/>
-                </a:lnRef>
-                <a:fillRef idx="0">
-                  <a:schemeClr val="accent1"/>
-                </a:fillRef>
-                <a:effectRef idx="0">
-                  <a:schemeClr val="accent1"/>
-                </a:effectRef>
-                <a:fontRef idx="minor">
-                  <a:schemeClr val="tx1"/>
-                </a:fontRef>
-              </p:style>
-            </p:cxnSp>
-            <p:cxnSp>
-              <p:nvCxnSpPr>
-                <p:cNvPr id="134" name="Straight Connector 133">
-                  <a:extLst>
-                    <a:ext uri="{FF2B5EF4-FFF2-40B4-BE49-F238E27FC236}">
-                      <a16:creationId xmlns:a16="http://schemas.microsoft.com/office/drawing/2014/main" id="{6BA8D248-5B63-4DC9-ADA2-D40B5BDEE959}"/>
-                    </a:ext>
-                  </a:extLst>
-                </p:cNvPr>
-                <p:cNvCxnSpPr>
-                  <a:cxnSpLocks/>
-                  <a:stCxn id="119" idx="4"/>
-                  <a:endCxn id="125" idx="0"/>
-                </p:cNvCxnSpPr>
-                <p:nvPr/>
-              </p:nvCxnSpPr>
-              <p:spPr>
-                <a:xfrm>
-                  <a:off x="4287140" y="2560675"/>
-                  <a:ext cx="5215861" cy="2952041"/>
-                </a:xfrm>
-                <a:prstGeom prst="line">
-                  <a:avLst/>
-                </a:prstGeom>
-                <a:ln>
+                  <a:latin typeface="Times New Roman" panose="02020603050405020304" pitchFamily="18" charset="0"/>
+                  <a:cs typeface="Times New Roman" panose="02020603050405020304" pitchFamily="18" charset="0"/>
+                </a:rPr>
+                <a:t>Water treatment</a:t>
+              </a:r>
+            </a:p>
+          </p:txBody>
+        </p:sp>
+        <p:sp>
+          <p:nvSpPr>
+            <p:cNvPr id="18" name="Oval 17">
+              <a:extLst>
+                <a:ext uri="{FF2B5EF4-FFF2-40B4-BE49-F238E27FC236}">
+                  <a16:creationId xmlns:a16="http://schemas.microsoft.com/office/drawing/2014/main" id="{73A24EC1-09B3-4DB3-B075-1DFCB791DC27}"/>
+                </a:ext>
+              </a:extLst>
+            </p:cNvPr>
+            <p:cNvSpPr/>
+            <p:nvPr/>
+          </p:nvSpPr>
+          <p:spPr>
+            <a:xfrm>
+              <a:off x="364793" y="9047331"/>
+              <a:ext cx="1594866" cy="792480"/>
+            </a:xfrm>
+            <a:prstGeom prst="ellipse">
+              <a:avLst/>
+            </a:prstGeom>
+            <a:solidFill>
+              <a:schemeClr val="accent6">
+                <a:lumMod val="60000"/>
+                <a:lumOff val="40000"/>
+              </a:schemeClr>
+            </a:solidFill>
+            <a:ln>
+              <a:solidFill>
+                <a:schemeClr val="tx1"/>
+              </a:solidFill>
+            </a:ln>
+          </p:spPr>
+          <p:style>
+            <a:lnRef idx="2">
+              <a:schemeClr val="accent1">
+                <a:shade val="50000"/>
+              </a:schemeClr>
+            </a:lnRef>
+            <a:fillRef idx="1">
+              <a:schemeClr val="accent1"/>
+            </a:fillRef>
+            <a:effectRef idx="0">
+              <a:schemeClr val="accent1"/>
+            </a:effectRef>
+            <a:fontRef idx="minor">
+              <a:schemeClr val="lt1"/>
+            </a:fontRef>
+          </p:style>
+          <p:txBody>
+            <a:bodyPr rot="0" spcFirstLastPara="0" vertOverflow="overflow" horzOverflow="overflow" vert="horz" wrap="none" lIns="79248" tIns="39624" rIns="79248" bIns="39624" numCol="1" spcCol="0" rtlCol="0" fromWordArt="0" anchor="ctr" anchorCtr="0" forceAA="0" compatLnSpc="1">
+              <a:prstTxWarp prst="textNoShape">
+                <a:avLst/>
+              </a:prstTxWarp>
+              <a:noAutofit/>
+            </a:bodyPr>
+            <a:lstStyle/>
+            <a:p>
+              <a:pPr algn="ctr"/>
+              <a:r>
+                <a:rPr lang="en-US" sz="1600" dirty="0">
                   <a:solidFill>
                     <a:schemeClr val="tx1"/>
                   </a:solidFill>
-                </a:ln>
-              </p:spPr>
-              <p:style>
-                <a:lnRef idx="1">
-                  <a:schemeClr val="accent1"/>
-                </a:lnRef>
-                <a:fillRef idx="0">
-                  <a:schemeClr val="accent1"/>
-                </a:fillRef>
-                <a:effectRef idx="0">
-                  <a:schemeClr val="accent1"/>
-                </a:effectRef>
-                <a:fontRef idx="minor">
-                  <a:schemeClr val="tx1"/>
-                </a:fontRef>
-              </p:style>
-            </p:cxnSp>
-            <p:cxnSp>
-              <p:nvCxnSpPr>
-                <p:cNvPr id="135" name="Straight Connector 134">
-                  <a:extLst>
-                    <a:ext uri="{FF2B5EF4-FFF2-40B4-BE49-F238E27FC236}">
-                      <a16:creationId xmlns:a16="http://schemas.microsoft.com/office/drawing/2014/main" id="{2691E3C1-E1AE-48E0-A276-BF6969EDAB84}"/>
-                    </a:ext>
-                  </a:extLst>
-                </p:cNvPr>
-                <p:cNvCxnSpPr>
-                  <a:cxnSpLocks/>
-                  <a:stCxn id="121" idx="6"/>
-                  <a:endCxn id="125" idx="0"/>
-                </p:cNvCxnSpPr>
-                <p:nvPr/>
-              </p:nvCxnSpPr>
-              <p:spPr>
-                <a:xfrm>
-                  <a:off x="2557713" y="3016856"/>
-                  <a:ext cx="6945288" cy="2495860"/>
-                </a:xfrm>
-                <a:prstGeom prst="line">
-                  <a:avLst/>
-                </a:prstGeom>
-                <a:ln>
+                  <a:latin typeface="Times New Roman" panose="02020603050405020304" pitchFamily="18" charset="0"/>
+                  <a:cs typeface="Times New Roman" panose="02020603050405020304" pitchFamily="18" charset="0"/>
+                </a:rPr>
+                <a:t>Salinity</a:t>
+              </a:r>
+            </a:p>
+          </p:txBody>
+        </p:sp>
+        <p:sp>
+          <p:nvSpPr>
+            <p:cNvPr id="19" name="Oval 18">
+              <a:extLst>
+                <a:ext uri="{FF2B5EF4-FFF2-40B4-BE49-F238E27FC236}">
+                  <a16:creationId xmlns:a16="http://schemas.microsoft.com/office/drawing/2014/main" id="{1FDEEEB4-815A-4040-8E06-E4A4BA756CF8}"/>
+                </a:ext>
+              </a:extLst>
+            </p:cNvPr>
+            <p:cNvSpPr/>
+            <p:nvPr/>
+          </p:nvSpPr>
+          <p:spPr>
+            <a:xfrm>
+              <a:off x="2672189" y="9039513"/>
+              <a:ext cx="1594866" cy="792480"/>
+            </a:xfrm>
+            <a:prstGeom prst="ellipse">
+              <a:avLst/>
+            </a:prstGeom>
+            <a:solidFill>
+              <a:schemeClr val="accent1">
+                <a:lumMod val="60000"/>
+                <a:lumOff val="40000"/>
+              </a:schemeClr>
+            </a:solidFill>
+            <a:ln>
+              <a:solidFill>
+                <a:schemeClr val="tx1"/>
+              </a:solidFill>
+            </a:ln>
+          </p:spPr>
+          <p:style>
+            <a:lnRef idx="2">
+              <a:schemeClr val="accent1">
+                <a:shade val="50000"/>
+              </a:schemeClr>
+            </a:lnRef>
+            <a:fillRef idx="1">
+              <a:schemeClr val="accent1"/>
+            </a:fillRef>
+            <a:effectRef idx="0">
+              <a:schemeClr val="accent1"/>
+            </a:effectRef>
+            <a:fontRef idx="minor">
+              <a:schemeClr val="lt1"/>
+            </a:fontRef>
+          </p:style>
+          <p:txBody>
+            <a:bodyPr rot="0" spcFirstLastPara="0" vertOverflow="overflow" horzOverflow="overflow" vert="horz" wrap="none" lIns="79248" tIns="39624" rIns="79248" bIns="39624" numCol="1" spcCol="0" rtlCol="0" fromWordArt="0" anchor="ctr" anchorCtr="0" forceAA="0" compatLnSpc="1">
+              <a:prstTxWarp prst="textNoShape">
+                <a:avLst/>
+              </a:prstTxWarp>
+              <a:noAutofit/>
+            </a:bodyPr>
+            <a:lstStyle/>
+            <a:p>
+              <a:pPr algn="ctr"/>
+              <a:r>
+                <a:rPr lang="en-US" sz="1600" dirty="0">
                   <a:solidFill>
                     <a:schemeClr val="tx1"/>
                   </a:solidFill>
-                </a:ln>
-              </p:spPr>
-              <p:style>
-                <a:lnRef idx="1">
-                  <a:schemeClr val="accent1"/>
-                </a:lnRef>
-                <a:fillRef idx="0">
-                  <a:schemeClr val="accent1"/>
-                </a:fillRef>
-                <a:effectRef idx="0">
-                  <a:schemeClr val="accent1"/>
-                </a:effectRef>
-                <a:fontRef idx="minor">
-                  <a:schemeClr val="tx1"/>
-                </a:fontRef>
-              </p:style>
-            </p:cxnSp>
-            <p:cxnSp>
-              <p:nvCxnSpPr>
-                <p:cNvPr id="136" name="Straight Connector 135">
-                  <a:extLst>
-                    <a:ext uri="{FF2B5EF4-FFF2-40B4-BE49-F238E27FC236}">
-                      <a16:creationId xmlns:a16="http://schemas.microsoft.com/office/drawing/2014/main" id="{3A0DA281-47F9-468E-86AE-6549E523FB5B}"/>
-                    </a:ext>
-                  </a:extLst>
-                </p:cNvPr>
-                <p:cNvCxnSpPr>
-                  <a:cxnSpLocks/>
-                  <a:stCxn id="122" idx="6"/>
-                  <a:endCxn id="125" idx="0"/>
-                </p:cNvCxnSpPr>
-                <p:nvPr/>
-              </p:nvCxnSpPr>
-              <p:spPr>
-                <a:xfrm>
-                  <a:off x="2557713" y="4572000"/>
-                  <a:ext cx="6945288" cy="940716"/>
-                </a:xfrm>
-                <a:prstGeom prst="line">
-                  <a:avLst/>
-                </a:prstGeom>
-                <a:ln>
+                  <a:latin typeface="Times New Roman" panose="02020603050405020304" pitchFamily="18" charset="0"/>
+                  <a:cs typeface="Times New Roman" panose="02020603050405020304" pitchFamily="18" charset="0"/>
+                </a:rPr>
+                <a:t>Chlorophyll</a:t>
+              </a:r>
+            </a:p>
+          </p:txBody>
+        </p:sp>
+        <p:cxnSp>
+          <p:nvCxnSpPr>
+            <p:cNvPr id="26" name="Straight Connector 25">
+              <a:extLst>
+                <a:ext uri="{FF2B5EF4-FFF2-40B4-BE49-F238E27FC236}">
+                  <a16:creationId xmlns:a16="http://schemas.microsoft.com/office/drawing/2014/main" id="{5E186043-5E0A-45C9-865B-40F77502E4D0}"/>
+                </a:ext>
+              </a:extLst>
+            </p:cNvPr>
+            <p:cNvCxnSpPr>
+              <a:cxnSpLocks/>
+              <a:stCxn id="9" idx="4"/>
+            </p:cNvCxnSpPr>
+            <p:nvPr/>
+          </p:nvCxnSpPr>
+          <p:spPr>
+            <a:xfrm flipH="1">
+              <a:off x="1349161" y="7705464"/>
+              <a:ext cx="2120461" cy="1341867"/>
+            </a:xfrm>
+            <a:prstGeom prst="line">
+              <a:avLst/>
+            </a:prstGeom>
+            <a:ln>
+              <a:solidFill>
+                <a:schemeClr val="tx1"/>
+              </a:solidFill>
+              <a:tailEnd type="arrow" w="lg" len="lg"/>
+            </a:ln>
+          </p:spPr>
+          <p:style>
+            <a:lnRef idx="1">
+              <a:schemeClr val="accent1"/>
+            </a:lnRef>
+            <a:fillRef idx="0">
+              <a:schemeClr val="accent1"/>
+            </a:fillRef>
+            <a:effectRef idx="0">
+              <a:schemeClr val="accent1"/>
+            </a:effectRef>
+            <a:fontRef idx="minor">
+              <a:schemeClr val="tx1"/>
+            </a:fontRef>
+          </p:style>
+        </p:cxnSp>
+        <p:cxnSp>
+          <p:nvCxnSpPr>
+            <p:cNvPr id="29" name="Straight Connector 28">
+              <a:extLst>
+                <a:ext uri="{FF2B5EF4-FFF2-40B4-BE49-F238E27FC236}">
+                  <a16:creationId xmlns:a16="http://schemas.microsoft.com/office/drawing/2014/main" id="{38223B80-5538-4BE8-B68B-BD0E377C29DC}"/>
+                </a:ext>
+              </a:extLst>
+            </p:cNvPr>
+            <p:cNvCxnSpPr>
+              <a:cxnSpLocks/>
+              <a:stCxn id="15" idx="4"/>
+              <a:endCxn id="18" idx="0"/>
+            </p:cNvCxnSpPr>
+            <p:nvPr/>
+          </p:nvCxnSpPr>
+          <p:spPr>
+            <a:xfrm>
+              <a:off x="1162226" y="7703263"/>
+              <a:ext cx="0" cy="1344068"/>
+            </a:xfrm>
+            <a:prstGeom prst="line">
+              <a:avLst/>
+            </a:prstGeom>
+            <a:ln>
+              <a:solidFill>
+                <a:schemeClr val="tx1"/>
+              </a:solidFill>
+              <a:tailEnd type="arrow" w="lg" len="lg"/>
+            </a:ln>
+          </p:spPr>
+          <p:style>
+            <a:lnRef idx="1">
+              <a:schemeClr val="accent1"/>
+            </a:lnRef>
+            <a:fillRef idx="0">
+              <a:schemeClr val="accent1"/>
+            </a:fillRef>
+            <a:effectRef idx="0">
+              <a:schemeClr val="accent1"/>
+            </a:effectRef>
+            <a:fontRef idx="minor">
+              <a:schemeClr val="tx1"/>
+            </a:fontRef>
+          </p:style>
+        </p:cxnSp>
+        <p:cxnSp>
+          <p:nvCxnSpPr>
+            <p:cNvPr id="46" name="Straight Connector 45">
+              <a:extLst>
+                <a:ext uri="{FF2B5EF4-FFF2-40B4-BE49-F238E27FC236}">
+                  <a16:creationId xmlns:a16="http://schemas.microsoft.com/office/drawing/2014/main" id="{C530654E-AF39-4F21-80BC-953D0EC34EAE}"/>
+                </a:ext>
+              </a:extLst>
+            </p:cNvPr>
+            <p:cNvCxnSpPr>
+              <a:cxnSpLocks/>
+              <a:stCxn id="9" idx="4"/>
+              <a:endCxn id="19" idx="0"/>
+            </p:cNvCxnSpPr>
+            <p:nvPr/>
+          </p:nvCxnSpPr>
+          <p:spPr>
+            <a:xfrm>
+              <a:off x="3469622" y="7705464"/>
+              <a:ext cx="0" cy="1334049"/>
+            </a:xfrm>
+            <a:prstGeom prst="line">
+              <a:avLst/>
+            </a:prstGeom>
+            <a:ln>
+              <a:solidFill>
+                <a:schemeClr val="tx1"/>
+              </a:solidFill>
+              <a:tailEnd type="arrow" w="lg" len="lg"/>
+            </a:ln>
+          </p:spPr>
+          <p:style>
+            <a:lnRef idx="1">
+              <a:schemeClr val="accent1"/>
+            </a:lnRef>
+            <a:fillRef idx="0">
+              <a:schemeClr val="accent1"/>
+            </a:fillRef>
+            <a:effectRef idx="0">
+              <a:schemeClr val="accent1"/>
+            </a:effectRef>
+            <a:fontRef idx="minor">
+              <a:schemeClr val="tx1"/>
+            </a:fontRef>
+          </p:style>
+        </p:cxnSp>
+        <p:cxnSp>
+          <p:nvCxnSpPr>
+            <p:cNvPr id="47" name="Straight Connector 46">
+              <a:extLst>
+                <a:ext uri="{FF2B5EF4-FFF2-40B4-BE49-F238E27FC236}">
+                  <a16:creationId xmlns:a16="http://schemas.microsoft.com/office/drawing/2014/main" id="{8243526D-0E51-44EB-933F-F5F64139CE8A}"/>
+                </a:ext>
+              </a:extLst>
+            </p:cNvPr>
+            <p:cNvCxnSpPr>
+              <a:cxnSpLocks/>
+              <a:stCxn id="15" idx="4"/>
+            </p:cNvCxnSpPr>
+            <p:nvPr/>
+          </p:nvCxnSpPr>
+          <p:spPr>
+            <a:xfrm>
+              <a:off x="1162226" y="7703263"/>
+              <a:ext cx="2106882" cy="1344068"/>
+            </a:xfrm>
+            <a:prstGeom prst="line">
+              <a:avLst/>
+            </a:prstGeom>
+            <a:ln>
+              <a:solidFill>
+                <a:schemeClr val="tx1"/>
+              </a:solidFill>
+              <a:tailEnd type="arrow" w="lg" len="lg"/>
+            </a:ln>
+          </p:spPr>
+          <p:style>
+            <a:lnRef idx="1">
+              <a:schemeClr val="accent1"/>
+            </a:lnRef>
+            <a:fillRef idx="0">
+              <a:schemeClr val="accent1"/>
+            </a:fillRef>
+            <a:effectRef idx="0">
+              <a:schemeClr val="accent1"/>
+            </a:effectRef>
+            <a:fontRef idx="minor">
+              <a:schemeClr val="tx1"/>
+            </a:fontRef>
+          </p:style>
+        </p:cxnSp>
+        <p:cxnSp>
+          <p:nvCxnSpPr>
+            <p:cNvPr id="49" name="Straight Connector 48">
+              <a:extLst>
+                <a:ext uri="{FF2B5EF4-FFF2-40B4-BE49-F238E27FC236}">
+                  <a16:creationId xmlns:a16="http://schemas.microsoft.com/office/drawing/2014/main" id="{B10F0B96-09D0-4E09-AD2B-9CA1FB3C3486}"/>
+                </a:ext>
+              </a:extLst>
+            </p:cNvPr>
+            <p:cNvCxnSpPr>
+              <a:cxnSpLocks/>
+              <a:stCxn id="18" idx="6"/>
+              <a:endCxn id="19" idx="2"/>
+            </p:cNvCxnSpPr>
+            <p:nvPr/>
+          </p:nvCxnSpPr>
+          <p:spPr>
+            <a:xfrm flipV="1">
+              <a:off x="1959659" y="9435753"/>
+              <a:ext cx="712530" cy="7818"/>
+            </a:xfrm>
+            <a:prstGeom prst="line">
+              <a:avLst/>
+            </a:prstGeom>
+            <a:ln>
+              <a:solidFill>
+                <a:schemeClr val="tx1"/>
+              </a:solidFill>
+              <a:tailEnd type="arrow" w="lg" len="lg"/>
+            </a:ln>
+          </p:spPr>
+          <p:style>
+            <a:lnRef idx="1">
+              <a:schemeClr val="accent1"/>
+            </a:lnRef>
+            <a:fillRef idx="0">
+              <a:schemeClr val="accent1"/>
+            </a:fillRef>
+            <a:effectRef idx="0">
+              <a:schemeClr val="accent1"/>
+            </a:effectRef>
+            <a:fontRef idx="minor">
+              <a:schemeClr val="tx1"/>
+            </a:fontRef>
+          </p:style>
+        </p:cxnSp>
+        <p:sp>
+          <p:nvSpPr>
+            <p:cNvPr id="170" name="TextBox 169">
+              <a:extLst>
+                <a:ext uri="{FF2B5EF4-FFF2-40B4-BE49-F238E27FC236}">
+                  <a16:creationId xmlns:a16="http://schemas.microsoft.com/office/drawing/2014/main" id="{7052E695-0AED-4BEE-82B5-D01D58018492}"/>
+                </a:ext>
+              </a:extLst>
+            </p:cNvPr>
+            <p:cNvSpPr txBox="1"/>
+            <p:nvPr/>
+          </p:nvSpPr>
+          <p:spPr>
+            <a:xfrm>
+              <a:off x="717431" y="6281781"/>
+              <a:ext cx="3225563" cy="412421"/>
+            </a:xfrm>
+            <a:prstGeom prst="rect">
+              <a:avLst/>
+            </a:prstGeom>
+            <a:noFill/>
+          </p:spPr>
+          <p:txBody>
+            <a:bodyPr wrap="none" rtlCol="0">
+              <a:spAutoFit/>
+            </a:bodyPr>
+            <a:lstStyle/>
+            <a:p>
+              <a:r>
+                <a:rPr lang="en-US" sz="2080" b="1" dirty="0">
+                  <a:latin typeface="Times New Roman" panose="02020603050405020304" pitchFamily="18" charset="0"/>
+                  <a:cs typeface="Times New Roman" panose="02020603050405020304" pitchFamily="18" charset="0"/>
+                </a:rPr>
+                <a:t>Simple model, 1974 - 1993 </a:t>
+              </a:r>
+            </a:p>
+          </p:txBody>
+        </p:sp>
+        <p:sp>
+          <p:nvSpPr>
+            <p:cNvPr id="161" name="Oval 160">
+              <a:extLst>
+                <a:ext uri="{FF2B5EF4-FFF2-40B4-BE49-F238E27FC236}">
+                  <a16:creationId xmlns:a16="http://schemas.microsoft.com/office/drawing/2014/main" id="{6651817B-A40D-4F2A-ACED-BB82F116FE6F}"/>
+                </a:ext>
+              </a:extLst>
+            </p:cNvPr>
+            <p:cNvSpPr/>
+            <p:nvPr/>
+          </p:nvSpPr>
+          <p:spPr>
+            <a:xfrm>
+              <a:off x="7170562" y="6912987"/>
+              <a:ext cx="1594866" cy="792480"/>
+            </a:xfrm>
+            <a:prstGeom prst="ellipse">
+              <a:avLst/>
+            </a:prstGeom>
+            <a:solidFill>
+              <a:schemeClr val="accent2">
+                <a:lumMod val="60000"/>
+                <a:lumOff val="40000"/>
+              </a:schemeClr>
+            </a:solidFill>
+            <a:ln>
+              <a:solidFill>
+                <a:schemeClr val="tx1"/>
+              </a:solidFill>
+            </a:ln>
+          </p:spPr>
+          <p:style>
+            <a:lnRef idx="2">
+              <a:schemeClr val="accent1">
+                <a:shade val="50000"/>
+              </a:schemeClr>
+            </a:lnRef>
+            <a:fillRef idx="1">
+              <a:schemeClr val="accent1"/>
+            </a:fillRef>
+            <a:effectRef idx="0">
+              <a:schemeClr val="accent1"/>
+            </a:effectRef>
+            <a:fontRef idx="minor">
+              <a:schemeClr val="lt1"/>
+            </a:fontRef>
+          </p:style>
+          <p:txBody>
+            <a:bodyPr rot="0" spcFirstLastPara="0" vertOverflow="overflow" horzOverflow="overflow" vert="horz" wrap="none" lIns="79248" tIns="39624" rIns="79248" bIns="39624" numCol="1" spcCol="0" rtlCol="0" fromWordArt="0" anchor="ctr" anchorCtr="0" forceAA="0" compatLnSpc="1">
+              <a:prstTxWarp prst="textNoShape">
+                <a:avLst/>
+              </a:prstTxWarp>
+              <a:noAutofit/>
+            </a:bodyPr>
+            <a:lstStyle/>
+            <a:p>
+              <a:pPr algn="ctr"/>
+              <a:r>
+                <a:rPr lang="en-US" sz="1600" dirty="0">
                   <a:solidFill>
                     <a:schemeClr val="tx1"/>
                   </a:solidFill>
-                </a:ln>
-              </p:spPr>
-              <p:style>
-                <a:lnRef idx="1">
-                  <a:schemeClr val="accent1"/>
-                </a:lnRef>
-                <a:fillRef idx="0">
-                  <a:schemeClr val="accent1"/>
-                </a:fillRef>
-                <a:effectRef idx="0">
-                  <a:schemeClr val="accent1"/>
-                </a:effectRef>
-                <a:fontRef idx="minor">
-                  <a:schemeClr val="tx1"/>
-                </a:fontRef>
-              </p:style>
-            </p:cxnSp>
-            <p:cxnSp>
-              <p:nvCxnSpPr>
-                <p:cNvPr id="137" name="Straight Connector 136">
-                  <a:extLst>
-                    <a:ext uri="{FF2B5EF4-FFF2-40B4-BE49-F238E27FC236}">
-                      <a16:creationId xmlns:a16="http://schemas.microsoft.com/office/drawing/2014/main" id="{ADA6FEEB-279D-4853-B725-6FDE31D0F748}"/>
-                    </a:ext>
-                  </a:extLst>
-                </p:cNvPr>
-                <p:cNvCxnSpPr>
-                  <a:cxnSpLocks/>
-                  <a:stCxn id="124" idx="6"/>
-                  <a:endCxn id="125" idx="2"/>
-                </p:cNvCxnSpPr>
-                <p:nvPr/>
-              </p:nvCxnSpPr>
-              <p:spPr>
-                <a:xfrm flipV="1">
-                  <a:off x="5207255" y="5969916"/>
-                  <a:ext cx="3375631" cy="23037"/>
-                </a:xfrm>
-                <a:prstGeom prst="line">
-                  <a:avLst/>
-                </a:prstGeom>
-                <a:ln>
+                  <a:latin typeface="Times New Roman" panose="02020603050405020304" pitchFamily="18" charset="0"/>
+                  <a:cs typeface="Times New Roman" panose="02020603050405020304" pitchFamily="18" charset="0"/>
+                </a:rPr>
+                <a:t>Habitat</a:t>
+              </a:r>
+            </a:p>
+          </p:txBody>
+        </p:sp>
+        <p:sp>
+          <p:nvSpPr>
+            <p:cNvPr id="162" name="Oval 161">
+              <a:extLst>
+                <a:ext uri="{FF2B5EF4-FFF2-40B4-BE49-F238E27FC236}">
+                  <a16:creationId xmlns:a16="http://schemas.microsoft.com/office/drawing/2014/main" id="{11A55DF2-FBD3-4392-B120-74C904259895}"/>
+                </a:ext>
+              </a:extLst>
+            </p:cNvPr>
+            <p:cNvSpPr/>
+            <p:nvPr/>
+          </p:nvSpPr>
+          <p:spPr>
+            <a:xfrm>
+              <a:off x="4863166" y="6910786"/>
+              <a:ext cx="1594866" cy="792480"/>
+            </a:xfrm>
+            <a:prstGeom prst="ellipse">
+              <a:avLst/>
+            </a:prstGeom>
+            <a:solidFill>
+              <a:schemeClr val="accent4">
+                <a:lumMod val="60000"/>
+                <a:lumOff val="40000"/>
+              </a:schemeClr>
+            </a:solidFill>
+            <a:ln>
+              <a:solidFill>
+                <a:schemeClr val="tx1"/>
+              </a:solidFill>
+            </a:ln>
+          </p:spPr>
+          <p:style>
+            <a:lnRef idx="2">
+              <a:schemeClr val="accent1">
+                <a:shade val="50000"/>
+              </a:schemeClr>
+            </a:lnRef>
+            <a:fillRef idx="1">
+              <a:schemeClr val="accent1"/>
+            </a:fillRef>
+            <a:effectRef idx="0">
+              <a:schemeClr val="accent1"/>
+            </a:effectRef>
+            <a:fontRef idx="minor">
+              <a:schemeClr val="lt1"/>
+            </a:fontRef>
+          </p:style>
+          <p:txBody>
+            <a:bodyPr rot="0" spcFirstLastPara="0" vertOverflow="overflow" horzOverflow="overflow" vert="horz" wrap="none" lIns="79248" tIns="39624" rIns="79248" bIns="39624" numCol="1" spcCol="0" rtlCol="0" fromWordArt="0" anchor="ctr" anchorCtr="0" forceAA="0" compatLnSpc="1">
+              <a:prstTxWarp prst="textNoShape">
+                <a:avLst/>
+              </a:prstTxWarp>
+              <a:noAutofit/>
+            </a:bodyPr>
+            <a:lstStyle/>
+            <a:p>
+              <a:pPr algn="ctr"/>
+              <a:r>
+                <a:rPr lang="en-US" sz="1600" dirty="0">
                   <a:solidFill>
                     <a:schemeClr val="tx1"/>
                   </a:solidFill>
-                </a:ln>
-              </p:spPr>
-              <p:style>
-                <a:lnRef idx="1">
-                  <a:schemeClr val="accent1"/>
-                </a:lnRef>
-                <a:fillRef idx="0">
-                  <a:schemeClr val="accent1"/>
-                </a:fillRef>
-                <a:effectRef idx="0">
-                  <a:schemeClr val="accent1"/>
-                </a:effectRef>
-                <a:fontRef idx="minor">
-                  <a:schemeClr val="tx1"/>
-                </a:fontRef>
-              </p:style>
-            </p:cxnSp>
-            <p:cxnSp>
-              <p:nvCxnSpPr>
-                <p:cNvPr id="138" name="Straight Connector 137">
-                  <a:extLst>
-                    <a:ext uri="{FF2B5EF4-FFF2-40B4-BE49-F238E27FC236}">
-                      <a16:creationId xmlns:a16="http://schemas.microsoft.com/office/drawing/2014/main" id="{CAC38517-3E1F-4606-A8E3-9F29A6AC7895}"/>
-                    </a:ext>
-                  </a:extLst>
-                </p:cNvPr>
-                <p:cNvCxnSpPr>
-                  <a:cxnSpLocks/>
-                  <a:stCxn id="126" idx="0"/>
-                  <a:endCxn id="125" idx="4"/>
-                </p:cNvCxnSpPr>
-                <p:nvPr/>
-              </p:nvCxnSpPr>
-              <p:spPr>
-                <a:xfrm flipV="1">
-                  <a:off x="9503001" y="6427116"/>
-                  <a:ext cx="0" cy="506376"/>
-                </a:xfrm>
-                <a:prstGeom prst="line">
-                  <a:avLst/>
-                </a:prstGeom>
-                <a:ln>
+                  <a:latin typeface="Times New Roman" panose="02020603050405020304" pitchFamily="18" charset="0"/>
+                  <a:cs typeface="Times New Roman" panose="02020603050405020304" pitchFamily="18" charset="0"/>
+                </a:rPr>
+                <a:t>Water treatment</a:t>
+              </a:r>
+            </a:p>
+          </p:txBody>
+        </p:sp>
+        <p:sp>
+          <p:nvSpPr>
+            <p:cNvPr id="163" name="Oval 162">
+              <a:extLst>
+                <a:ext uri="{FF2B5EF4-FFF2-40B4-BE49-F238E27FC236}">
+                  <a16:creationId xmlns:a16="http://schemas.microsoft.com/office/drawing/2014/main" id="{95D9CC61-7102-4FD6-BE65-E85F16D2A12F}"/>
+                </a:ext>
+              </a:extLst>
+            </p:cNvPr>
+            <p:cNvSpPr/>
+            <p:nvPr/>
+          </p:nvSpPr>
+          <p:spPr>
+            <a:xfrm>
+              <a:off x="4863166" y="9047335"/>
+              <a:ext cx="1594866" cy="792480"/>
+            </a:xfrm>
+            <a:prstGeom prst="ellipse">
+              <a:avLst/>
+            </a:prstGeom>
+            <a:solidFill>
+              <a:schemeClr val="accent6">
+                <a:lumMod val="60000"/>
+                <a:lumOff val="40000"/>
+              </a:schemeClr>
+            </a:solidFill>
+            <a:ln>
+              <a:solidFill>
+                <a:schemeClr val="tx1"/>
+              </a:solidFill>
+            </a:ln>
+          </p:spPr>
+          <p:style>
+            <a:lnRef idx="2">
+              <a:schemeClr val="accent1">
+                <a:shade val="50000"/>
+              </a:schemeClr>
+            </a:lnRef>
+            <a:fillRef idx="1">
+              <a:schemeClr val="accent1"/>
+            </a:fillRef>
+            <a:effectRef idx="0">
+              <a:schemeClr val="accent1"/>
+            </a:effectRef>
+            <a:fontRef idx="minor">
+              <a:schemeClr val="lt1"/>
+            </a:fontRef>
+          </p:style>
+          <p:txBody>
+            <a:bodyPr rot="0" spcFirstLastPara="0" vertOverflow="overflow" horzOverflow="overflow" vert="horz" wrap="none" lIns="79248" tIns="39624" rIns="79248" bIns="39624" numCol="1" spcCol="0" rtlCol="0" fromWordArt="0" anchor="ctr" anchorCtr="0" forceAA="0" compatLnSpc="1">
+              <a:prstTxWarp prst="textNoShape">
+                <a:avLst/>
+              </a:prstTxWarp>
+              <a:noAutofit/>
+            </a:bodyPr>
+            <a:lstStyle/>
+            <a:p>
+              <a:pPr algn="ctr"/>
+              <a:r>
+                <a:rPr lang="en-US" sz="1600" dirty="0">
                   <a:solidFill>
                     <a:schemeClr val="tx1"/>
                   </a:solidFill>
-                </a:ln>
-              </p:spPr>
-              <p:style>
-                <a:lnRef idx="1">
-                  <a:schemeClr val="accent1"/>
-                </a:lnRef>
-                <a:fillRef idx="0">
-                  <a:schemeClr val="accent1"/>
-                </a:fillRef>
-                <a:effectRef idx="0">
-                  <a:schemeClr val="accent1"/>
-                </a:effectRef>
-                <a:fontRef idx="minor">
-                  <a:schemeClr val="tx1"/>
-                </a:fontRef>
-              </p:style>
-            </p:cxnSp>
-          </p:grpSp>
-        </p:grpSp>
-        <p:grpSp>
-          <p:nvGrpSpPr>
-            <p:cNvPr id="172" name="Group 171">
+                  <a:latin typeface="Times New Roman" panose="02020603050405020304" pitchFamily="18" charset="0"/>
+                  <a:cs typeface="Times New Roman" panose="02020603050405020304" pitchFamily="18" charset="0"/>
+                </a:rPr>
+                <a:t>Salinity</a:t>
+              </a:r>
+            </a:p>
+          </p:txBody>
+        </p:sp>
+        <p:sp>
+          <p:nvSpPr>
+            <p:cNvPr id="164" name="Oval 163">
               <a:extLst>
                 <a:ext uri="{FF2B5EF4-FFF2-40B4-BE49-F238E27FC236}">
-                  <a16:creationId xmlns:a16="http://schemas.microsoft.com/office/drawing/2014/main" id="{4F7ADE72-2F57-4C27-8300-CF128BFCB058}"/>
+                  <a16:creationId xmlns:a16="http://schemas.microsoft.com/office/drawing/2014/main" id="{AFB846BF-E53C-453B-8486-C93A18E22F7F}"/>
                 </a:ext>
               </a:extLst>
             </p:cNvPr>
-            <p:cNvGrpSpPr/>
+            <p:cNvSpPr/>
             <p:nvPr/>
-          </p:nvGrpSpPr>
-          <p:grpSpPr>
+          </p:nvSpPr>
+          <p:spPr>
             <a:xfrm>
-              <a:off x="50890" y="5776816"/>
-              <a:ext cx="3902262" cy="3558030"/>
-              <a:chOff x="879335" y="8580442"/>
-              <a:chExt cx="4502610" cy="4105419"/>
+              <a:off x="7170562" y="9039517"/>
+              <a:ext cx="1594866" cy="792480"/>
             </a:xfrm>
-          </p:grpSpPr>
-          <p:grpSp>
-            <p:nvGrpSpPr>
-              <p:cNvPr id="159" name="Group 158">
-                <a:extLst>
-                  <a:ext uri="{FF2B5EF4-FFF2-40B4-BE49-F238E27FC236}">
-                    <a16:creationId xmlns:a16="http://schemas.microsoft.com/office/drawing/2014/main" id="{3A65135C-F435-49DF-B343-3929AE5A2C3D}"/>
-                  </a:ext>
-                </a:extLst>
-              </p:cNvPr>
-              <p:cNvGrpSpPr/>
-              <p:nvPr/>
-            </p:nvGrpSpPr>
-            <p:grpSpPr>
-              <a:xfrm>
-                <a:off x="879335" y="9306213"/>
-                <a:ext cx="4502610" cy="3379648"/>
-                <a:chOff x="824743" y="8219378"/>
-                <a:chExt cx="4502610" cy="3379648"/>
-              </a:xfrm>
-            </p:grpSpPr>
-            <p:sp>
-              <p:nvSpPr>
-                <p:cNvPr id="9" name="Oval 8">
-                  <a:extLst>
-                    <a:ext uri="{FF2B5EF4-FFF2-40B4-BE49-F238E27FC236}">
-                      <a16:creationId xmlns:a16="http://schemas.microsoft.com/office/drawing/2014/main" id="{5D37C73D-71CE-4B67-9B93-A9FB976C4359}"/>
-                    </a:ext>
-                  </a:extLst>
-                </p:cNvPr>
-                <p:cNvSpPr/>
-                <p:nvPr/>
-              </p:nvSpPr>
-              <p:spPr>
-                <a:xfrm>
-                  <a:off x="3487123" y="8221918"/>
-                  <a:ext cx="1840230" cy="914400"/>
-                </a:xfrm>
-                <a:prstGeom prst="ellipse">
-                  <a:avLst/>
-                </a:prstGeom>
-                <a:solidFill>
-                  <a:schemeClr val="accent2">
-                    <a:lumMod val="60000"/>
-                    <a:lumOff val="40000"/>
-                  </a:schemeClr>
-                </a:solidFill>
-                <a:ln>
+            <a:prstGeom prst="ellipse">
+              <a:avLst/>
+            </a:prstGeom>
+            <a:solidFill>
+              <a:schemeClr val="accent1">
+                <a:lumMod val="60000"/>
+                <a:lumOff val="40000"/>
+              </a:schemeClr>
+            </a:solidFill>
+            <a:ln>
+              <a:solidFill>
+                <a:schemeClr val="tx1"/>
+              </a:solidFill>
+            </a:ln>
+          </p:spPr>
+          <p:style>
+            <a:lnRef idx="2">
+              <a:schemeClr val="accent1">
+                <a:shade val="50000"/>
+              </a:schemeClr>
+            </a:lnRef>
+            <a:fillRef idx="1">
+              <a:schemeClr val="accent1"/>
+            </a:fillRef>
+            <a:effectRef idx="0">
+              <a:schemeClr val="accent1"/>
+            </a:effectRef>
+            <a:fontRef idx="minor">
+              <a:schemeClr val="lt1"/>
+            </a:fontRef>
+          </p:style>
+          <p:txBody>
+            <a:bodyPr rot="0" spcFirstLastPara="0" vertOverflow="overflow" horzOverflow="overflow" vert="horz" wrap="none" lIns="79248" tIns="39624" rIns="79248" bIns="39624" numCol="1" spcCol="0" rtlCol="0" fromWordArt="0" anchor="ctr" anchorCtr="0" forceAA="0" compatLnSpc="1">
+              <a:prstTxWarp prst="textNoShape">
+                <a:avLst/>
+              </a:prstTxWarp>
+              <a:noAutofit/>
+            </a:bodyPr>
+            <a:lstStyle/>
+            <a:p>
+              <a:pPr algn="ctr"/>
+              <a:r>
+                <a:rPr lang="en-US" sz="1600" dirty="0">
                   <a:solidFill>
                     <a:schemeClr val="tx1"/>
                   </a:solidFill>
-                </a:ln>
-              </p:spPr>
-              <p:style>
-                <a:lnRef idx="2">
-                  <a:schemeClr val="accent1">
-                    <a:shade val="50000"/>
-                  </a:schemeClr>
-                </a:lnRef>
-                <a:fillRef idx="1">
-                  <a:schemeClr val="accent1"/>
-                </a:fillRef>
-                <a:effectRef idx="0">
-                  <a:schemeClr val="accent1"/>
-                </a:effectRef>
-                <a:fontRef idx="minor">
-                  <a:schemeClr val="lt1"/>
-                </a:fontRef>
-              </p:style>
-              <p:txBody>
-                <a:bodyPr rot="0" spcFirstLastPara="0" vertOverflow="overflow" horzOverflow="overflow" vert="horz" wrap="none" lIns="79248" tIns="39624" rIns="79248" bIns="39624" numCol="1" spcCol="0" rtlCol="0" fromWordArt="0" anchor="ctr" anchorCtr="0" forceAA="0" compatLnSpc="1">
-                  <a:prstTxWarp prst="textNoShape">
-                    <a:avLst/>
-                  </a:prstTxWarp>
-                  <a:noAutofit/>
-                </a:bodyPr>
-                <a:lstStyle/>
-                <a:p>
-                  <a:pPr algn="ctr"/>
-                  <a:r>
-                    <a:rPr lang="en-US" sz="1600" dirty="0">
-                      <a:solidFill>
-                        <a:schemeClr val="tx1"/>
-                      </a:solidFill>
-                      <a:latin typeface="Times New Roman" panose="02020603050405020304" pitchFamily="18" charset="0"/>
-                      <a:cs typeface="Times New Roman" panose="02020603050405020304" pitchFamily="18" charset="0"/>
-                    </a:rPr>
-                    <a:t>Habitat</a:t>
-                  </a:r>
-                </a:p>
-              </p:txBody>
-            </p:sp>
-            <p:sp>
-              <p:nvSpPr>
-                <p:cNvPr id="15" name="Oval 14">
-                  <a:extLst>
-                    <a:ext uri="{FF2B5EF4-FFF2-40B4-BE49-F238E27FC236}">
-                      <a16:creationId xmlns:a16="http://schemas.microsoft.com/office/drawing/2014/main" id="{66CB8F8F-AFE8-49AC-B42F-8398B8067BC7}"/>
-                    </a:ext>
-                  </a:extLst>
-                </p:cNvPr>
-                <p:cNvSpPr/>
-                <p:nvPr/>
-              </p:nvSpPr>
-              <p:spPr>
-                <a:xfrm>
-                  <a:off x="824743" y="8219378"/>
-                  <a:ext cx="1840230" cy="914400"/>
-                </a:xfrm>
-                <a:prstGeom prst="ellipse">
-                  <a:avLst/>
-                </a:prstGeom>
-                <a:solidFill>
-                  <a:schemeClr val="accent4">
-                    <a:lumMod val="60000"/>
-                    <a:lumOff val="40000"/>
-                  </a:schemeClr>
-                </a:solidFill>
-                <a:ln>
-                  <a:solidFill>
-                    <a:schemeClr val="tx1"/>
-                  </a:solidFill>
-                </a:ln>
-              </p:spPr>
-              <p:style>
-                <a:lnRef idx="2">
-                  <a:schemeClr val="accent1">
-                    <a:shade val="50000"/>
-                  </a:schemeClr>
-                </a:lnRef>
-                <a:fillRef idx="1">
-                  <a:schemeClr val="accent1"/>
-                </a:fillRef>
-                <a:effectRef idx="0">
-                  <a:schemeClr val="accent1"/>
-                </a:effectRef>
-                <a:fontRef idx="minor">
-                  <a:schemeClr val="lt1"/>
-                </a:fontRef>
-              </p:style>
-              <p:txBody>
-                <a:bodyPr rot="0" spcFirstLastPara="0" vertOverflow="overflow" horzOverflow="overflow" vert="horz" wrap="none" lIns="79248" tIns="39624" rIns="79248" bIns="39624" numCol="1" spcCol="0" rtlCol="0" fromWordArt="0" anchor="ctr" anchorCtr="0" forceAA="0" compatLnSpc="1">
-                  <a:prstTxWarp prst="textNoShape">
-                    <a:avLst/>
-                  </a:prstTxWarp>
-                  <a:noAutofit/>
-                </a:bodyPr>
-                <a:lstStyle/>
-                <a:p>
-                  <a:pPr algn="ctr"/>
-                  <a:r>
-                    <a:rPr lang="en-US" sz="1600" dirty="0">
-                      <a:solidFill>
-                        <a:schemeClr val="tx1"/>
-                      </a:solidFill>
-                      <a:latin typeface="Times New Roman" panose="02020603050405020304" pitchFamily="18" charset="0"/>
-                      <a:cs typeface="Times New Roman" panose="02020603050405020304" pitchFamily="18" charset="0"/>
-                    </a:rPr>
-                    <a:t>Water treatment</a:t>
-                  </a:r>
-                </a:p>
-              </p:txBody>
-            </p:sp>
-            <p:sp>
-              <p:nvSpPr>
-                <p:cNvPr id="18" name="Oval 17">
-                  <a:extLst>
-                    <a:ext uri="{FF2B5EF4-FFF2-40B4-BE49-F238E27FC236}">
-                      <a16:creationId xmlns:a16="http://schemas.microsoft.com/office/drawing/2014/main" id="{73A24EC1-09B3-4DB3-B075-1DFCB791DC27}"/>
-                    </a:ext>
-                  </a:extLst>
-                </p:cNvPr>
-                <p:cNvSpPr/>
-                <p:nvPr/>
-              </p:nvSpPr>
-              <p:spPr>
-                <a:xfrm>
-                  <a:off x="824743" y="10684626"/>
-                  <a:ext cx="1840230" cy="914400"/>
-                </a:xfrm>
-                <a:prstGeom prst="ellipse">
-                  <a:avLst/>
-                </a:prstGeom>
-                <a:solidFill>
-                  <a:schemeClr val="accent6">
-                    <a:lumMod val="60000"/>
-                    <a:lumOff val="40000"/>
-                  </a:schemeClr>
-                </a:solidFill>
-                <a:ln>
-                  <a:solidFill>
-                    <a:schemeClr val="tx1"/>
-                  </a:solidFill>
-                </a:ln>
-              </p:spPr>
-              <p:style>
-                <a:lnRef idx="2">
-                  <a:schemeClr val="accent1">
-                    <a:shade val="50000"/>
-                  </a:schemeClr>
-                </a:lnRef>
-                <a:fillRef idx="1">
-                  <a:schemeClr val="accent1"/>
-                </a:fillRef>
-                <a:effectRef idx="0">
-                  <a:schemeClr val="accent1"/>
-                </a:effectRef>
-                <a:fontRef idx="minor">
-                  <a:schemeClr val="lt1"/>
-                </a:fontRef>
-              </p:style>
-              <p:txBody>
-                <a:bodyPr rot="0" spcFirstLastPara="0" vertOverflow="overflow" horzOverflow="overflow" vert="horz" wrap="none" lIns="79248" tIns="39624" rIns="79248" bIns="39624" numCol="1" spcCol="0" rtlCol="0" fromWordArt="0" anchor="ctr" anchorCtr="0" forceAA="0" compatLnSpc="1">
-                  <a:prstTxWarp prst="textNoShape">
-                    <a:avLst/>
-                  </a:prstTxWarp>
-                  <a:noAutofit/>
-                </a:bodyPr>
-                <a:lstStyle/>
-                <a:p>
-                  <a:pPr algn="ctr"/>
-                  <a:r>
-                    <a:rPr lang="en-US" sz="1600" dirty="0">
-                      <a:solidFill>
-                        <a:schemeClr val="tx1"/>
-                      </a:solidFill>
-                      <a:latin typeface="Times New Roman" panose="02020603050405020304" pitchFamily="18" charset="0"/>
-                      <a:cs typeface="Times New Roman" panose="02020603050405020304" pitchFamily="18" charset="0"/>
-                    </a:rPr>
-                    <a:t>Salinity</a:t>
-                  </a:r>
-                </a:p>
-              </p:txBody>
-            </p:sp>
-            <p:sp>
-              <p:nvSpPr>
-                <p:cNvPr id="19" name="Oval 18">
-                  <a:extLst>
-                    <a:ext uri="{FF2B5EF4-FFF2-40B4-BE49-F238E27FC236}">
-                      <a16:creationId xmlns:a16="http://schemas.microsoft.com/office/drawing/2014/main" id="{1FDEEEB4-815A-4040-8E06-E4A4BA756CF8}"/>
-                    </a:ext>
-                  </a:extLst>
-                </p:cNvPr>
-                <p:cNvSpPr/>
-                <p:nvPr/>
-              </p:nvSpPr>
-              <p:spPr>
-                <a:xfrm>
-                  <a:off x="3487123" y="10675605"/>
-                  <a:ext cx="1840230" cy="914400"/>
-                </a:xfrm>
-                <a:prstGeom prst="ellipse">
-                  <a:avLst/>
-                </a:prstGeom>
-                <a:solidFill>
-                  <a:schemeClr val="accent1">
-                    <a:lumMod val="60000"/>
-                    <a:lumOff val="40000"/>
-                  </a:schemeClr>
-                </a:solidFill>
-                <a:ln>
-                  <a:solidFill>
-                    <a:schemeClr val="tx1"/>
-                  </a:solidFill>
-                </a:ln>
-              </p:spPr>
-              <p:style>
-                <a:lnRef idx="2">
-                  <a:schemeClr val="accent1">
-                    <a:shade val="50000"/>
-                  </a:schemeClr>
-                </a:lnRef>
-                <a:fillRef idx="1">
-                  <a:schemeClr val="accent1"/>
-                </a:fillRef>
-                <a:effectRef idx="0">
-                  <a:schemeClr val="accent1"/>
-                </a:effectRef>
-                <a:fontRef idx="minor">
-                  <a:schemeClr val="lt1"/>
-                </a:fontRef>
-              </p:style>
-              <p:txBody>
-                <a:bodyPr rot="0" spcFirstLastPara="0" vertOverflow="overflow" horzOverflow="overflow" vert="horz" wrap="none" lIns="79248" tIns="39624" rIns="79248" bIns="39624" numCol="1" spcCol="0" rtlCol="0" fromWordArt="0" anchor="ctr" anchorCtr="0" forceAA="0" compatLnSpc="1">
-                  <a:prstTxWarp prst="textNoShape">
-                    <a:avLst/>
-                  </a:prstTxWarp>
-                  <a:noAutofit/>
-                </a:bodyPr>
-                <a:lstStyle/>
-                <a:p>
-                  <a:pPr algn="ctr"/>
-                  <a:r>
-                    <a:rPr lang="en-US" sz="1600" dirty="0">
-                      <a:solidFill>
-                        <a:schemeClr val="tx1"/>
-                      </a:solidFill>
-                      <a:latin typeface="Times New Roman" panose="02020603050405020304" pitchFamily="18" charset="0"/>
-                      <a:cs typeface="Times New Roman" panose="02020603050405020304" pitchFamily="18" charset="0"/>
-                    </a:rPr>
-                    <a:t>Chlorophyll</a:t>
-                  </a:r>
-                </a:p>
-              </p:txBody>
-            </p:sp>
-            <p:cxnSp>
-              <p:nvCxnSpPr>
-                <p:cNvPr id="26" name="Straight Connector 25">
-                  <a:extLst>
-                    <a:ext uri="{FF2B5EF4-FFF2-40B4-BE49-F238E27FC236}">
-                      <a16:creationId xmlns:a16="http://schemas.microsoft.com/office/drawing/2014/main" id="{5E186043-5E0A-45C9-865B-40F77502E4D0}"/>
-                    </a:ext>
-                  </a:extLst>
-                </p:cNvPr>
-                <p:cNvCxnSpPr>
-                  <a:cxnSpLocks/>
-                  <a:stCxn id="9" idx="4"/>
-                  <a:endCxn id="18" idx="0"/>
-                </p:cNvCxnSpPr>
-                <p:nvPr/>
-              </p:nvCxnSpPr>
-              <p:spPr>
-                <a:xfrm flipH="1">
-                  <a:off x="1744858" y="9136318"/>
-                  <a:ext cx="2662380" cy="1548308"/>
-                </a:xfrm>
-                <a:prstGeom prst="line">
-                  <a:avLst/>
-                </a:prstGeom>
-                <a:ln>
-                  <a:solidFill>
-                    <a:schemeClr val="tx1"/>
-                  </a:solidFill>
-                </a:ln>
-              </p:spPr>
-              <p:style>
-                <a:lnRef idx="1">
-                  <a:schemeClr val="accent1"/>
-                </a:lnRef>
-                <a:fillRef idx="0">
-                  <a:schemeClr val="accent1"/>
-                </a:fillRef>
-                <a:effectRef idx="0">
-                  <a:schemeClr val="accent1"/>
-                </a:effectRef>
-                <a:fontRef idx="minor">
-                  <a:schemeClr val="tx1"/>
-                </a:fontRef>
-              </p:style>
-            </p:cxnSp>
-            <p:cxnSp>
-              <p:nvCxnSpPr>
-                <p:cNvPr id="29" name="Straight Connector 28">
-                  <a:extLst>
-                    <a:ext uri="{FF2B5EF4-FFF2-40B4-BE49-F238E27FC236}">
-                      <a16:creationId xmlns:a16="http://schemas.microsoft.com/office/drawing/2014/main" id="{38223B80-5538-4BE8-B68B-BD0E377C29DC}"/>
-                    </a:ext>
-                  </a:extLst>
-                </p:cNvPr>
-                <p:cNvCxnSpPr>
-                  <a:cxnSpLocks/>
-                  <a:stCxn id="15" idx="4"/>
-                  <a:endCxn id="18" idx="0"/>
-                </p:cNvCxnSpPr>
-                <p:nvPr/>
-              </p:nvCxnSpPr>
-              <p:spPr>
-                <a:xfrm>
-                  <a:off x="1744858" y="9133778"/>
-                  <a:ext cx="0" cy="1550848"/>
-                </a:xfrm>
-                <a:prstGeom prst="line">
-                  <a:avLst/>
-                </a:prstGeom>
-                <a:ln>
-                  <a:solidFill>
-                    <a:schemeClr val="tx1"/>
-                  </a:solidFill>
-                </a:ln>
-              </p:spPr>
-              <p:style>
-                <a:lnRef idx="1">
-                  <a:schemeClr val="accent1"/>
-                </a:lnRef>
-                <a:fillRef idx="0">
-                  <a:schemeClr val="accent1"/>
-                </a:fillRef>
-                <a:effectRef idx="0">
-                  <a:schemeClr val="accent1"/>
-                </a:effectRef>
-                <a:fontRef idx="minor">
-                  <a:schemeClr val="tx1"/>
-                </a:fontRef>
-              </p:style>
-            </p:cxnSp>
-            <p:cxnSp>
-              <p:nvCxnSpPr>
-                <p:cNvPr id="46" name="Straight Connector 45">
-                  <a:extLst>
-                    <a:ext uri="{FF2B5EF4-FFF2-40B4-BE49-F238E27FC236}">
-                      <a16:creationId xmlns:a16="http://schemas.microsoft.com/office/drawing/2014/main" id="{C530654E-AF39-4F21-80BC-953D0EC34EAE}"/>
-                    </a:ext>
-                  </a:extLst>
-                </p:cNvPr>
-                <p:cNvCxnSpPr>
-                  <a:cxnSpLocks/>
-                  <a:stCxn id="9" idx="4"/>
-                  <a:endCxn id="19" idx="0"/>
-                </p:cNvCxnSpPr>
-                <p:nvPr/>
-              </p:nvCxnSpPr>
-              <p:spPr>
-                <a:xfrm>
-                  <a:off x="4407238" y="9136318"/>
-                  <a:ext cx="0" cy="1539287"/>
-                </a:xfrm>
-                <a:prstGeom prst="line">
-                  <a:avLst/>
-                </a:prstGeom>
-                <a:ln>
-                  <a:solidFill>
-                    <a:schemeClr val="tx1"/>
-                  </a:solidFill>
-                </a:ln>
-              </p:spPr>
-              <p:style>
-                <a:lnRef idx="1">
-                  <a:schemeClr val="accent1"/>
-                </a:lnRef>
-                <a:fillRef idx="0">
-                  <a:schemeClr val="accent1"/>
-                </a:fillRef>
-                <a:effectRef idx="0">
-                  <a:schemeClr val="accent1"/>
-                </a:effectRef>
-                <a:fontRef idx="minor">
-                  <a:schemeClr val="tx1"/>
-                </a:fontRef>
-              </p:style>
-            </p:cxnSp>
-            <p:cxnSp>
-              <p:nvCxnSpPr>
-                <p:cNvPr id="47" name="Straight Connector 46">
-                  <a:extLst>
-                    <a:ext uri="{FF2B5EF4-FFF2-40B4-BE49-F238E27FC236}">
-                      <a16:creationId xmlns:a16="http://schemas.microsoft.com/office/drawing/2014/main" id="{8243526D-0E51-44EB-933F-F5F64139CE8A}"/>
-                    </a:ext>
-                  </a:extLst>
-                </p:cNvPr>
-                <p:cNvCxnSpPr>
-                  <a:cxnSpLocks/>
-                  <a:stCxn id="15" idx="4"/>
-                  <a:endCxn id="19" idx="0"/>
-                </p:cNvCxnSpPr>
-                <p:nvPr/>
-              </p:nvCxnSpPr>
-              <p:spPr>
-                <a:xfrm>
-                  <a:off x="1744858" y="9133778"/>
-                  <a:ext cx="2662380" cy="1541827"/>
-                </a:xfrm>
-                <a:prstGeom prst="line">
-                  <a:avLst/>
-                </a:prstGeom>
-                <a:ln>
-                  <a:solidFill>
-                    <a:schemeClr val="tx1"/>
-                  </a:solidFill>
-                </a:ln>
-              </p:spPr>
-              <p:style>
-                <a:lnRef idx="1">
-                  <a:schemeClr val="accent1"/>
-                </a:lnRef>
-                <a:fillRef idx="0">
-                  <a:schemeClr val="accent1"/>
-                </a:fillRef>
-                <a:effectRef idx="0">
-                  <a:schemeClr val="accent1"/>
-                </a:effectRef>
-                <a:fontRef idx="minor">
-                  <a:schemeClr val="tx1"/>
-                </a:fontRef>
-              </p:style>
-            </p:cxnSp>
-            <p:cxnSp>
-              <p:nvCxnSpPr>
-                <p:cNvPr id="49" name="Straight Connector 48">
-                  <a:extLst>
-                    <a:ext uri="{FF2B5EF4-FFF2-40B4-BE49-F238E27FC236}">
-                      <a16:creationId xmlns:a16="http://schemas.microsoft.com/office/drawing/2014/main" id="{B10F0B96-09D0-4E09-AD2B-9CA1FB3C3486}"/>
-                    </a:ext>
-                  </a:extLst>
-                </p:cNvPr>
-                <p:cNvCxnSpPr>
-                  <a:cxnSpLocks/>
-                  <a:stCxn id="18" idx="6"/>
-                  <a:endCxn id="19" idx="2"/>
-                </p:cNvCxnSpPr>
-                <p:nvPr/>
-              </p:nvCxnSpPr>
-              <p:spPr>
-                <a:xfrm flipV="1">
-                  <a:off x="2664973" y="11132805"/>
-                  <a:ext cx="822150" cy="9021"/>
-                </a:xfrm>
-                <a:prstGeom prst="line">
-                  <a:avLst/>
-                </a:prstGeom>
-                <a:ln>
-                  <a:solidFill>
-                    <a:schemeClr val="tx1"/>
-                  </a:solidFill>
-                </a:ln>
-              </p:spPr>
-              <p:style>
-                <a:lnRef idx="1">
-                  <a:schemeClr val="accent1"/>
-                </a:lnRef>
-                <a:fillRef idx="0">
-                  <a:schemeClr val="accent1"/>
-                </a:fillRef>
-                <a:effectRef idx="0">
-                  <a:schemeClr val="accent1"/>
-                </a:effectRef>
-                <a:fontRef idx="minor">
-                  <a:schemeClr val="tx1"/>
-                </a:fontRef>
-              </p:style>
-            </p:cxnSp>
-          </p:grpSp>
-          <p:sp>
-            <p:nvSpPr>
-              <p:cNvPr id="170" name="TextBox 169">
-                <a:extLst>
-                  <a:ext uri="{FF2B5EF4-FFF2-40B4-BE49-F238E27FC236}">
-                    <a16:creationId xmlns:a16="http://schemas.microsoft.com/office/drawing/2014/main" id="{7052E695-0AED-4BEE-82B5-D01D58018492}"/>
-                  </a:ext>
-                </a:extLst>
-              </p:cNvPr>
-              <p:cNvSpPr txBox="1"/>
-              <p:nvPr/>
-            </p:nvSpPr>
-            <p:spPr>
-              <a:xfrm>
-                <a:off x="1286225" y="8580442"/>
-                <a:ext cx="3721803" cy="475870"/>
-              </a:xfrm>
-              <a:prstGeom prst="rect">
-                <a:avLst/>
-              </a:prstGeom>
-              <a:noFill/>
-            </p:spPr>
-            <p:txBody>
-              <a:bodyPr wrap="none" rtlCol="0">
-                <a:spAutoFit/>
-              </a:bodyPr>
-              <a:lstStyle/>
-              <a:p>
-                <a:r>
-                  <a:rPr lang="en-US" sz="2080" b="1" dirty="0">
-                    <a:latin typeface="Times New Roman" panose="02020603050405020304" pitchFamily="18" charset="0"/>
-                    <a:cs typeface="Times New Roman" panose="02020603050405020304" pitchFamily="18" charset="0"/>
-                  </a:rPr>
-                  <a:t>Simple model, 1974 - 1993 </a:t>
-                </a:r>
-              </a:p>
-            </p:txBody>
-          </p:sp>
-        </p:grpSp>
-        <p:grpSp>
-          <p:nvGrpSpPr>
-            <p:cNvPr id="173" name="Group 172">
+                  <a:latin typeface="Times New Roman" panose="02020603050405020304" pitchFamily="18" charset="0"/>
+                  <a:cs typeface="Times New Roman" panose="02020603050405020304" pitchFamily="18" charset="0"/>
+                </a:rPr>
+                <a:t>Chlorophyll</a:t>
+              </a:r>
+            </a:p>
+          </p:txBody>
+        </p:sp>
+        <p:cxnSp>
+          <p:nvCxnSpPr>
+            <p:cNvPr id="165" name="Straight Connector 164">
               <a:extLst>
                 <a:ext uri="{FF2B5EF4-FFF2-40B4-BE49-F238E27FC236}">
-                  <a16:creationId xmlns:a16="http://schemas.microsoft.com/office/drawing/2014/main" id="{60CB1F81-E939-4539-A78E-51F6CD987C29}"/>
+                  <a16:creationId xmlns:a16="http://schemas.microsoft.com/office/drawing/2014/main" id="{672A82A0-459A-4CB0-82C8-1111A696A21A}"/>
                 </a:ext>
               </a:extLst>
             </p:cNvPr>
-            <p:cNvGrpSpPr/>
+            <p:cNvCxnSpPr>
+              <a:cxnSpLocks/>
+              <a:stCxn id="161" idx="4"/>
+            </p:cNvCxnSpPr>
             <p:nvPr/>
-          </p:nvGrpSpPr>
-          <p:grpSpPr>
+          </p:nvCxnSpPr>
+          <p:spPr>
+            <a:xfrm flipH="1">
+              <a:off x="5887502" y="7705467"/>
+              <a:ext cx="2080493" cy="1362800"/>
+            </a:xfrm>
+            <a:prstGeom prst="line">
+              <a:avLst/>
+            </a:prstGeom>
+            <a:ln>
+              <a:solidFill>
+                <a:schemeClr val="tx1"/>
+              </a:solidFill>
+              <a:tailEnd type="arrow" w="lg" len="lg"/>
+            </a:ln>
+          </p:spPr>
+          <p:style>
+            <a:lnRef idx="1">
+              <a:schemeClr val="accent1"/>
+            </a:lnRef>
+            <a:fillRef idx="0">
+              <a:schemeClr val="accent1"/>
+            </a:fillRef>
+            <a:effectRef idx="0">
+              <a:schemeClr val="accent1"/>
+            </a:effectRef>
+            <a:fontRef idx="minor">
+              <a:schemeClr val="tx1"/>
+            </a:fontRef>
+          </p:style>
+        </p:cxnSp>
+        <p:cxnSp>
+          <p:nvCxnSpPr>
+            <p:cNvPr id="166" name="Straight Connector 165">
+              <a:extLst>
+                <a:ext uri="{FF2B5EF4-FFF2-40B4-BE49-F238E27FC236}">
+                  <a16:creationId xmlns:a16="http://schemas.microsoft.com/office/drawing/2014/main" id="{713F06C4-A011-44D2-9F7F-5546CF50C7FC}"/>
+                </a:ext>
+              </a:extLst>
+            </p:cNvPr>
+            <p:cNvCxnSpPr>
+              <a:cxnSpLocks/>
+              <a:stCxn id="162" idx="4"/>
+              <a:endCxn id="163" idx="0"/>
+            </p:cNvCxnSpPr>
+            <p:nvPr/>
+          </p:nvCxnSpPr>
+          <p:spPr>
             <a:xfrm>
-              <a:off x="4549263" y="5776819"/>
-              <a:ext cx="3902262" cy="3558031"/>
-              <a:chOff x="6069765" y="8580441"/>
-              <a:chExt cx="4502610" cy="4105420"/>
+              <a:off x="5660599" y="7703266"/>
+              <a:ext cx="0" cy="1344069"/>
             </a:xfrm>
-          </p:grpSpPr>
-          <p:grpSp>
-            <p:nvGrpSpPr>
-              <p:cNvPr id="160" name="Group 159">
-                <a:extLst>
-                  <a:ext uri="{FF2B5EF4-FFF2-40B4-BE49-F238E27FC236}">
-                    <a16:creationId xmlns:a16="http://schemas.microsoft.com/office/drawing/2014/main" id="{5344EFDD-5803-4B9F-970B-F3D6E5C1C252}"/>
-                  </a:ext>
-                </a:extLst>
-              </p:cNvPr>
-              <p:cNvGrpSpPr/>
-              <p:nvPr/>
-            </p:nvGrpSpPr>
-            <p:grpSpPr>
-              <a:xfrm>
-                <a:off x="6069765" y="9306213"/>
-                <a:ext cx="4502610" cy="3379648"/>
-                <a:chOff x="824743" y="8219378"/>
-                <a:chExt cx="4502610" cy="3379648"/>
-              </a:xfrm>
-            </p:grpSpPr>
-            <p:sp>
-              <p:nvSpPr>
-                <p:cNvPr id="161" name="Oval 160">
-                  <a:extLst>
-                    <a:ext uri="{FF2B5EF4-FFF2-40B4-BE49-F238E27FC236}">
-                      <a16:creationId xmlns:a16="http://schemas.microsoft.com/office/drawing/2014/main" id="{6651817B-A40D-4F2A-ACED-BB82F116FE6F}"/>
-                    </a:ext>
-                  </a:extLst>
-                </p:cNvPr>
-                <p:cNvSpPr/>
-                <p:nvPr/>
-              </p:nvSpPr>
-              <p:spPr>
-                <a:xfrm>
-                  <a:off x="3487123" y="8221918"/>
-                  <a:ext cx="1840230" cy="914400"/>
-                </a:xfrm>
-                <a:prstGeom prst="ellipse">
-                  <a:avLst/>
-                </a:prstGeom>
-                <a:solidFill>
-                  <a:schemeClr val="accent2">
-                    <a:lumMod val="60000"/>
-                    <a:lumOff val="40000"/>
-                  </a:schemeClr>
-                </a:solidFill>
-                <a:ln>
-                  <a:solidFill>
-                    <a:schemeClr val="tx1"/>
-                  </a:solidFill>
-                </a:ln>
-              </p:spPr>
-              <p:style>
-                <a:lnRef idx="2">
-                  <a:schemeClr val="accent1">
-                    <a:shade val="50000"/>
-                  </a:schemeClr>
-                </a:lnRef>
-                <a:fillRef idx="1">
-                  <a:schemeClr val="accent1"/>
-                </a:fillRef>
-                <a:effectRef idx="0">
-                  <a:schemeClr val="accent1"/>
-                </a:effectRef>
-                <a:fontRef idx="minor">
-                  <a:schemeClr val="lt1"/>
-                </a:fontRef>
-              </p:style>
-              <p:txBody>
-                <a:bodyPr rot="0" spcFirstLastPara="0" vertOverflow="overflow" horzOverflow="overflow" vert="horz" wrap="none" lIns="79248" tIns="39624" rIns="79248" bIns="39624" numCol="1" spcCol="0" rtlCol="0" fromWordArt="0" anchor="ctr" anchorCtr="0" forceAA="0" compatLnSpc="1">
-                  <a:prstTxWarp prst="textNoShape">
-                    <a:avLst/>
-                  </a:prstTxWarp>
-                  <a:noAutofit/>
-                </a:bodyPr>
-                <a:lstStyle/>
-                <a:p>
-                  <a:pPr algn="ctr"/>
-                  <a:r>
-                    <a:rPr lang="en-US" sz="1600" dirty="0">
-                      <a:solidFill>
-                        <a:schemeClr val="tx1"/>
-                      </a:solidFill>
-                      <a:latin typeface="Times New Roman" panose="02020603050405020304" pitchFamily="18" charset="0"/>
-                      <a:cs typeface="Times New Roman" panose="02020603050405020304" pitchFamily="18" charset="0"/>
-                    </a:rPr>
-                    <a:t>Habitat</a:t>
-                  </a:r>
-                </a:p>
-              </p:txBody>
-            </p:sp>
-            <p:sp>
-              <p:nvSpPr>
-                <p:cNvPr id="162" name="Oval 161">
-                  <a:extLst>
-                    <a:ext uri="{FF2B5EF4-FFF2-40B4-BE49-F238E27FC236}">
-                      <a16:creationId xmlns:a16="http://schemas.microsoft.com/office/drawing/2014/main" id="{11A55DF2-FBD3-4392-B120-74C904259895}"/>
-                    </a:ext>
-                  </a:extLst>
-                </p:cNvPr>
-                <p:cNvSpPr/>
-                <p:nvPr/>
-              </p:nvSpPr>
-              <p:spPr>
-                <a:xfrm>
-                  <a:off x="824743" y="8219378"/>
-                  <a:ext cx="1840230" cy="914400"/>
-                </a:xfrm>
-                <a:prstGeom prst="ellipse">
-                  <a:avLst/>
-                </a:prstGeom>
-                <a:solidFill>
-                  <a:schemeClr val="accent4">
-                    <a:lumMod val="60000"/>
-                    <a:lumOff val="40000"/>
-                  </a:schemeClr>
-                </a:solidFill>
-                <a:ln>
-                  <a:solidFill>
-                    <a:schemeClr val="tx1"/>
-                  </a:solidFill>
-                </a:ln>
-              </p:spPr>
-              <p:style>
-                <a:lnRef idx="2">
-                  <a:schemeClr val="accent1">
-                    <a:shade val="50000"/>
-                  </a:schemeClr>
-                </a:lnRef>
-                <a:fillRef idx="1">
-                  <a:schemeClr val="accent1"/>
-                </a:fillRef>
-                <a:effectRef idx="0">
-                  <a:schemeClr val="accent1"/>
-                </a:effectRef>
-                <a:fontRef idx="minor">
-                  <a:schemeClr val="lt1"/>
-                </a:fontRef>
-              </p:style>
-              <p:txBody>
-                <a:bodyPr rot="0" spcFirstLastPara="0" vertOverflow="overflow" horzOverflow="overflow" vert="horz" wrap="none" lIns="79248" tIns="39624" rIns="79248" bIns="39624" numCol="1" spcCol="0" rtlCol="0" fromWordArt="0" anchor="ctr" anchorCtr="0" forceAA="0" compatLnSpc="1">
-                  <a:prstTxWarp prst="textNoShape">
-                    <a:avLst/>
-                  </a:prstTxWarp>
-                  <a:noAutofit/>
-                </a:bodyPr>
-                <a:lstStyle/>
-                <a:p>
-                  <a:pPr algn="ctr"/>
-                  <a:r>
-                    <a:rPr lang="en-US" sz="1600" dirty="0">
-                      <a:solidFill>
-                        <a:schemeClr val="tx1"/>
-                      </a:solidFill>
-                      <a:latin typeface="Times New Roman" panose="02020603050405020304" pitchFamily="18" charset="0"/>
-                      <a:cs typeface="Times New Roman" panose="02020603050405020304" pitchFamily="18" charset="0"/>
-                    </a:rPr>
-                    <a:t>Water treatment</a:t>
-                  </a:r>
-                </a:p>
-              </p:txBody>
-            </p:sp>
-            <p:sp>
-              <p:nvSpPr>
-                <p:cNvPr id="163" name="Oval 162">
-                  <a:extLst>
-                    <a:ext uri="{FF2B5EF4-FFF2-40B4-BE49-F238E27FC236}">
-                      <a16:creationId xmlns:a16="http://schemas.microsoft.com/office/drawing/2014/main" id="{95D9CC61-7102-4FD6-BE65-E85F16D2A12F}"/>
-                    </a:ext>
-                  </a:extLst>
-                </p:cNvPr>
-                <p:cNvSpPr/>
-                <p:nvPr/>
-              </p:nvSpPr>
-              <p:spPr>
-                <a:xfrm>
-                  <a:off x="824743" y="10684626"/>
-                  <a:ext cx="1840230" cy="914400"/>
-                </a:xfrm>
-                <a:prstGeom prst="ellipse">
-                  <a:avLst/>
-                </a:prstGeom>
-                <a:solidFill>
-                  <a:schemeClr val="accent6">
-                    <a:lumMod val="60000"/>
-                    <a:lumOff val="40000"/>
-                  </a:schemeClr>
-                </a:solidFill>
-                <a:ln>
-                  <a:solidFill>
-                    <a:schemeClr val="tx1"/>
-                  </a:solidFill>
-                </a:ln>
-              </p:spPr>
-              <p:style>
-                <a:lnRef idx="2">
-                  <a:schemeClr val="accent1">
-                    <a:shade val="50000"/>
-                  </a:schemeClr>
-                </a:lnRef>
-                <a:fillRef idx="1">
-                  <a:schemeClr val="accent1"/>
-                </a:fillRef>
-                <a:effectRef idx="0">
-                  <a:schemeClr val="accent1"/>
-                </a:effectRef>
-                <a:fontRef idx="minor">
-                  <a:schemeClr val="lt1"/>
-                </a:fontRef>
-              </p:style>
-              <p:txBody>
-                <a:bodyPr rot="0" spcFirstLastPara="0" vertOverflow="overflow" horzOverflow="overflow" vert="horz" wrap="none" lIns="79248" tIns="39624" rIns="79248" bIns="39624" numCol="1" spcCol="0" rtlCol="0" fromWordArt="0" anchor="ctr" anchorCtr="0" forceAA="0" compatLnSpc="1">
-                  <a:prstTxWarp prst="textNoShape">
-                    <a:avLst/>
-                  </a:prstTxWarp>
-                  <a:noAutofit/>
-                </a:bodyPr>
-                <a:lstStyle/>
-                <a:p>
-                  <a:pPr algn="ctr"/>
-                  <a:r>
-                    <a:rPr lang="en-US" sz="1600" dirty="0">
-                      <a:solidFill>
-                        <a:schemeClr val="tx1"/>
-                      </a:solidFill>
-                      <a:latin typeface="Times New Roman" panose="02020603050405020304" pitchFamily="18" charset="0"/>
-                      <a:cs typeface="Times New Roman" panose="02020603050405020304" pitchFamily="18" charset="0"/>
-                    </a:rPr>
-                    <a:t>Salinity</a:t>
-                  </a:r>
-                </a:p>
-              </p:txBody>
-            </p:sp>
-            <p:sp>
-              <p:nvSpPr>
-                <p:cNvPr id="164" name="Oval 163">
-                  <a:extLst>
-                    <a:ext uri="{FF2B5EF4-FFF2-40B4-BE49-F238E27FC236}">
-                      <a16:creationId xmlns:a16="http://schemas.microsoft.com/office/drawing/2014/main" id="{AFB846BF-E53C-453B-8486-C93A18E22F7F}"/>
-                    </a:ext>
-                  </a:extLst>
-                </p:cNvPr>
-                <p:cNvSpPr/>
-                <p:nvPr/>
-              </p:nvSpPr>
-              <p:spPr>
-                <a:xfrm>
-                  <a:off x="3487123" y="10675605"/>
-                  <a:ext cx="1840230" cy="914400"/>
-                </a:xfrm>
-                <a:prstGeom prst="ellipse">
-                  <a:avLst/>
-                </a:prstGeom>
-                <a:solidFill>
-                  <a:schemeClr val="accent1">
-                    <a:lumMod val="60000"/>
-                    <a:lumOff val="40000"/>
-                  </a:schemeClr>
-                </a:solidFill>
-                <a:ln>
-                  <a:solidFill>
-                    <a:schemeClr val="tx1"/>
-                  </a:solidFill>
-                </a:ln>
-              </p:spPr>
-              <p:style>
-                <a:lnRef idx="2">
-                  <a:schemeClr val="accent1">
-                    <a:shade val="50000"/>
-                  </a:schemeClr>
-                </a:lnRef>
-                <a:fillRef idx="1">
-                  <a:schemeClr val="accent1"/>
-                </a:fillRef>
-                <a:effectRef idx="0">
-                  <a:schemeClr val="accent1"/>
-                </a:effectRef>
-                <a:fontRef idx="minor">
-                  <a:schemeClr val="lt1"/>
-                </a:fontRef>
-              </p:style>
-              <p:txBody>
-                <a:bodyPr rot="0" spcFirstLastPara="0" vertOverflow="overflow" horzOverflow="overflow" vert="horz" wrap="none" lIns="79248" tIns="39624" rIns="79248" bIns="39624" numCol="1" spcCol="0" rtlCol="0" fromWordArt="0" anchor="ctr" anchorCtr="0" forceAA="0" compatLnSpc="1">
-                  <a:prstTxWarp prst="textNoShape">
-                    <a:avLst/>
-                  </a:prstTxWarp>
-                  <a:noAutofit/>
-                </a:bodyPr>
-                <a:lstStyle/>
-                <a:p>
-                  <a:pPr algn="ctr"/>
-                  <a:r>
-                    <a:rPr lang="en-US" sz="1600" dirty="0">
-                      <a:solidFill>
-                        <a:schemeClr val="tx1"/>
-                      </a:solidFill>
-                      <a:latin typeface="Times New Roman" panose="02020603050405020304" pitchFamily="18" charset="0"/>
-                      <a:cs typeface="Times New Roman" panose="02020603050405020304" pitchFamily="18" charset="0"/>
-                    </a:rPr>
-                    <a:t>Chlorophyll</a:t>
-                  </a:r>
-                </a:p>
-              </p:txBody>
-            </p:sp>
-            <p:cxnSp>
-              <p:nvCxnSpPr>
-                <p:cNvPr id="165" name="Straight Connector 164">
-                  <a:extLst>
-                    <a:ext uri="{FF2B5EF4-FFF2-40B4-BE49-F238E27FC236}">
-                      <a16:creationId xmlns:a16="http://schemas.microsoft.com/office/drawing/2014/main" id="{672A82A0-459A-4CB0-82C8-1111A696A21A}"/>
-                    </a:ext>
-                  </a:extLst>
-                </p:cNvPr>
-                <p:cNvCxnSpPr>
-                  <a:cxnSpLocks/>
-                  <a:stCxn id="161" idx="4"/>
-                  <a:endCxn id="163" idx="0"/>
-                </p:cNvCxnSpPr>
-                <p:nvPr/>
-              </p:nvCxnSpPr>
-              <p:spPr>
-                <a:xfrm flipH="1">
-                  <a:off x="1744858" y="9136318"/>
-                  <a:ext cx="2662380" cy="1548308"/>
-                </a:xfrm>
-                <a:prstGeom prst="line">
-                  <a:avLst/>
-                </a:prstGeom>
-                <a:ln>
-                  <a:solidFill>
-                    <a:schemeClr val="tx1"/>
-                  </a:solidFill>
-                </a:ln>
-              </p:spPr>
-              <p:style>
-                <a:lnRef idx="1">
-                  <a:schemeClr val="accent1"/>
-                </a:lnRef>
-                <a:fillRef idx="0">
-                  <a:schemeClr val="accent1"/>
-                </a:fillRef>
-                <a:effectRef idx="0">
-                  <a:schemeClr val="accent1"/>
-                </a:effectRef>
-                <a:fontRef idx="minor">
-                  <a:schemeClr val="tx1"/>
-                </a:fontRef>
-              </p:style>
-            </p:cxnSp>
-            <p:cxnSp>
-              <p:nvCxnSpPr>
-                <p:cNvPr id="166" name="Straight Connector 165">
-                  <a:extLst>
-                    <a:ext uri="{FF2B5EF4-FFF2-40B4-BE49-F238E27FC236}">
-                      <a16:creationId xmlns:a16="http://schemas.microsoft.com/office/drawing/2014/main" id="{713F06C4-A011-44D2-9F7F-5546CF50C7FC}"/>
-                    </a:ext>
-                  </a:extLst>
-                </p:cNvPr>
-                <p:cNvCxnSpPr>
-                  <a:cxnSpLocks/>
-                  <a:stCxn id="162" idx="4"/>
-                  <a:endCxn id="163" idx="0"/>
-                </p:cNvCxnSpPr>
-                <p:nvPr/>
-              </p:nvCxnSpPr>
-              <p:spPr>
-                <a:xfrm>
-                  <a:off x="1744858" y="9133778"/>
-                  <a:ext cx="0" cy="1550848"/>
-                </a:xfrm>
-                <a:prstGeom prst="line">
-                  <a:avLst/>
-                </a:prstGeom>
-                <a:ln>
-                  <a:solidFill>
-                    <a:schemeClr val="tx1"/>
-                  </a:solidFill>
-                </a:ln>
-              </p:spPr>
-              <p:style>
-                <a:lnRef idx="1">
-                  <a:schemeClr val="accent1"/>
-                </a:lnRef>
-                <a:fillRef idx="0">
-                  <a:schemeClr val="accent1"/>
-                </a:fillRef>
-                <a:effectRef idx="0">
-                  <a:schemeClr val="accent1"/>
-                </a:effectRef>
-                <a:fontRef idx="minor">
-                  <a:schemeClr val="tx1"/>
-                </a:fontRef>
-              </p:style>
-            </p:cxnSp>
-            <p:cxnSp>
-              <p:nvCxnSpPr>
-                <p:cNvPr id="167" name="Straight Connector 166">
-                  <a:extLst>
-                    <a:ext uri="{FF2B5EF4-FFF2-40B4-BE49-F238E27FC236}">
-                      <a16:creationId xmlns:a16="http://schemas.microsoft.com/office/drawing/2014/main" id="{3CAF0DA5-1B56-4CCE-AFA4-C8F069CF64D3}"/>
-                    </a:ext>
-                  </a:extLst>
-                </p:cNvPr>
-                <p:cNvCxnSpPr>
-                  <a:cxnSpLocks/>
-                  <a:stCxn id="161" idx="4"/>
-                  <a:endCxn id="164" idx="0"/>
-                </p:cNvCxnSpPr>
-                <p:nvPr/>
-              </p:nvCxnSpPr>
-              <p:spPr>
-                <a:xfrm>
-                  <a:off x="4407238" y="9136318"/>
-                  <a:ext cx="0" cy="1539287"/>
-                </a:xfrm>
-                <a:prstGeom prst="line">
-                  <a:avLst/>
-                </a:prstGeom>
-                <a:ln>
-                  <a:solidFill>
-                    <a:schemeClr val="tx1"/>
-                  </a:solidFill>
-                </a:ln>
-              </p:spPr>
-              <p:style>
-                <a:lnRef idx="1">
-                  <a:schemeClr val="accent1"/>
-                </a:lnRef>
-                <a:fillRef idx="0">
-                  <a:schemeClr val="accent1"/>
-                </a:fillRef>
-                <a:effectRef idx="0">
-                  <a:schemeClr val="accent1"/>
-                </a:effectRef>
-                <a:fontRef idx="minor">
-                  <a:schemeClr val="tx1"/>
-                </a:fontRef>
-              </p:style>
-            </p:cxnSp>
-            <p:cxnSp>
-              <p:nvCxnSpPr>
-                <p:cNvPr id="168" name="Straight Connector 167">
-                  <a:extLst>
-                    <a:ext uri="{FF2B5EF4-FFF2-40B4-BE49-F238E27FC236}">
-                      <a16:creationId xmlns:a16="http://schemas.microsoft.com/office/drawing/2014/main" id="{34D8C128-A177-474A-8A92-B5A6569D55D1}"/>
-                    </a:ext>
-                  </a:extLst>
-                </p:cNvPr>
-                <p:cNvCxnSpPr>
-                  <a:cxnSpLocks/>
-                  <a:stCxn id="162" idx="4"/>
-                  <a:endCxn id="164" idx="0"/>
-                </p:cNvCxnSpPr>
-                <p:nvPr/>
-              </p:nvCxnSpPr>
-              <p:spPr>
-                <a:xfrm>
-                  <a:off x="1744858" y="9133778"/>
-                  <a:ext cx="2662380" cy="1541827"/>
-                </a:xfrm>
-                <a:prstGeom prst="line">
-                  <a:avLst/>
-                </a:prstGeom>
-                <a:ln>
-                  <a:solidFill>
-                    <a:schemeClr val="tx1"/>
-                  </a:solidFill>
-                </a:ln>
-              </p:spPr>
-              <p:style>
-                <a:lnRef idx="1">
-                  <a:schemeClr val="accent1"/>
-                </a:lnRef>
-                <a:fillRef idx="0">
-                  <a:schemeClr val="accent1"/>
-                </a:fillRef>
-                <a:effectRef idx="0">
-                  <a:schemeClr val="accent1"/>
-                </a:effectRef>
-                <a:fontRef idx="minor">
-                  <a:schemeClr val="tx1"/>
-                </a:fontRef>
-              </p:style>
-            </p:cxnSp>
-            <p:cxnSp>
-              <p:nvCxnSpPr>
-                <p:cNvPr id="169" name="Straight Connector 168">
-                  <a:extLst>
-                    <a:ext uri="{FF2B5EF4-FFF2-40B4-BE49-F238E27FC236}">
-                      <a16:creationId xmlns:a16="http://schemas.microsoft.com/office/drawing/2014/main" id="{649824E1-71D6-4223-876F-530239E937B5}"/>
-                    </a:ext>
-                  </a:extLst>
-                </p:cNvPr>
-                <p:cNvCxnSpPr>
-                  <a:cxnSpLocks/>
-                  <a:stCxn id="163" idx="6"/>
-                  <a:endCxn id="164" idx="2"/>
-                </p:cNvCxnSpPr>
-                <p:nvPr/>
-              </p:nvCxnSpPr>
-              <p:spPr>
-                <a:xfrm flipV="1">
-                  <a:off x="2664973" y="11132805"/>
-                  <a:ext cx="822150" cy="9021"/>
-                </a:xfrm>
-                <a:prstGeom prst="line">
-                  <a:avLst/>
-                </a:prstGeom>
-                <a:ln>
-                  <a:solidFill>
-                    <a:schemeClr val="tx1"/>
-                  </a:solidFill>
-                </a:ln>
-              </p:spPr>
-              <p:style>
-                <a:lnRef idx="1">
-                  <a:schemeClr val="accent1"/>
-                </a:lnRef>
-                <a:fillRef idx="0">
-                  <a:schemeClr val="accent1"/>
-                </a:fillRef>
-                <a:effectRef idx="0">
-                  <a:schemeClr val="accent1"/>
-                </a:effectRef>
-                <a:fontRef idx="minor">
-                  <a:schemeClr val="tx1"/>
-                </a:fontRef>
-              </p:style>
-            </p:cxnSp>
-          </p:grpSp>
-          <p:sp>
-            <p:nvSpPr>
-              <p:cNvPr id="171" name="TextBox 170">
-                <a:extLst>
-                  <a:ext uri="{FF2B5EF4-FFF2-40B4-BE49-F238E27FC236}">
-                    <a16:creationId xmlns:a16="http://schemas.microsoft.com/office/drawing/2014/main" id="{5FEEC371-01B0-4D90-A2EC-D54868DF62B9}"/>
-                  </a:ext>
-                </a:extLst>
-              </p:cNvPr>
-              <p:cNvSpPr txBox="1"/>
-              <p:nvPr/>
-            </p:nvSpPr>
-            <p:spPr>
-              <a:xfrm>
-                <a:off x="6476655" y="8580441"/>
-                <a:ext cx="3721803" cy="475870"/>
-              </a:xfrm>
-              <a:prstGeom prst="rect">
-                <a:avLst/>
-              </a:prstGeom>
-              <a:noFill/>
-            </p:spPr>
-            <p:txBody>
-              <a:bodyPr wrap="none" rtlCol="0">
-                <a:spAutoFit/>
-              </a:bodyPr>
-              <a:lstStyle/>
-              <a:p>
-                <a:r>
-                  <a:rPr lang="en-US" sz="2080" b="1" dirty="0">
-                    <a:latin typeface="Times New Roman" panose="02020603050405020304" pitchFamily="18" charset="0"/>
-                    <a:cs typeface="Times New Roman" panose="02020603050405020304" pitchFamily="18" charset="0"/>
-                  </a:rPr>
-                  <a:t>Simple model, 1994 - 2016 </a:t>
-                </a:r>
-              </a:p>
-            </p:txBody>
-          </p:sp>
-        </p:grpSp>
+            <a:prstGeom prst="line">
+              <a:avLst/>
+            </a:prstGeom>
+            <a:ln>
+              <a:solidFill>
+                <a:schemeClr val="tx1"/>
+              </a:solidFill>
+              <a:tailEnd type="arrow" w="lg" len="lg"/>
+            </a:ln>
+          </p:spPr>
+          <p:style>
+            <a:lnRef idx="1">
+              <a:schemeClr val="accent1"/>
+            </a:lnRef>
+            <a:fillRef idx="0">
+              <a:schemeClr val="accent1"/>
+            </a:fillRef>
+            <a:effectRef idx="0">
+              <a:schemeClr val="accent1"/>
+            </a:effectRef>
+            <a:fontRef idx="minor">
+              <a:schemeClr val="tx1"/>
+            </a:fontRef>
+          </p:style>
+        </p:cxnSp>
+        <p:cxnSp>
+          <p:nvCxnSpPr>
+            <p:cNvPr id="167" name="Straight Connector 166">
+              <a:extLst>
+                <a:ext uri="{FF2B5EF4-FFF2-40B4-BE49-F238E27FC236}">
+                  <a16:creationId xmlns:a16="http://schemas.microsoft.com/office/drawing/2014/main" id="{3CAF0DA5-1B56-4CCE-AFA4-C8F069CF64D3}"/>
+                </a:ext>
+              </a:extLst>
+            </p:cNvPr>
+            <p:cNvCxnSpPr>
+              <a:cxnSpLocks/>
+              <a:stCxn id="161" idx="4"/>
+              <a:endCxn id="164" idx="0"/>
+            </p:cNvCxnSpPr>
+            <p:nvPr/>
+          </p:nvCxnSpPr>
+          <p:spPr>
+            <a:xfrm>
+              <a:off x="7967995" y="7705468"/>
+              <a:ext cx="0" cy="1334049"/>
+            </a:xfrm>
+            <a:prstGeom prst="line">
+              <a:avLst/>
+            </a:prstGeom>
+            <a:ln>
+              <a:solidFill>
+                <a:schemeClr val="tx1"/>
+              </a:solidFill>
+              <a:tailEnd type="arrow" w="lg" len="lg"/>
+            </a:ln>
+          </p:spPr>
+          <p:style>
+            <a:lnRef idx="1">
+              <a:schemeClr val="accent1"/>
+            </a:lnRef>
+            <a:fillRef idx="0">
+              <a:schemeClr val="accent1"/>
+            </a:fillRef>
+            <a:effectRef idx="0">
+              <a:schemeClr val="accent1"/>
+            </a:effectRef>
+            <a:fontRef idx="minor">
+              <a:schemeClr val="tx1"/>
+            </a:fontRef>
+          </p:style>
+        </p:cxnSp>
+        <p:cxnSp>
+          <p:nvCxnSpPr>
+            <p:cNvPr id="168" name="Straight Connector 167">
+              <a:extLst>
+                <a:ext uri="{FF2B5EF4-FFF2-40B4-BE49-F238E27FC236}">
+                  <a16:creationId xmlns:a16="http://schemas.microsoft.com/office/drawing/2014/main" id="{34D8C128-A177-474A-8A92-B5A6569D55D1}"/>
+                </a:ext>
+              </a:extLst>
+            </p:cNvPr>
+            <p:cNvCxnSpPr>
+              <a:cxnSpLocks/>
+              <a:stCxn id="162" idx="4"/>
+            </p:cNvCxnSpPr>
+            <p:nvPr/>
+          </p:nvCxnSpPr>
+          <p:spPr>
+            <a:xfrm>
+              <a:off x="5660599" y="7703266"/>
+              <a:ext cx="2089362" cy="1341867"/>
+            </a:xfrm>
+            <a:prstGeom prst="line">
+              <a:avLst/>
+            </a:prstGeom>
+            <a:ln>
+              <a:solidFill>
+                <a:schemeClr val="tx1"/>
+              </a:solidFill>
+              <a:tailEnd type="arrow" w="lg" len="lg"/>
+            </a:ln>
+          </p:spPr>
+          <p:style>
+            <a:lnRef idx="1">
+              <a:schemeClr val="accent1"/>
+            </a:lnRef>
+            <a:fillRef idx="0">
+              <a:schemeClr val="accent1"/>
+            </a:fillRef>
+            <a:effectRef idx="0">
+              <a:schemeClr val="accent1"/>
+            </a:effectRef>
+            <a:fontRef idx="minor">
+              <a:schemeClr val="tx1"/>
+            </a:fontRef>
+          </p:style>
+        </p:cxnSp>
+        <p:cxnSp>
+          <p:nvCxnSpPr>
+            <p:cNvPr id="169" name="Straight Connector 168">
+              <a:extLst>
+                <a:ext uri="{FF2B5EF4-FFF2-40B4-BE49-F238E27FC236}">
+                  <a16:creationId xmlns:a16="http://schemas.microsoft.com/office/drawing/2014/main" id="{649824E1-71D6-4223-876F-530239E937B5}"/>
+                </a:ext>
+              </a:extLst>
+            </p:cNvPr>
+            <p:cNvCxnSpPr>
+              <a:cxnSpLocks/>
+              <a:stCxn id="163" idx="6"/>
+              <a:endCxn id="164" idx="2"/>
+            </p:cNvCxnSpPr>
+            <p:nvPr/>
+          </p:nvCxnSpPr>
+          <p:spPr>
+            <a:xfrm flipV="1">
+              <a:off x="6458032" y="9435757"/>
+              <a:ext cx="712530" cy="7818"/>
+            </a:xfrm>
+            <a:prstGeom prst="line">
+              <a:avLst/>
+            </a:prstGeom>
+            <a:ln>
+              <a:solidFill>
+                <a:schemeClr val="tx1"/>
+              </a:solidFill>
+              <a:tailEnd type="arrow" w="lg" len="lg"/>
+            </a:ln>
+          </p:spPr>
+          <p:style>
+            <a:lnRef idx="1">
+              <a:schemeClr val="accent1"/>
+            </a:lnRef>
+            <a:fillRef idx="0">
+              <a:schemeClr val="accent1"/>
+            </a:fillRef>
+            <a:effectRef idx="0">
+              <a:schemeClr val="accent1"/>
+            </a:effectRef>
+            <a:fontRef idx="minor">
+              <a:schemeClr val="tx1"/>
+            </a:fontRef>
+          </p:style>
+        </p:cxnSp>
+        <p:sp>
+          <p:nvSpPr>
+            <p:cNvPr id="171" name="TextBox 170">
+              <a:extLst>
+                <a:ext uri="{FF2B5EF4-FFF2-40B4-BE49-F238E27FC236}">
+                  <a16:creationId xmlns:a16="http://schemas.microsoft.com/office/drawing/2014/main" id="{5FEEC371-01B0-4D90-A2EC-D54868DF62B9}"/>
+                </a:ext>
+              </a:extLst>
+            </p:cNvPr>
+            <p:cNvSpPr txBox="1"/>
+            <p:nvPr/>
+          </p:nvSpPr>
+          <p:spPr>
+            <a:xfrm>
+              <a:off x="5215804" y="6281784"/>
+              <a:ext cx="3225563" cy="412421"/>
+            </a:xfrm>
+            <a:prstGeom prst="rect">
+              <a:avLst/>
+            </a:prstGeom>
+            <a:noFill/>
+          </p:spPr>
+          <p:txBody>
+            <a:bodyPr wrap="none" rtlCol="0">
+              <a:spAutoFit/>
+            </a:bodyPr>
+            <a:lstStyle/>
+            <a:p>
+              <a:r>
+                <a:rPr lang="en-US" sz="2080" b="1" dirty="0">
+                  <a:latin typeface="Times New Roman" panose="02020603050405020304" pitchFamily="18" charset="0"/>
+                  <a:cs typeface="Times New Roman" panose="02020603050405020304" pitchFamily="18" charset="0"/>
+                </a:rPr>
+                <a:t>Simple model, 1994 - 2016 </a:t>
+              </a:r>
+            </a:p>
+          </p:txBody>
+        </p:sp>
       </p:grpSp>
     </p:spTree>
     <p:extLst>

</xml_diff>